<commit_message>
Término dos ajustes da Apresentação.pptx
</commit_message>
<xml_diff>
--- a/docs/Apresentação.pptx
+++ b/docs/Apresentação.pptx
@@ -14,7 +14,7 @@
     <p:sldId id="256" r:id="rId3"/>
     <p:sldId id="258" r:id="rId5"/>
     <p:sldId id="264" r:id="rId6"/>
-    <p:sldId id="259" r:id="rId7"/>
+    <p:sldId id="268" r:id="rId7"/>
     <p:sldId id="262" r:id="rId8"/>
   </p:sldIdLst>
   <p:sldSz cx="12192000" cy="6858000"/>
@@ -5010,7 +5010,7 @@
       <p:grpSpPr/>
       <p:sp>
         <p:nvSpPr>
-          <p:cNvPr id="23" name="Título 22"/>
+          <p:cNvPr id="4" name="Título 3"/>
           <p:cNvSpPr>
             <a:spLocks noGrp="1"/>
           </p:cNvSpPr>
@@ -5034,7 +5034,7 @@
         </p:nvSpPr>
         <p:spPr>
           <a:xfrm>
-            <a:off x="-38735" y="-36195"/>
+            <a:off x="-38735" y="-27940"/>
             <a:ext cx="12269470" cy="6885940"/>
           </a:xfrm>
           <a:prstGeom prst="rect">
@@ -5143,8 +5143,8 @@
         </p:nvSpPr>
         <p:spPr>
           <a:xfrm>
-            <a:off x="1226185" y="2523490"/>
-            <a:ext cx="2632710" cy="2306955"/>
+            <a:off x="1171575" y="2165985"/>
+            <a:ext cx="2632710" cy="2861310"/>
           </a:xfrm>
           <a:prstGeom prst="rect">
             <a:avLst/>
@@ -5168,7 +5168,7 @@
                 <a:latin typeface="Arial" panose="020B0604020202020204" pitchFamily="34" charset="0"/>
                 <a:cs typeface="Arial" panose="020B0604020202020204" pitchFamily="34" charset="0"/>
               </a:rPr>
-              <a:t>Gerenciamento completo da ferrovia</a:t>
+              <a:t>Controle de Tráfego</a:t>
             </a:r>
             <a:endParaRPr lang="pt-BR" altLang="en-US" b="1">
               <a:solidFill>
@@ -5179,9 +5179,9 @@
             </a:endParaRPr>
           </a:p>
           <a:p>
-            <a:pPr marL="285750" indent="-285750" algn="l">
+            <a:pPr indent="0" algn="l">
               <a:buFont typeface="Wingdings" panose="05000000000000000000" charset="0"/>
-              <a:buChar char="Ø"/>
+              <a:buNone/>
             </a:pPr>
             <a:endParaRPr lang="pt-BR" altLang="en-US" b="1">
               <a:solidFill>
@@ -5196,6 +5196,19 @@
               <a:buFont typeface="Wingdings" panose="05000000000000000000" charset="0"/>
               <a:buNone/>
             </a:pPr>
+            <a:endParaRPr lang="pt-BR" altLang="en-US" b="1">
+              <a:solidFill>
+                <a:schemeClr val="bg1"/>
+              </a:solidFill>
+              <a:latin typeface="Arial" panose="020B0604020202020204" pitchFamily="34" charset="0"/>
+              <a:cs typeface="Arial" panose="020B0604020202020204" pitchFamily="34" charset="0"/>
+            </a:endParaRPr>
+          </a:p>
+          <a:p>
+            <a:pPr indent="0" algn="l">
+              <a:buFont typeface="Wingdings" panose="05000000000000000000" charset="0"/>
+              <a:buNone/>
+            </a:pPr>
             <a:r>
               <a:rPr lang="pt-BR" altLang="en-US" b="1">
                 <a:solidFill>
@@ -5204,7 +5217,7 @@
                 <a:latin typeface="Arial" panose="020B0604020202020204" pitchFamily="34" charset="0"/>
                 <a:cs typeface="Arial" panose="020B0604020202020204" pitchFamily="34" charset="0"/>
               </a:rPr>
-              <a:t>Alcançar eficiência operacional</a:t>
+              <a:t>Agendamento e Planejamento de Rotas</a:t>
             </a:r>
             <a:endParaRPr lang="pt-BR" altLang="en-US" b="1">
               <a:solidFill>
@@ -5215,9 +5228,9 @@
             </a:endParaRPr>
           </a:p>
           <a:p>
-            <a:pPr marL="285750" indent="-285750" algn="l">
+            <a:pPr indent="0" algn="l">
               <a:buFont typeface="Wingdings" panose="05000000000000000000" charset="0"/>
-              <a:buChar char="Ø"/>
+              <a:buNone/>
             </a:pPr>
             <a:endParaRPr lang="pt-BR" altLang="en-US" b="1">
               <a:solidFill>
@@ -5232,6 +5245,19 @@
               <a:buFont typeface="Wingdings" panose="05000000000000000000" charset="0"/>
               <a:buNone/>
             </a:pPr>
+            <a:endParaRPr lang="pt-BR" altLang="en-US" b="1">
+              <a:solidFill>
+                <a:schemeClr val="bg1"/>
+              </a:solidFill>
+              <a:latin typeface="Arial" panose="020B0604020202020204" pitchFamily="34" charset="0"/>
+              <a:cs typeface="Arial" panose="020B0604020202020204" pitchFamily="34" charset="0"/>
+            </a:endParaRPr>
+          </a:p>
+          <a:p>
+            <a:pPr indent="0" algn="l">
+              <a:buFont typeface="Wingdings" panose="05000000000000000000" charset="0"/>
+              <a:buNone/>
+            </a:pPr>
             <a:r>
               <a:rPr lang="pt-BR" altLang="en-US" b="1">
                 <a:solidFill>
@@ -5240,7 +5266,7 @@
                 <a:latin typeface="Arial" panose="020B0604020202020204" pitchFamily="34" charset="0"/>
                 <a:cs typeface="Arial" panose="020B0604020202020204" pitchFamily="34" charset="0"/>
               </a:rPr>
-              <a:t>Aumentar a Produtividade</a:t>
+              <a:t>Gestão de Vagões e Locomotivas</a:t>
             </a:r>
             <a:endParaRPr lang="pt-BR" altLang="en-US" b="1">
               <a:solidFill>
@@ -5273,16 +5299,16 @@
         </p:blipFill>
         <p:spPr>
           <a:xfrm>
-            <a:off x="3805555" y="-36195"/>
-            <a:ext cx="4160520" cy="4095115"/>
+            <a:off x="3806825" y="-27940"/>
+            <a:ext cx="4197985" cy="4197985"/>
           </a:xfrm>
           <a:prstGeom prst="rect">
             <a:avLst/>
           </a:prstGeom>
           <a:noFill/>
           <a:effectLst>
-            <a:glow rad="127000">
-              <a:schemeClr val="accent1">
+            <a:glow rad="38100">
+              <a:schemeClr val="bg1">
                 <a:alpha val="0"/>
               </a:schemeClr>
             </a:glow>
@@ -5297,8 +5323,8 @@
         </p:nvSpPr>
         <p:spPr>
           <a:xfrm>
-            <a:off x="8928100" y="2661920"/>
-            <a:ext cx="2518410" cy="2030095"/>
+            <a:off x="8915400" y="1750695"/>
+            <a:ext cx="2518410" cy="3692525"/>
           </a:xfrm>
           <a:prstGeom prst="rect">
             <a:avLst/>
@@ -5323,7 +5349,7 @@
                 <a:cs typeface="Arial" panose="020B0604020202020204" pitchFamily="34" charset="0"/>
                 <a:sym typeface="+mn-ea"/>
               </a:rPr>
-              <a:t>Redução de custos</a:t>
+              <a:t>Gestão de Carga</a:t>
             </a:r>
             <a:endParaRPr lang="pt-BR" altLang="en-US" b="1">
               <a:solidFill>
@@ -5349,30 +5375,6 @@
                 <a:sym typeface="+mn-ea"/>
               </a:rPr>
               <a:t> </a:t>
-            </a:r>
-            <a:endParaRPr lang="pt-BR" altLang="en-US" b="1">
-              <a:solidFill>
-                <a:schemeClr val="bg1"/>
-              </a:solidFill>
-              <a:latin typeface="Arial" panose="020B0604020202020204" pitchFamily="34" charset="0"/>
-              <a:cs typeface="Arial" panose="020B0604020202020204" pitchFamily="34" charset="0"/>
-            </a:endParaRPr>
-          </a:p>
-          <a:p>
-            <a:pPr indent="0" algn="l">
-              <a:buFont typeface="Wingdings" panose="05000000000000000000" charset="0"/>
-              <a:buNone/>
-            </a:pPr>
-            <a:r>
-              <a:rPr lang="pt-BR" altLang="en-US" b="1">
-                <a:solidFill>
-                  <a:schemeClr val="bg1"/>
-                </a:solidFill>
-                <a:latin typeface="Arial" panose="020B0604020202020204" pitchFamily="34" charset="0"/>
-                <a:cs typeface="Arial" panose="020B0604020202020204" pitchFamily="34" charset="0"/>
-                <a:sym typeface="+mn-ea"/>
-              </a:rPr>
-              <a:t>Aumentar a segurança</a:t>
             </a:r>
             <a:endParaRPr lang="pt-BR" altLang="en-US" b="1">
               <a:solidFill>
@@ -5410,7 +5412,7 @@
                 <a:cs typeface="Arial" panose="020B0604020202020204" pitchFamily="34" charset="0"/>
                 <a:sym typeface="+mn-ea"/>
               </a:rPr>
-              <a:t>Evitar falhas humanas.</a:t>
+              <a:t>Gestão de Manutenção</a:t>
             </a:r>
             <a:endParaRPr lang="pt-BR" altLang="en-US" b="1">
               <a:solidFill>
@@ -5418,184 +5420,117 @@
               </a:solidFill>
               <a:latin typeface="Arial" panose="020B0604020202020204" pitchFamily="34" charset="0"/>
               <a:cs typeface="Arial" panose="020B0604020202020204" pitchFamily="34" charset="0"/>
+              <a:sym typeface="+mn-ea"/>
             </a:endParaRPr>
           </a:p>
-        </p:txBody>
-      </p:sp>
-      <p:pic>
-        <p:nvPicPr>
-          <p:cNvPr id="15" name="Imagem 14"/>
-          <p:cNvPicPr>
-            <a:picLocks noChangeAspect="1"/>
-          </p:cNvPicPr>
-          <p:nvPr/>
-        </p:nvPicPr>
-        <p:blipFill>
-          <a:blip r:embed="rId4"/>
-          <a:stretch>
-            <a:fillRect/>
-          </a:stretch>
-        </p:blipFill>
-        <p:spPr>
-          <a:xfrm>
-            <a:off x="560070" y="2515870"/>
-            <a:ext cx="632460" cy="632460"/>
-          </a:xfrm>
-          <a:prstGeom prst="rect">
-            <a:avLst/>
-          </a:prstGeom>
-          <a:effectLst>
-            <a:glow rad="38100">
-              <a:schemeClr val="bg1"/>
-            </a:glow>
-          </a:effectLst>
-        </p:spPr>
-      </p:pic>
-      <p:pic>
-        <p:nvPicPr>
-          <p:cNvPr id="16" name="Imagem 15"/>
-          <p:cNvPicPr>
-            <a:picLocks noChangeAspect="1"/>
-          </p:cNvPicPr>
-          <p:nvPr/>
-        </p:nvPicPr>
-        <p:blipFill>
-          <a:blip r:embed="rId4"/>
-          <a:stretch>
-            <a:fillRect/>
-          </a:stretch>
-        </p:blipFill>
-        <p:spPr>
-          <a:xfrm>
-            <a:off x="560070" y="3321050"/>
-            <a:ext cx="632460" cy="632460"/>
-          </a:xfrm>
-          <a:prstGeom prst="rect">
-            <a:avLst/>
-          </a:prstGeom>
-          <a:effectLst>
-            <a:glow rad="38100">
-              <a:schemeClr val="bg1"/>
-            </a:glow>
-          </a:effectLst>
-        </p:spPr>
-      </p:pic>
-      <p:pic>
-        <p:nvPicPr>
-          <p:cNvPr id="17" name="Imagem 16"/>
-          <p:cNvPicPr>
-            <a:picLocks noChangeAspect="1"/>
-          </p:cNvPicPr>
-          <p:nvPr/>
-        </p:nvPicPr>
-        <p:blipFill>
-          <a:blip r:embed="rId4"/>
-          <a:stretch>
-            <a:fillRect/>
-          </a:stretch>
-        </p:blipFill>
-        <p:spPr>
-          <a:xfrm>
-            <a:off x="560070" y="4197985"/>
-            <a:ext cx="632460" cy="632460"/>
-          </a:xfrm>
-          <a:prstGeom prst="rect">
-            <a:avLst/>
-          </a:prstGeom>
-          <a:effectLst>
-            <a:glow rad="38100">
-              <a:schemeClr val="bg1"/>
-            </a:glow>
-          </a:effectLst>
-        </p:spPr>
-      </p:pic>
-      <p:pic>
-        <p:nvPicPr>
-          <p:cNvPr id="18" name="Imagem 17"/>
-          <p:cNvPicPr>
-            <a:picLocks noChangeAspect="1"/>
-          </p:cNvPicPr>
-          <p:nvPr/>
-        </p:nvPicPr>
-        <p:blipFill>
-          <a:blip r:embed="rId4"/>
-          <a:stretch>
-            <a:fillRect/>
-          </a:stretch>
-        </p:blipFill>
-        <p:spPr>
-          <a:xfrm>
-            <a:off x="8217535" y="2523490"/>
-            <a:ext cx="632460" cy="632460"/>
-          </a:xfrm>
-          <a:prstGeom prst="rect">
-            <a:avLst/>
-          </a:prstGeom>
-          <a:effectLst>
-            <a:glow rad="38100">
-              <a:schemeClr val="bg1"/>
-            </a:glow>
-          </a:effectLst>
-        </p:spPr>
-      </p:pic>
-      <p:pic>
-        <p:nvPicPr>
-          <p:cNvPr id="19" name="Imagem 18"/>
-          <p:cNvPicPr>
-            <a:picLocks noChangeAspect="1"/>
-          </p:cNvPicPr>
-          <p:nvPr/>
-        </p:nvPicPr>
-        <p:blipFill>
-          <a:blip r:embed="rId4"/>
-          <a:stretch>
-            <a:fillRect/>
-          </a:stretch>
-        </p:blipFill>
-        <p:spPr>
-          <a:xfrm>
-            <a:off x="8217535" y="3258185"/>
-            <a:ext cx="632460" cy="632460"/>
-          </a:xfrm>
-          <a:prstGeom prst="rect">
-            <a:avLst/>
-          </a:prstGeom>
-          <a:effectLst>
-            <a:glow rad="38100">
-              <a:schemeClr val="bg1"/>
-            </a:glow>
-          </a:effectLst>
-        </p:spPr>
-      </p:pic>
-      <p:pic>
-        <p:nvPicPr>
-          <p:cNvPr id="20" name="Imagem 19"/>
-          <p:cNvPicPr>
-            <a:picLocks noChangeAspect="1"/>
-          </p:cNvPicPr>
-          <p:nvPr/>
-        </p:nvPicPr>
-        <p:blipFill>
-          <a:blip r:embed="rId4"/>
-          <a:stretch>
-            <a:fillRect/>
-          </a:stretch>
-        </p:blipFill>
-        <p:spPr>
-          <a:xfrm>
-            <a:off x="8216900" y="4058285"/>
-            <a:ext cx="633600" cy="633600"/>
-          </a:xfrm>
-          <a:prstGeom prst="rect">
-            <a:avLst/>
-          </a:prstGeom>
-          <a:effectLst>
-            <a:glow rad="38100">
-              <a:schemeClr val="bg1"/>
-            </a:glow>
-          </a:effectLst>
-        </p:spPr>
-      </p:pic>
+          <a:p>
+            <a:pPr indent="0" algn="l">
+              <a:buFont typeface="Wingdings" panose="05000000000000000000" charset="0"/>
+              <a:buNone/>
+            </a:pPr>
+            <a:endParaRPr lang="pt-BR" altLang="en-US" b="1">
+              <a:solidFill>
+                <a:schemeClr val="bg1"/>
+              </a:solidFill>
+              <a:latin typeface="Arial" panose="020B0604020202020204" pitchFamily="34" charset="0"/>
+              <a:cs typeface="Arial" panose="020B0604020202020204" pitchFamily="34" charset="0"/>
+              <a:sym typeface="+mn-ea"/>
+            </a:endParaRPr>
+          </a:p>
+          <a:p>
+            <a:pPr indent="0" algn="l">
+              <a:buFont typeface="Wingdings" panose="05000000000000000000" charset="0"/>
+              <a:buNone/>
+            </a:pPr>
+            <a:endParaRPr lang="pt-BR" altLang="en-US" b="1">
+              <a:solidFill>
+                <a:schemeClr val="bg1"/>
+              </a:solidFill>
+              <a:latin typeface="Arial" panose="020B0604020202020204" pitchFamily="34" charset="0"/>
+              <a:cs typeface="Arial" panose="020B0604020202020204" pitchFamily="34" charset="0"/>
+              <a:sym typeface="+mn-ea"/>
+            </a:endParaRPr>
+          </a:p>
+          <a:p>
+            <a:pPr indent="0" algn="l">
+              <a:buFont typeface="Wingdings" panose="05000000000000000000" charset="0"/>
+              <a:buNone/>
+            </a:pPr>
+            <a:r>
+              <a:rPr lang="pt-BR" altLang="en-US" b="1">
+                <a:solidFill>
+                  <a:schemeClr val="bg1"/>
+                </a:solidFill>
+                <a:latin typeface="Arial" panose="020B0604020202020204" pitchFamily="34" charset="0"/>
+                <a:cs typeface="Arial" panose="020B0604020202020204" pitchFamily="34" charset="0"/>
+                <a:sym typeface="+mn-ea"/>
+              </a:rPr>
+              <a:t>Gestão de Funcionários</a:t>
+            </a:r>
+            <a:endParaRPr lang="pt-BR" altLang="en-US" b="1">
+              <a:solidFill>
+                <a:schemeClr val="bg1"/>
+              </a:solidFill>
+              <a:latin typeface="Arial" panose="020B0604020202020204" pitchFamily="34" charset="0"/>
+              <a:cs typeface="Arial" panose="020B0604020202020204" pitchFamily="34" charset="0"/>
+              <a:sym typeface="+mn-ea"/>
+            </a:endParaRPr>
+          </a:p>
+          <a:p>
+            <a:pPr indent="0" algn="l">
+              <a:buFont typeface="Wingdings" panose="05000000000000000000" charset="0"/>
+              <a:buNone/>
+            </a:pPr>
+            <a:endParaRPr lang="pt-BR" altLang="en-US" b="1">
+              <a:solidFill>
+                <a:schemeClr val="bg1"/>
+              </a:solidFill>
+              <a:latin typeface="Arial" panose="020B0604020202020204" pitchFamily="34" charset="0"/>
+              <a:cs typeface="Arial" panose="020B0604020202020204" pitchFamily="34" charset="0"/>
+              <a:sym typeface="+mn-ea"/>
+            </a:endParaRPr>
+          </a:p>
+          <a:p>
+            <a:pPr indent="0" algn="l">
+              <a:buFont typeface="Wingdings" panose="05000000000000000000" charset="0"/>
+              <a:buNone/>
+            </a:pPr>
+            <a:endParaRPr lang="pt-BR" altLang="en-US" b="1">
+              <a:solidFill>
+                <a:schemeClr val="bg1"/>
+              </a:solidFill>
+              <a:latin typeface="Arial" panose="020B0604020202020204" pitchFamily="34" charset="0"/>
+              <a:cs typeface="Arial" panose="020B0604020202020204" pitchFamily="34" charset="0"/>
+              <a:sym typeface="+mn-ea"/>
+            </a:endParaRPr>
+          </a:p>
+          <a:p>
+            <a:pPr indent="0" algn="l">
+              <a:buFont typeface="Wingdings" panose="05000000000000000000" charset="0"/>
+              <a:buNone/>
+            </a:pPr>
+            <a:r>
+              <a:rPr lang="pt-BR" altLang="en-US" b="1">
+                <a:solidFill>
+                  <a:schemeClr val="bg1"/>
+                </a:solidFill>
+                <a:latin typeface="Arial" panose="020B0604020202020204" pitchFamily="34" charset="0"/>
+                <a:cs typeface="Arial" panose="020B0604020202020204" pitchFamily="34" charset="0"/>
+                <a:sym typeface="+mn-ea"/>
+              </a:rPr>
+              <a:t>Gestão de Problemas</a:t>
+            </a:r>
+            <a:endParaRPr lang="pt-BR" altLang="en-US" b="1">
+              <a:solidFill>
+                <a:schemeClr val="bg1"/>
+              </a:solidFill>
+              <a:latin typeface="Arial" panose="020B0604020202020204" pitchFamily="34" charset="0"/>
+              <a:cs typeface="Arial" panose="020B0604020202020204" pitchFamily="34" charset="0"/>
+              <a:sym typeface="+mn-ea"/>
+            </a:endParaRPr>
+          </a:p>
+        </p:txBody>
+      </p:sp>
       <p:pic>
         <p:nvPicPr>
           <p:cNvPr id="27" name="Espaço Reservado para Conteúdo 6"/>
@@ -5615,8 +5550,8 @@
         </p:blipFill>
         <p:spPr>
           <a:xfrm>
-            <a:off x="3804285" y="3938270"/>
-            <a:ext cx="4161790" cy="2920365"/>
+            <a:off x="3804285" y="4037965"/>
+            <a:ext cx="4161790" cy="2820670"/>
           </a:xfrm>
           <a:prstGeom prst="rect">
             <a:avLst/>
@@ -5723,7 +5658,7 @@
         </p:nvSpPr>
         <p:spPr>
           <a:xfrm>
-            <a:off x="5541010" y="2165985"/>
+            <a:off x="5541010" y="2268220"/>
             <a:ext cx="688340" cy="521970"/>
           </a:xfrm>
           <a:prstGeom prst="rect">
@@ -5765,7 +5700,7 @@
         </p:nvSpPr>
         <p:spPr>
           <a:xfrm>
-            <a:off x="5561330" y="3177540"/>
+            <a:off x="5561965" y="3318510"/>
             <a:ext cx="688340" cy="521970"/>
           </a:xfrm>
           <a:prstGeom prst="rect">
@@ -5807,7 +5742,7 @@
         </p:nvSpPr>
         <p:spPr>
           <a:xfrm>
-            <a:off x="5541010" y="4163695"/>
+            <a:off x="5541010" y="4261485"/>
             <a:ext cx="688340" cy="521970"/>
           </a:xfrm>
           <a:prstGeom prst="rect">
@@ -5849,7 +5784,7 @@
         </p:nvSpPr>
         <p:spPr>
           <a:xfrm>
-            <a:off x="5541010" y="5147310"/>
+            <a:off x="5541010" y="5224145"/>
             <a:ext cx="688340" cy="521970"/>
           </a:xfrm>
           <a:prstGeom prst="rect">
@@ -5891,7 +5826,7 @@
         </p:nvSpPr>
         <p:spPr>
           <a:xfrm>
-            <a:off x="5561330" y="6187440"/>
+            <a:off x="5561330" y="6186805"/>
             <a:ext cx="688340" cy="521970"/>
           </a:xfrm>
           <a:prstGeom prst="rect">
@@ -5925,6 +5860,211 @@
           </a:p>
         </p:txBody>
       </p:sp>
+      <p:pic>
+        <p:nvPicPr>
+          <p:cNvPr id="3" name="Espaço Reservado para Conteúdo 2"/>
+          <p:cNvPicPr>
+            <a:picLocks noChangeAspect="1"/>
+          </p:cNvPicPr>
+          <p:nvPr>
+            <p:ph sz="half" idx="2"/>
+          </p:nvPr>
+        </p:nvPicPr>
+        <p:blipFill>
+          <a:blip r:embed="rId4"/>
+          <a:stretch>
+            <a:fillRect/>
+          </a:stretch>
+        </p:blipFill>
+        <p:spPr>
+          <a:xfrm>
+            <a:off x="608965" y="2013585"/>
+            <a:ext cx="562610" cy="562610"/>
+          </a:xfrm>
+          <a:prstGeom prst="rect">
+            <a:avLst/>
+          </a:prstGeom>
+          <a:effectLst>
+            <a:glow rad="38100">
+              <a:schemeClr val="bg1"/>
+            </a:glow>
+          </a:effectLst>
+        </p:spPr>
+      </p:pic>
+      <p:pic>
+        <p:nvPicPr>
+          <p:cNvPr id="6" name="Espaço Reservado para Conteúdo 2"/>
+          <p:cNvPicPr>
+            <a:picLocks noChangeAspect="1"/>
+          </p:cNvPicPr>
+          <p:nvPr/>
+        </p:nvPicPr>
+        <p:blipFill>
+          <a:blip r:embed="rId4"/>
+          <a:stretch>
+            <a:fillRect/>
+          </a:stretch>
+        </p:blipFill>
+        <p:spPr>
+          <a:xfrm>
+            <a:off x="608965" y="3112135"/>
+            <a:ext cx="562610" cy="562610"/>
+          </a:xfrm>
+          <a:prstGeom prst="rect">
+            <a:avLst/>
+          </a:prstGeom>
+          <a:effectLst>
+            <a:glow rad="38100">
+              <a:schemeClr val="bg1"/>
+            </a:glow>
+          </a:effectLst>
+        </p:spPr>
+      </p:pic>
+      <p:pic>
+        <p:nvPicPr>
+          <p:cNvPr id="8" name="Espaço Reservado para Conteúdo 2"/>
+          <p:cNvPicPr>
+            <a:picLocks noChangeAspect="1"/>
+          </p:cNvPicPr>
+          <p:nvPr/>
+        </p:nvPicPr>
+        <p:blipFill>
+          <a:blip r:embed="rId4"/>
+          <a:stretch>
+            <a:fillRect/>
+          </a:stretch>
+        </p:blipFill>
+        <p:spPr>
+          <a:xfrm>
+            <a:off x="608965" y="4359275"/>
+            <a:ext cx="562610" cy="562610"/>
+          </a:xfrm>
+          <a:prstGeom prst="rect">
+            <a:avLst/>
+          </a:prstGeom>
+          <a:effectLst>
+            <a:glow rad="38100">
+              <a:schemeClr val="bg1"/>
+            </a:glow>
+          </a:effectLst>
+        </p:spPr>
+      </p:pic>
+      <p:pic>
+        <p:nvPicPr>
+          <p:cNvPr id="21" name="Espaço Reservado para Conteúdo 2"/>
+          <p:cNvPicPr>
+            <a:picLocks noChangeAspect="1"/>
+          </p:cNvPicPr>
+          <p:nvPr/>
+        </p:nvPicPr>
+        <p:blipFill>
+          <a:blip r:embed="rId4"/>
+          <a:stretch>
+            <a:fillRect/>
+          </a:stretch>
+        </p:blipFill>
+        <p:spPr>
+          <a:xfrm>
+            <a:off x="8352790" y="1603375"/>
+            <a:ext cx="562610" cy="562610"/>
+          </a:xfrm>
+          <a:prstGeom prst="rect">
+            <a:avLst/>
+          </a:prstGeom>
+          <a:effectLst>
+            <a:glow rad="38100">
+              <a:schemeClr val="bg1"/>
+            </a:glow>
+          </a:effectLst>
+        </p:spPr>
+      </p:pic>
+      <p:pic>
+        <p:nvPicPr>
+          <p:cNvPr id="22" name="Espaço Reservado para Conteúdo 2"/>
+          <p:cNvPicPr>
+            <a:picLocks noChangeAspect="1"/>
+          </p:cNvPicPr>
+          <p:nvPr/>
+        </p:nvPicPr>
+        <p:blipFill>
+          <a:blip r:embed="rId4"/>
+          <a:stretch>
+            <a:fillRect/>
+          </a:stretch>
+        </p:blipFill>
+        <p:spPr>
+          <a:xfrm>
+            <a:off x="8352790" y="2614930"/>
+            <a:ext cx="562610" cy="562610"/>
+          </a:xfrm>
+          <a:prstGeom prst="rect">
+            <a:avLst/>
+          </a:prstGeom>
+          <a:effectLst>
+            <a:glow rad="38100">
+              <a:schemeClr val="bg1"/>
+            </a:glow>
+          </a:effectLst>
+        </p:spPr>
+      </p:pic>
+      <p:pic>
+        <p:nvPicPr>
+          <p:cNvPr id="24" name="Espaço Reservado para Conteúdo 2"/>
+          <p:cNvPicPr>
+            <a:picLocks noChangeAspect="1"/>
+          </p:cNvPicPr>
+          <p:nvPr/>
+        </p:nvPicPr>
+        <p:blipFill>
+          <a:blip r:embed="rId4"/>
+          <a:stretch>
+            <a:fillRect/>
+          </a:stretch>
+        </p:blipFill>
+        <p:spPr>
+          <a:xfrm>
+            <a:off x="8352790" y="3699510"/>
+            <a:ext cx="562610" cy="562610"/>
+          </a:xfrm>
+          <a:prstGeom prst="rect">
+            <a:avLst/>
+          </a:prstGeom>
+          <a:effectLst>
+            <a:glow rad="38100">
+              <a:schemeClr val="bg1"/>
+            </a:glow>
+          </a:effectLst>
+        </p:spPr>
+      </p:pic>
+      <p:pic>
+        <p:nvPicPr>
+          <p:cNvPr id="25" name="Espaço Reservado para Conteúdo 2"/>
+          <p:cNvPicPr>
+            <a:picLocks noChangeAspect="1"/>
+          </p:cNvPicPr>
+          <p:nvPr/>
+        </p:nvPicPr>
+        <p:blipFill>
+          <a:blip r:embed="rId4"/>
+          <a:stretch>
+            <a:fillRect/>
+          </a:stretch>
+        </p:blipFill>
+        <p:spPr>
+          <a:xfrm>
+            <a:off x="8352790" y="4784090"/>
+            <a:ext cx="562610" cy="562610"/>
+          </a:xfrm>
+          <a:prstGeom prst="rect">
+            <a:avLst/>
+          </a:prstGeom>
+          <a:effectLst>
+            <a:glow rad="38100">
+              <a:schemeClr val="bg1"/>
+            </a:glow>
+          </a:effectLst>
+        </p:spPr>
+      </p:pic>
     </p:spTree>
   </p:cSld>
   <p:clrMapOvr>
@@ -5952,13 +6092,31 @@
       <p:grpSpPr/>
       <p:sp>
         <p:nvSpPr>
+          <p:cNvPr id="23" name="Título 22"/>
+          <p:cNvSpPr>
+            <a:spLocks noGrp="1"/>
+          </p:cNvSpPr>
+          <p:nvPr>
+            <p:ph type="title"/>
+          </p:nvPr>
+        </p:nvSpPr>
+        <p:spPr/>
+        <p:txBody>
+          <a:bodyPr/>
+          <a:p>
+            <a:endParaRPr lang="pt-BR" altLang="en-US"/>
+          </a:p>
+        </p:txBody>
+      </p:sp>
+      <p:sp>
+        <p:nvSpPr>
           <p:cNvPr id="5" name="Retângulo 4"/>
           <p:cNvSpPr/>
           <p:nvPr/>
         </p:nvSpPr>
         <p:spPr>
           <a:xfrm>
-            <a:off x="-38100" y="-27940"/>
+            <a:off x="-38735" y="-27940"/>
             <a:ext cx="12269470" cy="6885940"/>
           </a:xfrm>
           <a:prstGeom prst="rect">
@@ -6057,6 +6215,604 @@
           <a:prstGeom prst="rect">
             <a:avLst/>
           </a:prstGeom>
+        </p:spPr>
+      </p:pic>
+      <p:pic>
+        <p:nvPicPr>
+          <p:cNvPr id="7" name="Espaço Reservado para Conteúdo 6"/>
+          <p:cNvPicPr>
+            <a:picLocks noChangeAspect="1"/>
+          </p:cNvPicPr>
+          <p:nvPr>
+            <p:ph sz="half" idx="1"/>
+          </p:nvPr>
+        </p:nvPicPr>
+        <p:blipFill>
+          <a:blip r:embed="rId3">
+            <a:alphaModFix amt="50000"/>
+          </a:blip>
+          <a:srcRect t="3619"/>
+          <a:stretch>
+            <a:fillRect/>
+          </a:stretch>
+        </p:blipFill>
+        <p:spPr>
+          <a:xfrm>
+            <a:off x="3743325" y="886460"/>
+            <a:ext cx="4705985" cy="4427855"/>
+          </a:xfrm>
+          <a:prstGeom prst="rect">
+            <a:avLst/>
+          </a:prstGeom>
+          <a:noFill/>
+          <a:effectLst>
+            <a:glow rad="127000">
+              <a:schemeClr val="accent1">
+                <a:alpha val="0"/>
+              </a:schemeClr>
+            </a:glow>
+          </a:effectLst>
+        </p:spPr>
+      </p:pic>
+      <p:sp>
+        <p:nvSpPr>
+          <p:cNvPr id="3" name="Caixa de Texto 2"/>
+          <p:cNvSpPr txBox="1"/>
+          <p:nvPr/>
+        </p:nvSpPr>
+        <p:spPr>
+          <a:xfrm>
+            <a:off x="1574800" y="3020695"/>
+            <a:ext cx="1645920" cy="368300"/>
+          </a:xfrm>
+          <a:prstGeom prst="rect">
+            <a:avLst/>
+          </a:prstGeom>
+          <a:noFill/>
+        </p:spPr>
+        <p:txBody>
+          <a:bodyPr wrap="square" rtlCol="0">
+            <a:spAutoFit/>
+          </a:bodyPr>
+          <a:p>
+            <a:pPr algn="ctr"/>
+            <a:r>
+              <a:rPr lang="pt-BR" altLang="en-US" b="1">
+                <a:solidFill>
+                  <a:schemeClr val="bg1"/>
+                </a:solidFill>
+                <a:highlight>
+                  <a:srgbClr val="000000"/>
+                </a:highlight>
+                <a:latin typeface="Arial" panose="020B0604020202020204" pitchFamily="34" charset="0"/>
+                <a:cs typeface="Arial" panose="020B0604020202020204" pitchFamily="34" charset="0"/>
+                <a:hlinkClick r:id="rId4" tooltip="" action="ppaction://hlinkfile"/>
+              </a:rPr>
+              <a:t>REQUISITOS</a:t>
+            </a:r>
+            <a:endParaRPr lang="pt-BR" altLang="en-US" b="1">
+              <a:solidFill>
+                <a:schemeClr val="bg1"/>
+              </a:solidFill>
+              <a:highlight>
+                <a:srgbClr val="000000"/>
+              </a:highlight>
+              <a:latin typeface="Arial" panose="020B0604020202020204" pitchFamily="34" charset="0"/>
+              <a:cs typeface="Arial" panose="020B0604020202020204" pitchFamily="34" charset="0"/>
+              <a:hlinkClick r:id="rId4" tooltip="" action="ppaction://hlinkfile"/>
+            </a:endParaRPr>
+          </a:p>
+        </p:txBody>
+      </p:sp>
+      <p:sp>
+        <p:nvSpPr>
+          <p:cNvPr id="4" name="Caixa de Texto 3"/>
+          <p:cNvSpPr txBox="1"/>
+          <p:nvPr/>
+        </p:nvSpPr>
+        <p:spPr>
+          <a:xfrm>
+            <a:off x="1574800" y="3782695"/>
+            <a:ext cx="1645920" cy="583565"/>
+          </a:xfrm>
+          <a:prstGeom prst="rect">
+            <a:avLst/>
+          </a:prstGeom>
+          <a:noFill/>
+        </p:spPr>
+        <p:txBody>
+          <a:bodyPr wrap="square" rtlCol="0">
+            <a:spAutoFit/>
+          </a:bodyPr>
+          <a:p>
+            <a:pPr algn="ctr"/>
+            <a:r>
+              <a:rPr lang="pt-BR" altLang="en-US" sz="1600" b="1">
+                <a:solidFill>
+                  <a:schemeClr val="bg1"/>
+                </a:solidFill>
+                <a:highlight>
+                  <a:srgbClr val="000000"/>
+                </a:highlight>
+                <a:latin typeface="Arial" panose="020B0604020202020204" pitchFamily="34" charset="0"/>
+                <a:cs typeface="Arial" panose="020B0604020202020204" pitchFamily="34" charset="0"/>
+                <a:hlinkClick r:id="rId5" tooltip="" action="ppaction://hlinkfile"/>
+              </a:rPr>
+              <a:t>DICIONÁRIO DE DADOS</a:t>
+            </a:r>
+            <a:endParaRPr lang="pt-BR" altLang="en-US" sz="1600" b="1">
+              <a:solidFill>
+                <a:schemeClr val="bg1"/>
+              </a:solidFill>
+              <a:highlight>
+                <a:srgbClr val="000000"/>
+              </a:highlight>
+              <a:latin typeface="Arial" panose="020B0604020202020204" pitchFamily="34" charset="0"/>
+              <a:cs typeface="Arial" panose="020B0604020202020204" pitchFamily="34" charset="0"/>
+              <a:hlinkClick r:id="rId5" tooltip="" action="ppaction://hlinkfile"/>
+            </a:endParaRPr>
+          </a:p>
+        </p:txBody>
+      </p:sp>
+      <p:sp>
+        <p:nvSpPr>
+          <p:cNvPr id="6" name="Caixa de Texto 5"/>
+          <p:cNvSpPr txBox="1"/>
+          <p:nvPr/>
+        </p:nvSpPr>
+        <p:spPr>
+          <a:xfrm>
+            <a:off x="9746615" y="3020695"/>
+            <a:ext cx="1645920" cy="368300"/>
+          </a:xfrm>
+          <a:prstGeom prst="rect">
+            <a:avLst/>
+          </a:prstGeom>
+          <a:noFill/>
+        </p:spPr>
+        <p:txBody>
+          <a:bodyPr wrap="square" rtlCol="0">
+            <a:spAutoFit/>
+          </a:bodyPr>
+          <a:p>
+            <a:pPr algn="ctr"/>
+            <a:r>
+              <a:rPr lang="pt-BR" altLang="en-US" b="1">
+                <a:solidFill>
+                  <a:schemeClr val="bg1"/>
+                </a:solidFill>
+                <a:highlight>
+                  <a:srgbClr val="000000"/>
+                </a:highlight>
+                <a:latin typeface="Arial" panose="020B0604020202020204" pitchFamily="34" charset="0"/>
+                <a:cs typeface="Arial" panose="020B0604020202020204" pitchFamily="34" charset="0"/>
+                <a:hlinkClick r:id="rId6" tooltip="" action="ppaction://hlinkfile"/>
+              </a:rPr>
+              <a:t>MODELO ER</a:t>
+            </a:r>
+            <a:endParaRPr lang="pt-BR" altLang="en-US" b="1">
+              <a:solidFill>
+                <a:schemeClr val="bg1"/>
+              </a:solidFill>
+              <a:highlight>
+                <a:srgbClr val="000000"/>
+              </a:highlight>
+              <a:latin typeface="Arial" panose="020B0604020202020204" pitchFamily="34" charset="0"/>
+              <a:cs typeface="Arial" panose="020B0604020202020204" pitchFamily="34" charset="0"/>
+              <a:hlinkClick r:id="rId6" tooltip="" action="ppaction://hlinkfile"/>
+            </a:endParaRPr>
+          </a:p>
+        </p:txBody>
+      </p:sp>
+      <p:sp>
+        <p:nvSpPr>
+          <p:cNvPr id="8" name="Caixa de Texto 7"/>
+          <p:cNvSpPr txBox="1"/>
+          <p:nvPr/>
+        </p:nvSpPr>
+        <p:spPr>
+          <a:xfrm>
+            <a:off x="9746615" y="3890645"/>
+            <a:ext cx="1316355" cy="368300"/>
+          </a:xfrm>
+          <a:prstGeom prst="rect">
+            <a:avLst/>
+          </a:prstGeom>
+          <a:noFill/>
+        </p:spPr>
+        <p:txBody>
+          <a:bodyPr wrap="square" rtlCol="0">
+            <a:spAutoFit/>
+          </a:bodyPr>
+          <a:p>
+            <a:pPr algn="ctr"/>
+            <a:r>
+              <a:rPr lang="pt-BR" altLang="en-US" b="1">
+                <a:solidFill>
+                  <a:schemeClr val="bg1"/>
+                </a:solidFill>
+                <a:highlight>
+                  <a:srgbClr val="000000"/>
+                </a:highlight>
+                <a:latin typeface="Arial" panose="020B0604020202020204" pitchFamily="34" charset="0"/>
+                <a:cs typeface="Arial" panose="020B0604020202020204" pitchFamily="34" charset="0"/>
+                <a:hlinkClick r:id="rId7" tooltip="" action="ppaction://hlinkfile"/>
+              </a:rPr>
+              <a:t>SCRIPTS</a:t>
+            </a:r>
+            <a:endParaRPr lang="pt-BR" altLang="en-US" b="1">
+              <a:solidFill>
+                <a:schemeClr val="bg1"/>
+              </a:solidFill>
+              <a:highlight>
+                <a:srgbClr val="000000"/>
+              </a:highlight>
+              <a:latin typeface="Arial" panose="020B0604020202020204" pitchFamily="34" charset="0"/>
+              <a:cs typeface="Arial" panose="020B0604020202020204" pitchFamily="34" charset="0"/>
+              <a:hlinkClick r:id="rId7" tooltip="" action="ppaction://hlinkfile"/>
+            </a:endParaRPr>
+          </a:p>
+        </p:txBody>
+      </p:sp>
+      <p:pic>
+        <p:nvPicPr>
+          <p:cNvPr id="10" name="Espaço Reservado para Conteúdo 6"/>
+          <p:cNvPicPr>
+            <a:picLocks noChangeAspect="1"/>
+          </p:cNvPicPr>
+          <p:nvPr/>
+        </p:nvPicPr>
+        <p:blipFill>
+          <a:blip r:embed="rId3">
+            <a:alphaModFix amt="50000"/>
+          </a:blip>
+          <a:srcRect t="3619" b="73865"/>
+          <a:stretch>
+            <a:fillRect/>
+          </a:stretch>
+        </p:blipFill>
+        <p:spPr>
+          <a:xfrm>
+            <a:off x="3743325" y="5165725"/>
+            <a:ext cx="4705985" cy="1034415"/>
+          </a:xfrm>
+          <a:prstGeom prst="rect">
+            <a:avLst/>
+          </a:prstGeom>
+          <a:noFill/>
+          <a:effectLst>
+            <a:glow rad="127000">
+              <a:schemeClr val="accent1">
+                <a:alpha val="0"/>
+              </a:schemeClr>
+            </a:glow>
+          </a:effectLst>
+        </p:spPr>
+      </p:pic>
+      <p:sp>
+        <p:nvSpPr>
+          <p:cNvPr id="21" name="Caixa de Texto 20"/>
+          <p:cNvSpPr txBox="1"/>
+          <p:nvPr/>
+        </p:nvSpPr>
+        <p:spPr>
+          <a:xfrm>
+            <a:off x="5760000" y="1116000"/>
+            <a:ext cx="688340" cy="521970"/>
+          </a:xfrm>
+          <a:prstGeom prst="rect">
+            <a:avLst/>
+          </a:prstGeom>
+          <a:noFill/>
+        </p:spPr>
+        <p:txBody>
+          <a:bodyPr wrap="square" rtlCol="0">
+            <a:spAutoFit/>
+          </a:bodyPr>
+          <a:p>
+            <a:pPr algn="ctr"/>
+            <a:r>
+              <a:rPr lang="pt-BR" altLang="en-US" sz="2800" b="1">
+                <a:solidFill>
+                  <a:schemeClr val="bg1"/>
+                </a:solidFill>
+                <a:latin typeface="Arial" panose="020B0604020202020204" pitchFamily="34" charset="0"/>
+                <a:cs typeface="Arial" panose="020B0604020202020204" pitchFamily="34" charset="0"/>
+              </a:rPr>
+              <a:t>L</a:t>
+            </a:r>
+            <a:endParaRPr lang="pt-BR" altLang="en-US" sz="2800" b="1">
+              <a:solidFill>
+                <a:schemeClr val="bg1"/>
+              </a:solidFill>
+              <a:latin typeface="Arial" panose="020B0604020202020204" pitchFamily="34" charset="0"/>
+              <a:cs typeface="Arial" panose="020B0604020202020204" pitchFamily="34" charset="0"/>
+            </a:endParaRPr>
+          </a:p>
+        </p:txBody>
+      </p:sp>
+      <p:sp>
+        <p:nvSpPr>
+          <p:cNvPr id="22" name="Caixa de Texto 21"/>
+          <p:cNvSpPr txBox="1"/>
+          <p:nvPr/>
+        </p:nvSpPr>
+        <p:spPr>
+          <a:xfrm>
+            <a:off x="5752465" y="2190115"/>
+            <a:ext cx="688340" cy="521970"/>
+          </a:xfrm>
+          <a:prstGeom prst="rect">
+            <a:avLst/>
+          </a:prstGeom>
+          <a:noFill/>
+        </p:spPr>
+        <p:txBody>
+          <a:bodyPr wrap="square" rtlCol="0">
+            <a:spAutoFit/>
+          </a:bodyPr>
+          <a:p>
+            <a:pPr algn="ctr"/>
+            <a:r>
+              <a:rPr lang="pt-BR" altLang="en-US" sz="2800" b="1">
+                <a:solidFill>
+                  <a:schemeClr val="bg1"/>
+                </a:solidFill>
+                <a:latin typeface="Arial" panose="020B0604020202020204" pitchFamily="34" charset="0"/>
+                <a:cs typeface="Arial" panose="020B0604020202020204" pitchFamily="34" charset="0"/>
+              </a:rPr>
+              <a:t>I</a:t>
+            </a:r>
+            <a:endParaRPr lang="pt-BR" altLang="en-US" sz="2800" b="1">
+              <a:solidFill>
+                <a:schemeClr val="bg1"/>
+              </a:solidFill>
+              <a:latin typeface="Arial" panose="020B0604020202020204" pitchFamily="34" charset="0"/>
+              <a:cs typeface="Arial" panose="020B0604020202020204" pitchFamily="34" charset="0"/>
+            </a:endParaRPr>
+          </a:p>
+        </p:txBody>
+      </p:sp>
+      <p:sp>
+        <p:nvSpPr>
+          <p:cNvPr id="24" name="Caixa de Texto 23"/>
+          <p:cNvSpPr txBox="1"/>
+          <p:nvPr/>
+        </p:nvSpPr>
+        <p:spPr>
+          <a:xfrm>
+            <a:off x="5752465" y="3318510"/>
+            <a:ext cx="688340" cy="521970"/>
+          </a:xfrm>
+          <a:prstGeom prst="rect">
+            <a:avLst/>
+          </a:prstGeom>
+          <a:noFill/>
+        </p:spPr>
+        <p:txBody>
+          <a:bodyPr wrap="square" rtlCol="0">
+            <a:spAutoFit/>
+          </a:bodyPr>
+          <a:p>
+            <a:pPr algn="ctr"/>
+            <a:r>
+              <a:rPr lang="pt-BR" altLang="en-US" sz="2800" b="1">
+                <a:solidFill>
+                  <a:schemeClr val="bg1"/>
+                </a:solidFill>
+                <a:latin typeface="Arial" panose="020B0604020202020204" pitchFamily="34" charset="0"/>
+                <a:cs typeface="Arial" panose="020B0604020202020204" pitchFamily="34" charset="0"/>
+              </a:rPr>
+              <a:t>N</a:t>
+            </a:r>
+            <a:endParaRPr lang="pt-BR" altLang="en-US" sz="2800" b="1">
+              <a:solidFill>
+                <a:schemeClr val="bg1"/>
+              </a:solidFill>
+              <a:latin typeface="Arial" panose="020B0604020202020204" pitchFamily="34" charset="0"/>
+              <a:cs typeface="Arial" panose="020B0604020202020204" pitchFamily="34" charset="0"/>
+            </a:endParaRPr>
+          </a:p>
+        </p:txBody>
+      </p:sp>
+      <p:sp>
+        <p:nvSpPr>
+          <p:cNvPr id="25" name="Caixa de Texto 24"/>
+          <p:cNvSpPr txBox="1"/>
+          <p:nvPr/>
+        </p:nvSpPr>
+        <p:spPr>
+          <a:xfrm>
+            <a:off x="5751830" y="4368800"/>
+            <a:ext cx="688340" cy="521970"/>
+          </a:xfrm>
+          <a:prstGeom prst="rect">
+            <a:avLst/>
+          </a:prstGeom>
+          <a:noFill/>
+        </p:spPr>
+        <p:txBody>
+          <a:bodyPr wrap="square" rtlCol="0">
+            <a:spAutoFit/>
+          </a:bodyPr>
+          <a:p>
+            <a:pPr algn="ctr"/>
+            <a:r>
+              <a:rPr lang="pt-BR" altLang="en-US" sz="2800" b="1">
+                <a:solidFill>
+                  <a:schemeClr val="bg1"/>
+                </a:solidFill>
+                <a:latin typeface="Arial" panose="020B0604020202020204" pitchFamily="34" charset="0"/>
+                <a:cs typeface="Arial" panose="020B0604020202020204" pitchFamily="34" charset="0"/>
+              </a:rPr>
+              <a:t>K</a:t>
+            </a:r>
+            <a:endParaRPr lang="pt-BR" altLang="en-US" sz="2800" b="1">
+              <a:solidFill>
+                <a:schemeClr val="bg1"/>
+              </a:solidFill>
+              <a:latin typeface="Arial" panose="020B0604020202020204" pitchFamily="34" charset="0"/>
+              <a:cs typeface="Arial" panose="020B0604020202020204" pitchFamily="34" charset="0"/>
+            </a:endParaRPr>
+          </a:p>
+        </p:txBody>
+      </p:sp>
+      <p:sp>
+        <p:nvSpPr>
+          <p:cNvPr id="28" name="Caixa de Texto 27"/>
+          <p:cNvSpPr txBox="1"/>
+          <p:nvPr/>
+        </p:nvSpPr>
+        <p:spPr>
+          <a:xfrm>
+            <a:off x="5751830" y="5419090"/>
+            <a:ext cx="688340" cy="521970"/>
+          </a:xfrm>
+          <a:prstGeom prst="rect">
+            <a:avLst/>
+          </a:prstGeom>
+          <a:noFill/>
+        </p:spPr>
+        <p:txBody>
+          <a:bodyPr wrap="square" rtlCol="0">
+            <a:spAutoFit/>
+          </a:bodyPr>
+          <a:p>
+            <a:pPr algn="ctr"/>
+            <a:r>
+              <a:rPr lang="pt-BR" altLang="en-US" sz="2800" b="1">
+                <a:solidFill>
+                  <a:schemeClr val="bg1"/>
+                </a:solidFill>
+                <a:latin typeface="Arial" panose="020B0604020202020204" pitchFamily="34" charset="0"/>
+                <a:cs typeface="Arial" panose="020B0604020202020204" pitchFamily="34" charset="0"/>
+              </a:rPr>
+              <a:t>S</a:t>
+            </a:r>
+            <a:endParaRPr lang="pt-BR" altLang="en-US" sz="2800" b="1">
+              <a:solidFill>
+                <a:schemeClr val="bg1"/>
+              </a:solidFill>
+              <a:latin typeface="Arial" panose="020B0604020202020204" pitchFamily="34" charset="0"/>
+              <a:cs typeface="Arial" panose="020B0604020202020204" pitchFamily="34" charset="0"/>
+            </a:endParaRPr>
+          </a:p>
+        </p:txBody>
+      </p:sp>
+      <p:pic>
+        <p:nvPicPr>
+          <p:cNvPr id="30" name="Imagem 29"/>
+          <p:cNvPicPr>
+            <a:picLocks noChangeAspect="1"/>
+          </p:cNvPicPr>
+          <p:nvPr/>
+        </p:nvPicPr>
+        <p:blipFill>
+          <a:blip r:embed="rId8"/>
+          <a:stretch>
+            <a:fillRect/>
+          </a:stretch>
+        </p:blipFill>
+        <p:spPr>
+          <a:xfrm>
+            <a:off x="662305" y="2712085"/>
+            <a:ext cx="770890" cy="770890"/>
+          </a:xfrm>
+          <a:prstGeom prst="rect">
+            <a:avLst/>
+          </a:prstGeom>
+          <a:effectLst>
+            <a:glow rad="50800">
+              <a:schemeClr val="bg1"/>
+            </a:glow>
+          </a:effectLst>
+        </p:spPr>
+      </p:pic>
+      <p:pic>
+        <p:nvPicPr>
+          <p:cNvPr id="41" name="Imagem 40"/>
+          <p:cNvPicPr>
+            <a:picLocks noChangeAspect="1"/>
+          </p:cNvPicPr>
+          <p:nvPr/>
+        </p:nvPicPr>
+        <p:blipFill>
+          <a:blip r:embed="rId8"/>
+          <a:stretch>
+            <a:fillRect/>
+          </a:stretch>
+        </p:blipFill>
+        <p:spPr>
+          <a:xfrm>
+            <a:off x="662305" y="3595370"/>
+            <a:ext cx="770890" cy="770890"/>
+          </a:xfrm>
+          <a:prstGeom prst="rect">
+            <a:avLst/>
+          </a:prstGeom>
+          <a:effectLst>
+            <a:glow rad="50800">
+              <a:schemeClr val="bg1"/>
+            </a:glow>
+          </a:effectLst>
+        </p:spPr>
+      </p:pic>
+      <p:pic>
+        <p:nvPicPr>
+          <p:cNvPr id="43" name="Imagem 42"/>
+          <p:cNvPicPr>
+            <a:picLocks noChangeAspect="1"/>
+          </p:cNvPicPr>
+          <p:nvPr/>
+        </p:nvPicPr>
+        <p:blipFill>
+          <a:blip r:embed="rId8"/>
+          <a:stretch>
+            <a:fillRect/>
+          </a:stretch>
+        </p:blipFill>
+        <p:spPr>
+          <a:xfrm>
+            <a:off x="8827135" y="2712085"/>
+            <a:ext cx="770890" cy="770890"/>
+          </a:xfrm>
+          <a:prstGeom prst="rect">
+            <a:avLst/>
+          </a:prstGeom>
+          <a:effectLst>
+            <a:glow rad="50800">
+              <a:schemeClr val="bg1"/>
+            </a:glow>
+          </a:effectLst>
+        </p:spPr>
+      </p:pic>
+      <p:pic>
+        <p:nvPicPr>
+          <p:cNvPr id="44" name="Imagem 43"/>
+          <p:cNvPicPr>
+            <a:picLocks noChangeAspect="1"/>
+          </p:cNvPicPr>
+          <p:nvPr/>
+        </p:nvPicPr>
+        <p:blipFill>
+          <a:blip r:embed="rId8"/>
+          <a:stretch>
+            <a:fillRect/>
+          </a:stretch>
+        </p:blipFill>
+        <p:spPr>
+          <a:xfrm>
+            <a:off x="8827135" y="3595370"/>
+            <a:ext cx="770890" cy="770890"/>
+          </a:xfrm>
+          <a:prstGeom prst="rect">
+            <a:avLst/>
+          </a:prstGeom>
+          <a:effectLst>
+            <a:glow rad="50800">
+              <a:schemeClr val="bg1"/>
+            </a:glow>
+          </a:effectLst>
         </p:spPr>
       </p:pic>
     </p:spTree>
@@ -6092,7 +6848,7 @@
         </p:nvSpPr>
         <p:spPr>
           <a:xfrm>
-            <a:off x="-38100" y="-27940"/>
+            <a:off x="-38735" y="-27940"/>
             <a:ext cx="12269470" cy="6885940"/>
           </a:xfrm>
           <a:prstGeom prst="rect">
@@ -6193,6 +6949,120 @@
           </a:prstGeom>
         </p:spPr>
       </p:pic>
+      <p:pic>
+        <p:nvPicPr>
+          <p:cNvPr id="7" name="Espaço Reservado para Conteúdo 6"/>
+          <p:cNvPicPr>
+            <a:picLocks noChangeAspect="1"/>
+          </p:cNvPicPr>
+          <p:nvPr>
+            <p:ph sz="half" idx="1"/>
+          </p:nvPr>
+        </p:nvPicPr>
+        <p:blipFill>
+          <a:blip r:embed="rId3">
+            <a:alphaModFix amt="15000"/>
+          </a:blip>
+          <a:srcRect t="3619" b="33211"/>
+          <a:stretch>
+            <a:fillRect/>
+          </a:stretch>
+        </p:blipFill>
+        <p:spPr>
+          <a:xfrm>
+            <a:off x="3996690" y="4097655"/>
+            <a:ext cx="4197985" cy="2751455"/>
+          </a:xfrm>
+          <a:prstGeom prst="rect">
+            <a:avLst/>
+          </a:prstGeom>
+          <a:noFill/>
+          <a:effectLst>
+            <a:glow rad="38100">
+              <a:schemeClr val="bg1">
+                <a:alpha val="0"/>
+              </a:schemeClr>
+            </a:glow>
+          </a:effectLst>
+        </p:spPr>
+      </p:pic>
+      <p:pic>
+        <p:nvPicPr>
+          <p:cNvPr id="2" name="Espaço Reservado para Conteúdo 6"/>
+          <p:cNvPicPr>
+            <a:picLocks noChangeAspect="1"/>
+          </p:cNvPicPr>
+          <p:nvPr/>
+        </p:nvPicPr>
+        <p:blipFill>
+          <a:blip r:embed="rId3">
+            <a:alphaModFix amt="15000"/>
+          </a:blip>
+          <a:srcRect t="3619"/>
+          <a:stretch>
+            <a:fillRect/>
+          </a:stretch>
+        </p:blipFill>
+        <p:spPr>
+          <a:xfrm>
+            <a:off x="3996690" y="0"/>
+            <a:ext cx="4197985" cy="4197985"/>
+          </a:xfrm>
+          <a:prstGeom prst="rect">
+            <a:avLst/>
+          </a:prstGeom>
+          <a:noFill/>
+          <a:effectLst>
+            <a:glow rad="38100">
+              <a:schemeClr val="bg1">
+                <a:alpha val="0"/>
+              </a:schemeClr>
+            </a:glow>
+          </a:effectLst>
+        </p:spPr>
+      </p:pic>
+      <p:sp>
+        <p:nvSpPr>
+          <p:cNvPr id="4" name="Caixa de Texto 3"/>
+          <p:cNvSpPr txBox="1"/>
+          <p:nvPr/>
+        </p:nvSpPr>
+        <p:spPr>
+          <a:xfrm>
+            <a:off x="2708910" y="2459990"/>
+            <a:ext cx="6773545" cy="1938020"/>
+          </a:xfrm>
+          <a:prstGeom prst="rect">
+            <a:avLst/>
+          </a:prstGeom>
+          <a:noFill/>
+        </p:spPr>
+        <p:txBody>
+          <a:bodyPr wrap="square" rtlCol="0">
+            <a:spAutoFit/>
+          </a:bodyPr>
+          <a:p>
+            <a:pPr algn="ctr"/>
+            <a:r>
+              <a:rPr lang="pt-BR" altLang="en-US" sz="6000" b="1">
+                <a:solidFill>
+                  <a:schemeClr val="bg1"/>
+                </a:solidFill>
+                <a:latin typeface="Arial" panose="020B0604020202020204" pitchFamily="34" charset="0"/>
+                <a:cs typeface="Arial" panose="020B0604020202020204" pitchFamily="34" charset="0"/>
+              </a:rPr>
+              <a:t>OBRIGADO PELA ATENÇÃO!</a:t>
+            </a:r>
+            <a:endParaRPr lang="pt-BR" altLang="en-US" sz="6000" b="1">
+              <a:solidFill>
+                <a:schemeClr val="bg1"/>
+              </a:solidFill>
+              <a:latin typeface="Arial" panose="020B0604020202020204" pitchFamily="34" charset="0"/>
+              <a:cs typeface="Arial" panose="020B0604020202020204" pitchFamily="34" charset="0"/>
+            </a:endParaRPr>
+          </a:p>
+        </p:txBody>
+      </p:sp>
     </p:spTree>
   </p:cSld>
   <p:clrMapOvr>

</xml_diff>

<commit_message>
Adicionado Selects na Apresentação.pptx
</commit_message>
<xml_diff>
--- a/docs/Apresentação.pptx
+++ b/docs/Apresentação.pptx
@@ -8,14 +8,18 @@
     <p:notesMasterId r:id="rId4"/>
   </p:notesMasterIdLst>
   <p:handoutMasterIdLst>
-    <p:handoutMasterId r:id="rId9"/>
+    <p:handoutMasterId r:id="rId13"/>
   </p:handoutMasterIdLst>
   <p:sldIdLst>
     <p:sldId id="256" r:id="rId3"/>
     <p:sldId id="258" r:id="rId5"/>
     <p:sldId id="264" r:id="rId6"/>
-    <p:sldId id="268" r:id="rId7"/>
-    <p:sldId id="262" r:id="rId8"/>
+    <p:sldId id="270" r:id="rId7"/>
+    <p:sldId id="271" r:id="rId8"/>
+    <p:sldId id="273" r:id="rId9"/>
+    <p:sldId id="274" r:id="rId10"/>
+    <p:sldId id="268" r:id="rId11"/>
+    <p:sldId id="262" r:id="rId12"/>
   </p:sldIdLst>
   <p:sldSz cx="12192000" cy="6858000"/>
   <p:notesSz cx="7103745" cy="10234295"/>
@@ -3974,7 +3978,7 @@
         <p:spPr>
           <a:xfrm>
             <a:off x="-38735" y="-36195"/>
-            <a:ext cx="12269470" cy="6885940"/>
+            <a:ext cx="12269470" cy="6894195"/>
           </a:xfrm>
           <a:prstGeom prst="rect">
             <a:avLst/>
@@ -6092,24 +6096,6 @@
       <p:grpSpPr/>
       <p:sp>
         <p:nvSpPr>
-          <p:cNvPr id="23" name="Título 22"/>
-          <p:cNvSpPr>
-            <a:spLocks noGrp="1"/>
-          </p:cNvSpPr>
-          <p:nvPr>
-            <p:ph type="title"/>
-          </p:nvPr>
-        </p:nvSpPr>
-        <p:spPr/>
-        <p:txBody>
-          <a:bodyPr/>
-          <a:p>
-            <a:endParaRPr lang="pt-BR" altLang="en-US"/>
-          </a:p>
-        </p:txBody>
-      </p:sp>
-      <p:sp>
-        <p:nvSpPr>
           <p:cNvPr id="5" name="Retângulo 4"/>
           <p:cNvSpPr/>
           <p:nvPr/>
@@ -6219,14 +6205,14 @@
       </p:pic>
       <p:sp>
         <p:nvSpPr>
-          <p:cNvPr id="3" name="Caixa de Texto 2"/>
+          <p:cNvPr id="6" name="Caixa de Texto 5"/>
           <p:cNvSpPr txBox="1"/>
           <p:nvPr/>
         </p:nvSpPr>
         <p:spPr>
           <a:xfrm>
-            <a:off x="1574800" y="3020695"/>
-            <a:ext cx="1645920" cy="368300"/>
+            <a:off x="284480" y="2790190"/>
+            <a:ext cx="3867150" cy="2306955"/>
           </a:xfrm>
           <a:prstGeom prst="rect">
             <a:avLst/>
@@ -6244,39 +6230,31 @@
                 <a:solidFill>
                   <a:schemeClr val="bg1"/>
                 </a:solidFill>
-                <a:highlight>
-                  <a:srgbClr val="000000"/>
-                </a:highlight>
-                <a:latin typeface="Arial" panose="020B0604020202020204" pitchFamily="34" charset="0"/>
-                <a:cs typeface="Arial" panose="020B0604020202020204" pitchFamily="34" charset="0"/>
-                <a:hlinkClick r:id="rId3" action="ppaction://hlinkfile"/>
-              </a:rPr>
-              <a:t>REQUISITOS</a:t>
+                <a:latin typeface="Arial" panose="020B0604020202020204" pitchFamily="34" charset="0"/>
+                <a:cs typeface="Arial" panose="020B0604020202020204" pitchFamily="34" charset="0"/>
+              </a:rPr>
+              <a:t>Relação com código da locomotiva, capacidade de carga máxima. Relacionar locomotivas fabricadas a partir de 1990. Ordene o relatório da locomotiva com maior capacidade para a locomotiva com menor capacidade.</a:t>
             </a:r>
             <a:endParaRPr lang="pt-BR" altLang="en-US" b="1">
               <a:solidFill>
                 <a:schemeClr val="bg1"/>
               </a:solidFill>
-              <a:highlight>
-                <a:srgbClr val="000000"/>
-              </a:highlight>
-              <a:latin typeface="Arial" panose="020B0604020202020204" pitchFamily="34" charset="0"/>
-              <a:cs typeface="Arial" panose="020B0604020202020204" pitchFamily="34" charset="0"/>
-              <a:hlinkClick r:id="rId3" action="ppaction://hlinkfile"/>
-            </a:endParaRPr>
-          </a:p>
-        </p:txBody>
-      </p:sp>
-      <p:sp>
-        <p:nvSpPr>
-          <p:cNvPr id="4" name="Caixa de Texto 3"/>
+              <a:latin typeface="Arial" panose="020B0604020202020204" pitchFamily="34" charset="0"/>
+              <a:cs typeface="Arial" panose="020B0604020202020204" pitchFamily="34" charset="0"/>
+            </a:endParaRPr>
+          </a:p>
+        </p:txBody>
+      </p:sp>
+      <p:sp>
+        <p:nvSpPr>
+          <p:cNvPr id="8" name="Caixa de Texto 7"/>
           <p:cNvSpPr txBox="1"/>
           <p:nvPr/>
         </p:nvSpPr>
         <p:spPr>
           <a:xfrm>
-            <a:off x="1574800" y="3782695"/>
-            <a:ext cx="1645920" cy="583565"/>
+            <a:off x="7927340" y="2651125"/>
+            <a:ext cx="4004945" cy="2584450"/>
           </a:xfrm>
           <a:prstGeom prst="rect">
             <a:avLst/>
@@ -6290,53 +6268,33 @@
           <a:p>
             <a:pPr algn="ctr"/>
             <a:r>
-              <a:rPr lang="pt-BR" altLang="en-US" sz="1600" b="1">
-                <a:solidFill>
-                  <a:schemeClr val="bg1"/>
-                </a:solidFill>
-                <a:highlight>
-                  <a:srgbClr val="000000"/>
-                </a:highlight>
-                <a:latin typeface="Arial" panose="020B0604020202020204" pitchFamily="34" charset="0"/>
-                <a:cs typeface="Arial" panose="020B0604020202020204" pitchFamily="34" charset="0"/>
-                <a:hlinkClick r:id="rId4" action="ppaction://hlinkfile"/>
-              </a:rPr>
-              <a:t>DICIONÁRIO DE DADOS</a:t>
-            </a:r>
-            <a:endParaRPr lang="pt-BR" altLang="en-US" sz="1600" b="1">
-              <a:solidFill>
-                <a:schemeClr val="bg1"/>
-              </a:solidFill>
-              <a:highlight>
-                <a:srgbClr val="000000"/>
-              </a:highlight>
-              <a:latin typeface="Arial" panose="020B0604020202020204" pitchFamily="34" charset="0"/>
-              <a:cs typeface="Arial" panose="020B0604020202020204" pitchFamily="34" charset="0"/>
-              <a:hlinkClick r:id="rId4" action="ppaction://hlinkfile"/>
-            </a:endParaRPr>
-          </a:p>
-        </p:txBody>
-      </p:sp>
-      <p:sp>
-        <p:nvSpPr>
-          <p:cNvPr id="6" name="Caixa de Texto 5"/>
-          <p:cNvSpPr txBox="1"/>
-          <p:nvPr/>
-        </p:nvSpPr>
-        <p:spPr>
-          <a:xfrm>
-            <a:off x="9746615" y="3020695"/>
-            <a:ext cx="1645920" cy="368300"/>
-          </a:xfrm>
-          <a:prstGeom prst="rect">
-            <a:avLst/>
-          </a:prstGeom>
-          <a:noFill/>
-        </p:spPr>
-        <p:txBody>
-          <a:bodyPr wrap="square" rtlCol="0">
-            <a:spAutoFit/>
-          </a:bodyPr>
+              <a:rPr lang="pt-BR" altLang="en-US" b="1">
+                <a:solidFill>
+                  <a:schemeClr val="bg1"/>
+                </a:solidFill>
+                <a:latin typeface="Arial" panose="020B0604020202020204" pitchFamily="34" charset="0"/>
+                <a:cs typeface="Arial" panose="020B0604020202020204" pitchFamily="34" charset="0"/>
+              </a:rPr>
+              <a:t>SELECT</a:t>
+            </a:r>
+            <a:r>
+              <a:rPr lang="pt-BR" altLang="en-US">
+                <a:solidFill>
+                  <a:schemeClr val="bg1"/>
+                </a:solidFill>
+                <a:latin typeface="Arial" panose="020B0604020202020204" pitchFamily="34" charset="0"/>
+                <a:cs typeface="Arial" panose="020B0604020202020204" pitchFamily="34" charset="0"/>
+              </a:rPr>
+              <a:t> l.id_locomotiva "ID", l.tx_modelo "Modelo" , l.vl_capacidadecarga "Capacidade de carga", l.an_anofabricacao "Ano de fabricação"</a:t>
+            </a:r>
+            <a:endParaRPr lang="pt-BR" altLang="en-US">
+              <a:solidFill>
+                <a:schemeClr val="bg1"/>
+              </a:solidFill>
+              <a:latin typeface="Arial" panose="020B0604020202020204" pitchFamily="34" charset="0"/>
+              <a:cs typeface="Arial" panose="020B0604020202020204" pitchFamily="34" charset="0"/>
+            </a:endParaRPr>
+          </a:p>
           <a:p>
             <a:pPr algn="ctr"/>
             <a:r>
@@ -6344,49 +6302,29 @@
                 <a:solidFill>
                   <a:schemeClr val="bg1"/>
                 </a:solidFill>
-                <a:highlight>
-                  <a:srgbClr val="000000"/>
-                </a:highlight>
-                <a:latin typeface="Arial" panose="020B0604020202020204" pitchFamily="34" charset="0"/>
-                <a:cs typeface="Arial" panose="020B0604020202020204" pitchFamily="34" charset="0"/>
-                <a:hlinkClick r:id="rId5" action="ppaction://hlinkfile"/>
-              </a:rPr>
-              <a:t>MODELO ER</a:t>
-            </a:r>
-            <a:endParaRPr lang="pt-BR" altLang="en-US" b="1">
-              <a:solidFill>
-                <a:schemeClr val="bg1"/>
-              </a:solidFill>
-              <a:highlight>
-                <a:srgbClr val="000000"/>
-              </a:highlight>
-              <a:latin typeface="Arial" panose="020B0604020202020204" pitchFamily="34" charset="0"/>
-              <a:cs typeface="Arial" panose="020B0604020202020204" pitchFamily="34" charset="0"/>
-              <a:hlinkClick r:id="rId5" action="ppaction://hlinkfile"/>
-            </a:endParaRPr>
-          </a:p>
-        </p:txBody>
-      </p:sp>
-      <p:sp>
-        <p:nvSpPr>
-          <p:cNvPr id="8" name="Caixa de Texto 7"/>
-          <p:cNvSpPr txBox="1"/>
-          <p:nvPr/>
-        </p:nvSpPr>
-        <p:spPr>
-          <a:xfrm>
-            <a:off x="9746615" y="3890645"/>
-            <a:ext cx="1316355" cy="368300"/>
-          </a:xfrm>
-          <a:prstGeom prst="rect">
-            <a:avLst/>
-          </a:prstGeom>
-          <a:noFill/>
-        </p:spPr>
-        <p:txBody>
-          <a:bodyPr wrap="square" rtlCol="0">
-            <a:spAutoFit/>
-          </a:bodyPr>
+                <a:latin typeface="Arial" panose="020B0604020202020204" pitchFamily="34" charset="0"/>
+                <a:cs typeface="Arial" panose="020B0604020202020204" pitchFamily="34" charset="0"/>
+              </a:rPr>
+              <a:t>FROM</a:t>
+            </a:r>
+            <a:r>
+              <a:rPr lang="pt-BR" altLang="en-US">
+                <a:solidFill>
+                  <a:schemeClr val="bg1"/>
+                </a:solidFill>
+                <a:latin typeface="Arial" panose="020B0604020202020204" pitchFamily="34" charset="0"/>
+                <a:cs typeface="Arial" panose="020B0604020202020204" pitchFamily="34" charset="0"/>
+              </a:rPr>
+              <a:t> locomotiva l</a:t>
+            </a:r>
+            <a:endParaRPr lang="pt-BR" altLang="en-US">
+              <a:solidFill>
+                <a:schemeClr val="bg1"/>
+              </a:solidFill>
+              <a:latin typeface="Arial" panose="020B0604020202020204" pitchFamily="34" charset="0"/>
+              <a:cs typeface="Arial" panose="020B0604020202020204" pitchFamily="34" charset="0"/>
+            </a:endParaRPr>
+          </a:p>
           <a:p>
             <a:pPr algn="ctr"/>
             <a:r>
@@ -6394,145 +6332,61 @@
                 <a:solidFill>
                   <a:schemeClr val="bg1"/>
                 </a:solidFill>
-                <a:highlight>
-                  <a:srgbClr val="000000"/>
-                </a:highlight>
-                <a:latin typeface="Arial" panose="020B0604020202020204" pitchFamily="34" charset="0"/>
-                <a:cs typeface="Arial" panose="020B0604020202020204" pitchFamily="34" charset="0"/>
-                <a:hlinkClick r:id="rId6" action="ppaction://hlinkfile"/>
-              </a:rPr>
-              <a:t>SCRIPTS</a:t>
-            </a:r>
-            <a:endParaRPr lang="pt-BR" altLang="en-US" b="1">
-              <a:solidFill>
-                <a:schemeClr val="bg1"/>
-              </a:solidFill>
-              <a:highlight>
-                <a:srgbClr val="000000"/>
-              </a:highlight>
-              <a:latin typeface="Arial" panose="020B0604020202020204" pitchFamily="34" charset="0"/>
-              <a:cs typeface="Arial" panose="020B0604020202020204" pitchFamily="34" charset="0"/>
-              <a:hlinkClick r:id="rId6" action="ppaction://hlinkfile"/>
-            </a:endParaRPr>
-          </a:p>
-        </p:txBody>
-      </p:sp>
-      <p:pic>
-        <p:nvPicPr>
-          <p:cNvPr id="30" name="Imagem 29"/>
-          <p:cNvPicPr>
-            <a:picLocks noChangeAspect="1"/>
-          </p:cNvPicPr>
-          <p:nvPr/>
-        </p:nvPicPr>
-        <p:blipFill>
-          <a:blip r:embed="rId7"/>
-          <a:stretch>
-            <a:fillRect/>
-          </a:stretch>
-        </p:blipFill>
-        <p:spPr>
-          <a:xfrm>
-            <a:off x="662305" y="2712085"/>
-            <a:ext cx="770890" cy="770890"/>
-          </a:xfrm>
-          <a:prstGeom prst="rect">
-            <a:avLst/>
-          </a:prstGeom>
-          <a:effectLst>
-            <a:glow rad="50800">
-              <a:schemeClr val="bg1"/>
-            </a:glow>
-          </a:effectLst>
-        </p:spPr>
-      </p:pic>
-      <p:pic>
-        <p:nvPicPr>
-          <p:cNvPr id="41" name="Imagem 40"/>
-          <p:cNvPicPr>
-            <a:picLocks noChangeAspect="1"/>
-          </p:cNvPicPr>
-          <p:nvPr/>
-        </p:nvPicPr>
-        <p:blipFill>
-          <a:blip r:embed="rId7"/>
-          <a:stretch>
-            <a:fillRect/>
-          </a:stretch>
-        </p:blipFill>
-        <p:spPr>
-          <a:xfrm>
-            <a:off x="662305" y="3595370"/>
-            <a:ext cx="770890" cy="770890"/>
-          </a:xfrm>
-          <a:prstGeom prst="rect">
-            <a:avLst/>
-          </a:prstGeom>
-          <a:effectLst>
-            <a:glow rad="50800">
-              <a:schemeClr val="bg1"/>
-            </a:glow>
-          </a:effectLst>
-        </p:spPr>
-      </p:pic>
-      <p:pic>
-        <p:nvPicPr>
-          <p:cNvPr id="43" name="Imagem 42"/>
-          <p:cNvPicPr>
-            <a:picLocks noChangeAspect="1"/>
-          </p:cNvPicPr>
-          <p:nvPr/>
-        </p:nvPicPr>
-        <p:blipFill>
-          <a:blip r:embed="rId7"/>
-          <a:stretch>
-            <a:fillRect/>
-          </a:stretch>
-        </p:blipFill>
-        <p:spPr>
-          <a:xfrm>
-            <a:off x="8827135" y="2712085"/>
-            <a:ext cx="770890" cy="770890"/>
-          </a:xfrm>
-          <a:prstGeom prst="rect">
-            <a:avLst/>
-          </a:prstGeom>
-          <a:effectLst>
-            <a:glow rad="50800">
-              <a:schemeClr val="bg1"/>
-            </a:glow>
-          </a:effectLst>
-        </p:spPr>
-      </p:pic>
-      <p:pic>
-        <p:nvPicPr>
-          <p:cNvPr id="44" name="Imagem 43"/>
-          <p:cNvPicPr>
-            <a:picLocks noChangeAspect="1"/>
-          </p:cNvPicPr>
-          <p:nvPr/>
-        </p:nvPicPr>
-        <p:blipFill>
-          <a:blip r:embed="rId7"/>
-          <a:stretch>
-            <a:fillRect/>
-          </a:stretch>
-        </p:blipFill>
-        <p:spPr>
-          <a:xfrm>
-            <a:off x="8827135" y="3595370"/>
-            <a:ext cx="770890" cy="770890"/>
-          </a:xfrm>
-          <a:prstGeom prst="rect">
-            <a:avLst/>
-          </a:prstGeom>
-          <a:effectLst>
-            <a:glow rad="50800">
-              <a:schemeClr val="bg1"/>
-            </a:glow>
-          </a:effectLst>
-        </p:spPr>
-      </p:pic>
+                <a:latin typeface="Arial" panose="020B0604020202020204" pitchFamily="34" charset="0"/>
+                <a:cs typeface="Arial" panose="020B0604020202020204" pitchFamily="34" charset="0"/>
+              </a:rPr>
+              <a:t>WHERE</a:t>
+            </a:r>
+            <a:r>
+              <a:rPr lang="pt-BR" altLang="en-US">
+                <a:solidFill>
+                  <a:schemeClr val="bg1"/>
+                </a:solidFill>
+                <a:latin typeface="Arial" panose="020B0604020202020204" pitchFamily="34" charset="0"/>
+                <a:cs typeface="Arial" panose="020B0604020202020204" pitchFamily="34" charset="0"/>
+              </a:rPr>
+              <a:t> l.an_anofabricacao &gt;= 1990</a:t>
+            </a:r>
+            <a:endParaRPr lang="pt-BR" altLang="en-US">
+              <a:solidFill>
+                <a:schemeClr val="bg1"/>
+              </a:solidFill>
+              <a:latin typeface="Arial" panose="020B0604020202020204" pitchFamily="34" charset="0"/>
+              <a:cs typeface="Arial" panose="020B0604020202020204" pitchFamily="34" charset="0"/>
+            </a:endParaRPr>
+          </a:p>
+          <a:p>
+            <a:pPr algn="ctr"/>
+            <a:r>
+              <a:rPr lang="pt-BR" altLang="en-US" b="1">
+                <a:solidFill>
+                  <a:schemeClr val="bg1"/>
+                </a:solidFill>
+                <a:latin typeface="Arial" panose="020B0604020202020204" pitchFamily="34" charset="0"/>
+                <a:cs typeface="Arial" panose="020B0604020202020204" pitchFamily="34" charset="0"/>
+              </a:rPr>
+              <a:t>ORDER BY</a:t>
+            </a:r>
+            <a:r>
+              <a:rPr lang="pt-BR" altLang="en-US">
+                <a:solidFill>
+                  <a:schemeClr val="bg1"/>
+                </a:solidFill>
+                <a:latin typeface="Arial" panose="020B0604020202020204" pitchFamily="34" charset="0"/>
+                <a:cs typeface="Arial" panose="020B0604020202020204" pitchFamily="34" charset="0"/>
+              </a:rPr>
+              <a:t> l.vl_capacidadecarga DESC;</a:t>
+            </a:r>
+            <a:endParaRPr lang="pt-BR" altLang="en-US">
+              <a:solidFill>
+                <a:schemeClr val="bg1"/>
+              </a:solidFill>
+              <a:latin typeface="Arial" panose="020B0604020202020204" pitchFamily="34" charset="0"/>
+              <a:cs typeface="Arial" panose="020B0604020202020204" pitchFamily="34" charset="0"/>
+            </a:endParaRPr>
+          </a:p>
+        </p:txBody>
+      </p:sp>
       <p:pic>
         <p:nvPicPr>
           <p:cNvPr id="2" name="Espaço Reservado para Conteúdo 6"/>
@@ -6542,7 +6396,7 @@
           <p:nvPr/>
         </p:nvPicPr>
         <p:blipFill>
-          <a:blip r:embed="rId8">
+          <a:blip r:embed="rId3">
             <a:alphaModFix amt="47000"/>
           </a:blip>
           <a:srcRect t="3619"/>
@@ -6577,7 +6431,7 @@
           <p:nvPr/>
         </p:nvPicPr>
         <p:blipFill>
-          <a:blip r:embed="rId8">
+          <a:blip r:embed="rId3">
             <a:alphaModFix amt="47000"/>
           </a:blip>
           <a:srcRect t="3619" b="27661"/>
@@ -6633,7 +6487,7 @@
                 <a:latin typeface="Arial" panose="020B0604020202020204" pitchFamily="34" charset="0"/>
                 <a:cs typeface="Arial" panose="020B0604020202020204" pitchFamily="34" charset="0"/>
               </a:rPr>
-              <a:t>L</a:t>
+              <a:t>E</a:t>
             </a:r>
             <a:endParaRPr lang="pt-BR" altLang="en-US" sz="2800" b="1">
               <a:solidFill>
@@ -6675,7 +6529,7 @@
                 <a:latin typeface="Arial" panose="020B0604020202020204" pitchFamily="34" charset="0"/>
                 <a:cs typeface="Arial" panose="020B0604020202020204" pitchFamily="34" charset="0"/>
               </a:rPr>
-              <a:t>I</a:t>
+              <a:t>L</a:t>
             </a:r>
             <a:endParaRPr lang="pt-BR" altLang="en-US" sz="2800" b="1">
               <a:solidFill>
@@ -6717,7 +6571,7 @@
                 <a:latin typeface="Arial" panose="020B0604020202020204" pitchFamily="34" charset="0"/>
                 <a:cs typeface="Arial" panose="020B0604020202020204" pitchFamily="34" charset="0"/>
               </a:rPr>
-              <a:t>N</a:t>
+              <a:t>E</a:t>
             </a:r>
             <a:endParaRPr lang="pt-BR" altLang="en-US" sz="2800" b="1">
               <a:solidFill>
@@ -6759,7 +6613,7 @@
                 <a:latin typeface="Arial" panose="020B0604020202020204" pitchFamily="34" charset="0"/>
                 <a:cs typeface="Arial" panose="020B0604020202020204" pitchFamily="34" charset="0"/>
               </a:rPr>
-              <a:t>K</a:t>
+              <a:t>C</a:t>
             </a:r>
             <a:endParaRPr lang="pt-BR" altLang="en-US" sz="2800" b="1">
               <a:solidFill>
@@ -6801,6 +6655,48 @@
                 <a:latin typeface="Arial" panose="020B0604020202020204" pitchFamily="34" charset="0"/>
                 <a:cs typeface="Arial" panose="020B0604020202020204" pitchFamily="34" charset="0"/>
               </a:rPr>
+              <a:t>T</a:t>
+            </a:r>
+            <a:endParaRPr lang="pt-BR" altLang="en-US" sz="2800" b="1">
+              <a:solidFill>
+                <a:schemeClr val="bg1"/>
+              </a:solidFill>
+              <a:latin typeface="Arial" panose="020B0604020202020204" pitchFamily="34" charset="0"/>
+              <a:cs typeface="Arial" panose="020B0604020202020204" pitchFamily="34" charset="0"/>
+            </a:endParaRPr>
+          </a:p>
+        </p:txBody>
+      </p:sp>
+      <p:sp>
+        <p:nvSpPr>
+          <p:cNvPr id="7" name="Caixa de Texto 6"/>
+          <p:cNvSpPr txBox="1"/>
+          <p:nvPr/>
+        </p:nvSpPr>
+        <p:spPr>
+          <a:xfrm>
+            <a:off x="5760000" y="6192000"/>
+            <a:ext cx="688340" cy="521970"/>
+          </a:xfrm>
+          <a:prstGeom prst="rect">
+            <a:avLst/>
+          </a:prstGeom>
+          <a:noFill/>
+        </p:spPr>
+        <p:txBody>
+          <a:bodyPr wrap="square" rtlCol="0">
+            <a:spAutoFit/>
+          </a:bodyPr>
+          <a:p>
+            <a:pPr algn="ctr"/>
+            <a:r>
+              <a:rPr lang="pt-BR" altLang="en-US" sz="2800" b="1">
+                <a:solidFill>
+                  <a:schemeClr val="bg1"/>
+                </a:solidFill>
+                <a:latin typeface="Arial" panose="020B0604020202020204" pitchFamily="34" charset="0"/>
+                <a:cs typeface="Arial" panose="020B0604020202020204" pitchFamily="34" charset="0"/>
+              </a:rPr>
               <a:t>S</a:t>
             </a:r>
             <a:endParaRPr lang="pt-BR" altLang="en-US" sz="2800" b="1">
@@ -6813,6 +6709,108 @@
           </a:p>
         </p:txBody>
       </p:sp>
+      <p:sp>
+        <p:nvSpPr>
+          <p:cNvPr id="10" name="Caixa de Texto 9"/>
+          <p:cNvSpPr txBox="1"/>
+          <p:nvPr/>
+        </p:nvSpPr>
+        <p:spPr>
+          <a:xfrm>
+            <a:off x="5751745" y="225095"/>
+            <a:ext cx="688340" cy="521970"/>
+          </a:xfrm>
+          <a:prstGeom prst="rect">
+            <a:avLst/>
+          </a:prstGeom>
+          <a:noFill/>
+        </p:spPr>
+        <p:txBody>
+          <a:bodyPr wrap="square" rtlCol="0">
+            <a:spAutoFit/>
+          </a:bodyPr>
+          <a:p>
+            <a:pPr algn="ctr"/>
+            <a:r>
+              <a:rPr lang="pt-BR" altLang="en-US" sz="2800" b="1">
+                <a:solidFill>
+                  <a:schemeClr val="bg1"/>
+                </a:solidFill>
+                <a:latin typeface="Arial" panose="020B0604020202020204" pitchFamily="34" charset="0"/>
+                <a:cs typeface="Arial" panose="020B0604020202020204" pitchFamily="34" charset="0"/>
+              </a:rPr>
+              <a:t>S</a:t>
+            </a:r>
+            <a:endParaRPr lang="pt-BR" altLang="en-US" sz="2800" b="1">
+              <a:solidFill>
+                <a:schemeClr val="bg1"/>
+              </a:solidFill>
+              <a:latin typeface="Arial" panose="020B0604020202020204" pitchFamily="34" charset="0"/>
+              <a:cs typeface="Arial" panose="020B0604020202020204" pitchFamily="34" charset="0"/>
+            </a:endParaRPr>
+          </a:p>
+        </p:txBody>
+      </p:sp>
+      <p:pic>
+        <p:nvPicPr>
+          <p:cNvPr id="11" name="Espaço Reservado para Conteúdo 10"/>
+          <p:cNvPicPr>
+            <a:picLocks noChangeAspect="1"/>
+          </p:cNvPicPr>
+          <p:nvPr>
+            <p:ph sz="quarter" idx="13"/>
+          </p:nvPr>
+        </p:nvPicPr>
+        <p:blipFill>
+          <a:blip r:embed="rId4"/>
+          <a:stretch>
+            <a:fillRect/>
+          </a:stretch>
+        </p:blipFill>
+        <p:spPr>
+          <a:xfrm>
+            <a:off x="1836420" y="1924685"/>
+            <a:ext cx="758825" cy="758825"/>
+          </a:xfrm>
+          <a:prstGeom prst="rect">
+            <a:avLst/>
+          </a:prstGeom>
+          <a:effectLst>
+            <a:glow rad="50800">
+              <a:schemeClr val="bg1"/>
+            </a:glow>
+          </a:effectLst>
+        </p:spPr>
+      </p:pic>
+      <p:pic>
+        <p:nvPicPr>
+          <p:cNvPr id="12" name="Imagem 11"/>
+          <p:cNvPicPr>
+            <a:picLocks noChangeAspect="1"/>
+          </p:cNvPicPr>
+          <p:nvPr/>
+        </p:nvPicPr>
+        <p:blipFill>
+          <a:blip r:embed="rId5"/>
+          <a:stretch>
+            <a:fillRect/>
+          </a:stretch>
+        </p:blipFill>
+        <p:spPr>
+          <a:xfrm>
+            <a:off x="9509760" y="1739900"/>
+            <a:ext cx="840105" cy="840105"/>
+          </a:xfrm>
+          <a:prstGeom prst="rect">
+            <a:avLst/>
+          </a:prstGeom>
+          <a:effectLst>
+            <a:glow rad="50800">
+              <a:schemeClr val="bg1"/>
+            </a:glow>
+          </a:effectLst>
+        </p:spPr>
+      </p:pic>
     </p:spTree>
   </p:cSld>
   <p:clrMapOvr>
@@ -6829,6 +6827,3480 @@
 </file>
 
 <file path=ppt/slides/slide5.xml><?xml version="1.0" encoding="utf-8"?>
+<p:sld xmlns:a="http://schemas.openxmlformats.org/drawingml/2006/main" xmlns:r="http://schemas.openxmlformats.org/officeDocument/2006/relationships" xmlns:p="http://schemas.openxmlformats.org/presentationml/2006/main">
+  <p:cSld>
+    <p:spTree>
+      <p:nvGrpSpPr>
+        <p:cNvPr id="1" name=""/>
+        <p:cNvGrpSpPr/>
+        <p:nvPr/>
+      </p:nvGrpSpPr>
+      <p:grpSpPr/>
+      <p:sp>
+        <p:nvSpPr>
+          <p:cNvPr id="5" name="Retângulo 4"/>
+          <p:cNvSpPr/>
+          <p:nvPr/>
+        </p:nvSpPr>
+        <p:spPr>
+          <a:xfrm>
+            <a:off x="-38735" y="-27940"/>
+            <a:ext cx="12269470" cy="6885940"/>
+          </a:xfrm>
+          <a:prstGeom prst="rect">
+            <a:avLst/>
+          </a:prstGeom>
+          <a:gradFill>
+            <a:gsLst>
+              <a:gs pos="10000">
+                <a:schemeClr val="accent1">
+                  <a:lumMod val="75000"/>
+                </a:schemeClr>
+              </a:gs>
+              <a:gs pos="48000">
+                <a:schemeClr val="accent1">
+                  <a:lumMod val="50000"/>
+                </a:schemeClr>
+              </a:gs>
+              <a:gs pos="89000">
+                <a:srgbClr val="202020"/>
+              </a:gs>
+            </a:gsLst>
+            <a:lin ang="0" scaled="0"/>
+          </a:gradFill>
+          <a:ln>
+            <a:noFill/>
+          </a:ln>
+        </p:spPr>
+        <p:style>
+          <a:lnRef idx="2">
+            <a:schemeClr val="dk1">
+              <a:shade val="50000"/>
+            </a:schemeClr>
+          </a:lnRef>
+          <a:fillRef idx="1">
+            <a:schemeClr val="dk1"/>
+          </a:fillRef>
+          <a:effectRef idx="0">
+            <a:schemeClr val="dk1"/>
+          </a:effectRef>
+          <a:fontRef idx="minor">
+            <a:schemeClr val="lt1"/>
+          </a:fontRef>
+        </p:style>
+        <p:txBody>
+          <a:bodyPr rtlCol="0" anchor="ctr"/>
+          <a:p>
+            <a:pPr algn="ctr"/>
+            <a:endParaRPr lang="pt-BR" altLang="en-US"/>
+          </a:p>
+        </p:txBody>
+      </p:sp>
+      <p:pic>
+        <p:nvPicPr>
+          <p:cNvPr id="9" name="Imagem 8" descr="Logo PNG"/>
+          <p:cNvPicPr>
+            <a:picLocks noChangeAspect="1"/>
+          </p:cNvPicPr>
+          <p:nvPr/>
+        </p:nvPicPr>
+        <p:blipFill>
+          <a:blip r:embed="rId1"/>
+          <a:srcRect l="13484" t="37760" r="19158" b="36213"/>
+          <a:stretch>
+            <a:fillRect/>
+          </a:stretch>
+        </p:blipFill>
+        <p:spPr>
+          <a:xfrm>
+            <a:off x="139065" y="172720"/>
+            <a:ext cx="1954530" cy="426085"/>
+          </a:xfrm>
+          <a:prstGeom prst="rect">
+            <a:avLst/>
+          </a:prstGeom>
+        </p:spPr>
+      </p:pic>
+      <p:pic>
+        <p:nvPicPr>
+          <p:cNvPr id="13" name="Imagem 12" descr="Logo Unoesc Colorido 2"/>
+          <p:cNvPicPr>
+            <a:picLocks noChangeAspect="1"/>
+          </p:cNvPicPr>
+          <p:nvPr/>
+        </p:nvPicPr>
+        <p:blipFill>
+          <a:blip r:embed="rId2"/>
+          <a:stretch>
+            <a:fillRect/>
+          </a:stretch>
+        </p:blipFill>
+        <p:spPr>
+          <a:xfrm>
+            <a:off x="10748010" y="172720"/>
+            <a:ext cx="1273810" cy="426085"/>
+          </a:xfrm>
+          <a:prstGeom prst="rect">
+            <a:avLst/>
+          </a:prstGeom>
+        </p:spPr>
+      </p:pic>
+      <p:sp>
+        <p:nvSpPr>
+          <p:cNvPr id="6" name="Caixa de Texto 5"/>
+          <p:cNvSpPr txBox="1"/>
+          <p:nvPr/>
+        </p:nvSpPr>
+        <p:spPr>
+          <a:xfrm>
+            <a:off x="360045" y="3133725"/>
+            <a:ext cx="3867150" cy="1476375"/>
+          </a:xfrm>
+          <a:prstGeom prst="rect">
+            <a:avLst/>
+          </a:prstGeom>
+          <a:noFill/>
+        </p:spPr>
+        <p:txBody>
+          <a:bodyPr wrap="square" rtlCol="0">
+            <a:spAutoFit/>
+          </a:bodyPr>
+          <a:p>
+            <a:pPr algn="ctr"/>
+            <a:r>
+              <a:rPr lang="pt-BR" altLang="en-US" b="1">
+                <a:solidFill>
+                  <a:schemeClr val="bg1"/>
+                </a:solidFill>
+                <a:latin typeface="Arial" panose="020B0604020202020204" pitchFamily="34" charset="0"/>
+                <a:cs typeface="Arial" panose="020B0604020202020204" pitchFamily="34" charset="0"/>
+              </a:rPr>
+              <a:t>Relação de viagem(origem, destino, data e horário) realizadas em 2023. Ordene o relatório da viagem mais antiga para a mais recente.</a:t>
+            </a:r>
+            <a:endParaRPr lang="pt-BR" altLang="en-US" b="1">
+              <a:solidFill>
+                <a:schemeClr val="bg1"/>
+              </a:solidFill>
+              <a:latin typeface="Arial" panose="020B0604020202020204" pitchFamily="34" charset="0"/>
+              <a:cs typeface="Arial" panose="020B0604020202020204" pitchFamily="34" charset="0"/>
+            </a:endParaRPr>
+          </a:p>
+        </p:txBody>
+      </p:sp>
+      <p:sp>
+        <p:nvSpPr>
+          <p:cNvPr id="8" name="Caixa de Texto 7"/>
+          <p:cNvSpPr txBox="1"/>
+          <p:nvPr/>
+        </p:nvSpPr>
+        <p:spPr>
+          <a:xfrm>
+            <a:off x="7757795" y="1913890"/>
+            <a:ext cx="4434205" cy="4799965"/>
+          </a:xfrm>
+          <a:prstGeom prst="rect">
+            <a:avLst/>
+          </a:prstGeom>
+          <a:noFill/>
+        </p:spPr>
+        <p:txBody>
+          <a:bodyPr wrap="square" rtlCol="0">
+            <a:spAutoFit/>
+          </a:bodyPr>
+          <a:p>
+            <a:pPr algn="ctr"/>
+            <a:r>
+              <a:rPr lang="pt-BR" altLang="en-US" b="1">
+                <a:solidFill>
+                  <a:schemeClr val="bg1"/>
+                </a:solidFill>
+                <a:latin typeface="Arial" panose="020B0604020202020204" pitchFamily="34" charset="0"/>
+                <a:cs typeface="Arial" panose="020B0604020202020204" pitchFamily="34" charset="0"/>
+              </a:rPr>
+              <a:t>SELECT </a:t>
+            </a:r>
+            <a:r>
+              <a:rPr lang="pt-BR" altLang="en-US">
+                <a:solidFill>
+                  <a:schemeClr val="bg1"/>
+                </a:solidFill>
+                <a:latin typeface="Arial" panose="020B0604020202020204" pitchFamily="34" charset="0"/>
+                <a:cs typeface="Arial" panose="020B0604020202020204" pitchFamily="34" charset="0"/>
+              </a:rPr>
+              <a:t>origem.tx_nome estacao_origem, origem.tx_cidade cidade_origem,</a:t>
+            </a:r>
+            <a:endParaRPr lang="pt-BR" altLang="en-US">
+              <a:solidFill>
+                <a:schemeClr val="bg1"/>
+              </a:solidFill>
+              <a:latin typeface="Arial" panose="020B0604020202020204" pitchFamily="34" charset="0"/>
+              <a:cs typeface="Arial" panose="020B0604020202020204" pitchFamily="34" charset="0"/>
+            </a:endParaRPr>
+          </a:p>
+          <a:p>
+            <a:pPr algn="ctr"/>
+            <a:r>
+              <a:rPr lang="pt-BR" altLang="en-US">
+                <a:solidFill>
+                  <a:schemeClr val="bg1"/>
+                </a:solidFill>
+                <a:latin typeface="Arial" panose="020B0604020202020204" pitchFamily="34" charset="0"/>
+                <a:cs typeface="Arial" panose="020B0604020202020204" pitchFamily="34" charset="0"/>
+              </a:rPr>
+              <a:t>destino.tx_nome estacao_destino, destino.tx_cidade cidade_destino, </a:t>
+            </a:r>
+            <a:endParaRPr lang="pt-BR" altLang="en-US">
+              <a:solidFill>
+                <a:schemeClr val="bg1"/>
+              </a:solidFill>
+              <a:latin typeface="Arial" panose="020B0604020202020204" pitchFamily="34" charset="0"/>
+              <a:cs typeface="Arial" panose="020B0604020202020204" pitchFamily="34" charset="0"/>
+            </a:endParaRPr>
+          </a:p>
+          <a:p>
+            <a:pPr algn="ctr"/>
+            <a:r>
+              <a:rPr lang="pt-BR" altLang="en-US">
+                <a:solidFill>
+                  <a:schemeClr val="bg1"/>
+                </a:solidFill>
+                <a:latin typeface="Arial" panose="020B0604020202020204" pitchFamily="34" charset="0"/>
+                <a:cs typeface="Arial" panose="020B0604020202020204" pitchFamily="34" charset="0"/>
+              </a:rPr>
+              <a:t>v.dt_momentosaida data_saida, v.dt_momentochegada data_chegada</a:t>
+            </a:r>
+            <a:endParaRPr lang="pt-BR" altLang="en-US">
+              <a:solidFill>
+                <a:schemeClr val="bg1"/>
+              </a:solidFill>
+              <a:latin typeface="Arial" panose="020B0604020202020204" pitchFamily="34" charset="0"/>
+              <a:cs typeface="Arial" panose="020B0604020202020204" pitchFamily="34" charset="0"/>
+            </a:endParaRPr>
+          </a:p>
+          <a:p>
+            <a:pPr algn="ctr"/>
+            <a:r>
+              <a:rPr lang="pt-BR" altLang="en-US" b="1">
+                <a:solidFill>
+                  <a:schemeClr val="bg1"/>
+                </a:solidFill>
+                <a:latin typeface="Arial" panose="020B0604020202020204" pitchFamily="34" charset="0"/>
+                <a:cs typeface="Arial" panose="020B0604020202020204" pitchFamily="34" charset="0"/>
+              </a:rPr>
+              <a:t>FROM </a:t>
+            </a:r>
+            <a:r>
+              <a:rPr lang="pt-BR" altLang="en-US">
+                <a:solidFill>
+                  <a:schemeClr val="bg1"/>
+                </a:solidFill>
+                <a:latin typeface="Arial" panose="020B0604020202020204" pitchFamily="34" charset="0"/>
+                <a:cs typeface="Arial" panose="020B0604020202020204" pitchFamily="34" charset="0"/>
+              </a:rPr>
+              <a:t>viagem v</a:t>
+            </a:r>
+            <a:endParaRPr lang="pt-BR" altLang="en-US">
+              <a:solidFill>
+                <a:schemeClr val="bg1"/>
+              </a:solidFill>
+              <a:latin typeface="Arial" panose="020B0604020202020204" pitchFamily="34" charset="0"/>
+              <a:cs typeface="Arial" panose="020B0604020202020204" pitchFamily="34" charset="0"/>
+            </a:endParaRPr>
+          </a:p>
+          <a:p>
+            <a:pPr algn="ctr"/>
+            <a:r>
+              <a:rPr lang="pt-BR" altLang="en-US" b="1">
+                <a:solidFill>
+                  <a:schemeClr val="bg1"/>
+                </a:solidFill>
+                <a:latin typeface="Arial" panose="020B0604020202020204" pitchFamily="34" charset="0"/>
+                <a:cs typeface="Arial" panose="020B0604020202020204" pitchFamily="34" charset="0"/>
+              </a:rPr>
+              <a:t>INNER JOIN</a:t>
+            </a:r>
+            <a:r>
+              <a:rPr lang="pt-BR" altLang="en-US">
+                <a:solidFill>
+                  <a:schemeClr val="bg1"/>
+                </a:solidFill>
+                <a:latin typeface="Arial" panose="020B0604020202020204" pitchFamily="34" charset="0"/>
+                <a:cs typeface="Arial" panose="020B0604020202020204" pitchFamily="34" charset="0"/>
+              </a:rPr>
+              <a:t> rota r ON r.id_rota = v.cd_rota</a:t>
+            </a:r>
+            <a:endParaRPr lang="pt-BR" altLang="en-US">
+              <a:solidFill>
+                <a:schemeClr val="bg1"/>
+              </a:solidFill>
+              <a:latin typeface="Arial" panose="020B0604020202020204" pitchFamily="34" charset="0"/>
+              <a:cs typeface="Arial" panose="020B0604020202020204" pitchFamily="34" charset="0"/>
+            </a:endParaRPr>
+          </a:p>
+          <a:p>
+            <a:pPr algn="ctr"/>
+            <a:r>
+              <a:rPr lang="pt-BR" altLang="en-US" b="1">
+                <a:solidFill>
+                  <a:schemeClr val="bg1"/>
+                </a:solidFill>
+                <a:latin typeface="Arial" panose="020B0604020202020204" pitchFamily="34" charset="0"/>
+                <a:cs typeface="Arial" panose="020B0604020202020204" pitchFamily="34" charset="0"/>
+              </a:rPr>
+              <a:t>INNER JOIN</a:t>
+            </a:r>
+            <a:r>
+              <a:rPr lang="pt-BR" altLang="en-US">
+                <a:solidFill>
+                  <a:schemeClr val="bg1"/>
+                </a:solidFill>
+                <a:latin typeface="Arial" panose="020B0604020202020204" pitchFamily="34" charset="0"/>
+                <a:cs typeface="Arial" panose="020B0604020202020204" pitchFamily="34" charset="0"/>
+              </a:rPr>
+              <a:t> estacao origem ON origem.id_estacao = r.cd_estacaoorigem </a:t>
+            </a:r>
+            <a:endParaRPr lang="pt-BR" altLang="en-US">
+              <a:solidFill>
+                <a:schemeClr val="bg1"/>
+              </a:solidFill>
+              <a:latin typeface="Arial" panose="020B0604020202020204" pitchFamily="34" charset="0"/>
+              <a:cs typeface="Arial" panose="020B0604020202020204" pitchFamily="34" charset="0"/>
+            </a:endParaRPr>
+          </a:p>
+          <a:p>
+            <a:pPr algn="ctr"/>
+            <a:r>
+              <a:rPr lang="pt-BR" altLang="en-US" b="1">
+                <a:solidFill>
+                  <a:schemeClr val="bg1"/>
+                </a:solidFill>
+                <a:latin typeface="Arial" panose="020B0604020202020204" pitchFamily="34" charset="0"/>
+                <a:cs typeface="Arial" panose="020B0604020202020204" pitchFamily="34" charset="0"/>
+              </a:rPr>
+              <a:t>INNER JOIN</a:t>
+            </a:r>
+            <a:r>
+              <a:rPr lang="pt-BR" altLang="en-US">
+                <a:solidFill>
+                  <a:schemeClr val="bg1"/>
+                </a:solidFill>
+                <a:latin typeface="Arial" panose="020B0604020202020204" pitchFamily="34" charset="0"/>
+                <a:cs typeface="Arial" panose="020B0604020202020204" pitchFamily="34" charset="0"/>
+              </a:rPr>
+              <a:t> estacao destino ON destino.id_estacao = r.cd_estacaodestino</a:t>
+            </a:r>
+            <a:endParaRPr lang="pt-BR" altLang="en-US">
+              <a:solidFill>
+                <a:schemeClr val="bg1"/>
+              </a:solidFill>
+              <a:latin typeface="Arial" panose="020B0604020202020204" pitchFamily="34" charset="0"/>
+              <a:cs typeface="Arial" panose="020B0604020202020204" pitchFamily="34" charset="0"/>
+            </a:endParaRPr>
+          </a:p>
+          <a:p>
+            <a:pPr algn="ctr"/>
+            <a:r>
+              <a:rPr lang="pt-BR" altLang="en-US" b="1">
+                <a:solidFill>
+                  <a:schemeClr val="bg1"/>
+                </a:solidFill>
+                <a:latin typeface="Arial" panose="020B0604020202020204" pitchFamily="34" charset="0"/>
+                <a:cs typeface="Arial" panose="020B0604020202020204" pitchFamily="34" charset="0"/>
+              </a:rPr>
+              <a:t>WHERE</a:t>
+            </a:r>
+            <a:r>
+              <a:rPr lang="pt-BR" altLang="en-US">
+                <a:solidFill>
+                  <a:schemeClr val="bg1"/>
+                </a:solidFill>
+                <a:latin typeface="Arial" panose="020B0604020202020204" pitchFamily="34" charset="0"/>
+                <a:cs typeface="Arial" panose="020B0604020202020204" pitchFamily="34" charset="0"/>
+              </a:rPr>
+              <a:t> </a:t>
+            </a:r>
+            <a:r>
+              <a:rPr lang="pt-BR" altLang="en-US" b="1">
+                <a:solidFill>
+                  <a:schemeClr val="bg1"/>
+                </a:solidFill>
+                <a:latin typeface="Arial" panose="020B0604020202020204" pitchFamily="34" charset="0"/>
+                <a:cs typeface="Arial" panose="020B0604020202020204" pitchFamily="34" charset="0"/>
+              </a:rPr>
+              <a:t>EXTRACT</a:t>
+            </a:r>
+            <a:r>
+              <a:rPr lang="pt-BR" altLang="en-US">
+                <a:solidFill>
+                  <a:schemeClr val="bg1"/>
+                </a:solidFill>
+                <a:latin typeface="Arial" panose="020B0604020202020204" pitchFamily="34" charset="0"/>
+                <a:cs typeface="Arial" panose="020B0604020202020204" pitchFamily="34" charset="0"/>
+              </a:rPr>
+              <a:t>('year' FROM v.dt_momentosaida) = 2023</a:t>
+            </a:r>
+            <a:endParaRPr lang="pt-BR" altLang="en-US">
+              <a:solidFill>
+                <a:schemeClr val="bg1"/>
+              </a:solidFill>
+              <a:latin typeface="Arial" panose="020B0604020202020204" pitchFamily="34" charset="0"/>
+              <a:cs typeface="Arial" panose="020B0604020202020204" pitchFamily="34" charset="0"/>
+            </a:endParaRPr>
+          </a:p>
+          <a:p>
+            <a:pPr algn="ctr"/>
+            <a:r>
+              <a:rPr lang="pt-BR" altLang="en-US" b="1">
+                <a:solidFill>
+                  <a:schemeClr val="bg1"/>
+                </a:solidFill>
+                <a:latin typeface="Arial" panose="020B0604020202020204" pitchFamily="34" charset="0"/>
+                <a:cs typeface="Arial" panose="020B0604020202020204" pitchFamily="34" charset="0"/>
+              </a:rPr>
+              <a:t>ORDER BY</a:t>
+            </a:r>
+            <a:r>
+              <a:rPr lang="pt-BR" altLang="en-US">
+                <a:solidFill>
+                  <a:schemeClr val="bg1"/>
+                </a:solidFill>
+                <a:latin typeface="Arial" panose="020B0604020202020204" pitchFamily="34" charset="0"/>
+                <a:cs typeface="Arial" panose="020B0604020202020204" pitchFamily="34" charset="0"/>
+              </a:rPr>
+              <a:t> v.dt_momentosaida ASC;</a:t>
+            </a:r>
+            <a:endParaRPr lang="pt-BR" altLang="en-US">
+              <a:solidFill>
+                <a:schemeClr val="bg1"/>
+              </a:solidFill>
+              <a:latin typeface="Arial" panose="020B0604020202020204" pitchFamily="34" charset="0"/>
+              <a:cs typeface="Arial" panose="020B0604020202020204" pitchFamily="34" charset="0"/>
+            </a:endParaRPr>
+          </a:p>
+        </p:txBody>
+      </p:sp>
+      <p:pic>
+        <p:nvPicPr>
+          <p:cNvPr id="2" name="Espaço Reservado para Conteúdo 6"/>
+          <p:cNvPicPr>
+            <a:picLocks noChangeAspect="1"/>
+          </p:cNvPicPr>
+          <p:nvPr/>
+        </p:nvPicPr>
+        <p:blipFill>
+          <a:blip r:embed="rId3">
+            <a:alphaModFix amt="47000"/>
+          </a:blip>
+          <a:srcRect t="3619"/>
+          <a:stretch>
+            <a:fillRect/>
+          </a:stretch>
+        </p:blipFill>
+        <p:spPr>
+          <a:xfrm>
+            <a:off x="4005580" y="-27940"/>
+            <a:ext cx="4197985" cy="4197985"/>
+          </a:xfrm>
+          <a:prstGeom prst="rect">
+            <a:avLst/>
+          </a:prstGeom>
+          <a:noFill/>
+          <a:effectLst>
+            <a:glow rad="38100">
+              <a:schemeClr val="bg1">
+                <a:alpha val="0"/>
+              </a:schemeClr>
+            </a:glow>
+          </a:effectLst>
+        </p:spPr>
+      </p:pic>
+      <p:pic>
+        <p:nvPicPr>
+          <p:cNvPr id="27" name="Espaço Reservado para Conteúdo 6"/>
+          <p:cNvPicPr>
+            <a:picLocks noChangeAspect="1"/>
+          </p:cNvPicPr>
+          <p:nvPr/>
+        </p:nvPicPr>
+        <p:blipFill>
+          <a:blip r:embed="rId3">
+            <a:alphaModFix amt="47000"/>
+          </a:blip>
+          <a:srcRect t="3619" b="27661"/>
+          <a:stretch>
+            <a:fillRect/>
+          </a:stretch>
+        </p:blipFill>
+        <p:spPr>
+          <a:xfrm>
+            <a:off x="4015740" y="4037330"/>
+            <a:ext cx="4161790" cy="2820670"/>
+          </a:xfrm>
+          <a:prstGeom prst="rect">
+            <a:avLst/>
+          </a:prstGeom>
+          <a:noFill/>
+          <a:effectLst>
+            <a:glow rad="127000">
+              <a:schemeClr val="accent1">
+                <a:alpha val="0"/>
+              </a:schemeClr>
+            </a:glow>
+          </a:effectLst>
+        </p:spPr>
+      </p:pic>
+      <p:sp>
+        <p:nvSpPr>
+          <p:cNvPr id="21" name="Caixa de Texto 20"/>
+          <p:cNvSpPr txBox="1"/>
+          <p:nvPr/>
+        </p:nvSpPr>
+        <p:spPr>
+          <a:xfrm>
+            <a:off x="5760635" y="1218235"/>
+            <a:ext cx="688340" cy="521970"/>
+          </a:xfrm>
+          <a:prstGeom prst="rect">
+            <a:avLst/>
+          </a:prstGeom>
+          <a:noFill/>
+        </p:spPr>
+        <p:txBody>
+          <a:bodyPr wrap="square" rtlCol="0">
+            <a:spAutoFit/>
+          </a:bodyPr>
+          <a:p>
+            <a:pPr algn="ctr"/>
+            <a:r>
+              <a:rPr lang="pt-BR" altLang="en-US" sz="2800" b="1">
+                <a:solidFill>
+                  <a:schemeClr val="bg1"/>
+                </a:solidFill>
+                <a:latin typeface="Arial" panose="020B0604020202020204" pitchFamily="34" charset="0"/>
+                <a:cs typeface="Arial" panose="020B0604020202020204" pitchFamily="34" charset="0"/>
+              </a:rPr>
+              <a:t>E</a:t>
+            </a:r>
+            <a:endParaRPr lang="pt-BR" altLang="en-US" sz="2800" b="1">
+              <a:solidFill>
+                <a:schemeClr val="bg1"/>
+              </a:solidFill>
+              <a:latin typeface="Arial" panose="020B0604020202020204" pitchFamily="34" charset="0"/>
+              <a:cs typeface="Arial" panose="020B0604020202020204" pitchFamily="34" charset="0"/>
+            </a:endParaRPr>
+          </a:p>
+        </p:txBody>
+      </p:sp>
+      <p:sp>
+        <p:nvSpPr>
+          <p:cNvPr id="22" name="Caixa de Texto 21"/>
+          <p:cNvSpPr txBox="1"/>
+          <p:nvPr/>
+        </p:nvSpPr>
+        <p:spPr>
+          <a:xfrm>
+            <a:off x="5752465" y="2268220"/>
+            <a:ext cx="688340" cy="521970"/>
+          </a:xfrm>
+          <a:prstGeom prst="rect">
+            <a:avLst/>
+          </a:prstGeom>
+          <a:noFill/>
+        </p:spPr>
+        <p:txBody>
+          <a:bodyPr wrap="square" rtlCol="0">
+            <a:spAutoFit/>
+          </a:bodyPr>
+          <a:p>
+            <a:pPr algn="ctr"/>
+            <a:r>
+              <a:rPr lang="pt-BR" altLang="en-US" sz="2800" b="1">
+                <a:solidFill>
+                  <a:schemeClr val="bg1"/>
+                </a:solidFill>
+                <a:latin typeface="Arial" panose="020B0604020202020204" pitchFamily="34" charset="0"/>
+                <a:cs typeface="Arial" panose="020B0604020202020204" pitchFamily="34" charset="0"/>
+              </a:rPr>
+              <a:t>L</a:t>
+            </a:r>
+            <a:endParaRPr lang="pt-BR" altLang="en-US" sz="2800" b="1">
+              <a:solidFill>
+                <a:schemeClr val="bg1"/>
+              </a:solidFill>
+              <a:latin typeface="Arial" panose="020B0604020202020204" pitchFamily="34" charset="0"/>
+              <a:cs typeface="Arial" panose="020B0604020202020204" pitchFamily="34" charset="0"/>
+            </a:endParaRPr>
+          </a:p>
+        </p:txBody>
+      </p:sp>
+      <p:sp>
+        <p:nvSpPr>
+          <p:cNvPr id="24" name="Caixa de Texto 23"/>
+          <p:cNvSpPr txBox="1"/>
+          <p:nvPr/>
+        </p:nvSpPr>
+        <p:spPr>
+          <a:xfrm>
+            <a:off x="5752465" y="3318510"/>
+            <a:ext cx="688340" cy="521970"/>
+          </a:xfrm>
+          <a:prstGeom prst="rect">
+            <a:avLst/>
+          </a:prstGeom>
+          <a:noFill/>
+        </p:spPr>
+        <p:txBody>
+          <a:bodyPr wrap="square" rtlCol="0">
+            <a:spAutoFit/>
+          </a:bodyPr>
+          <a:p>
+            <a:pPr algn="ctr"/>
+            <a:r>
+              <a:rPr lang="pt-BR" altLang="en-US" sz="2800" b="1">
+                <a:solidFill>
+                  <a:schemeClr val="bg1"/>
+                </a:solidFill>
+                <a:latin typeface="Arial" panose="020B0604020202020204" pitchFamily="34" charset="0"/>
+                <a:cs typeface="Arial" panose="020B0604020202020204" pitchFamily="34" charset="0"/>
+              </a:rPr>
+              <a:t>E</a:t>
+            </a:r>
+            <a:endParaRPr lang="pt-BR" altLang="en-US" sz="2800" b="1">
+              <a:solidFill>
+                <a:schemeClr val="bg1"/>
+              </a:solidFill>
+              <a:latin typeface="Arial" panose="020B0604020202020204" pitchFamily="34" charset="0"/>
+              <a:cs typeface="Arial" panose="020B0604020202020204" pitchFamily="34" charset="0"/>
+            </a:endParaRPr>
+          </a:p>
+        </p:txBody>
+      </p:sp>
+      <p:sp>
+        <p:nvSpPr>
+          <p:cNvPr id="25" name="Caixa de Texto 24"/>
+          <p:cNvSpPr txBox="1"/>
+          <p:nvPr/>
+        </p:nvSpPr>
+        <p:spPr>
+          <a:xfrm>
+            <a:off x="5760720" y="4258945"/>
+            <a:ext cx="688340" cy="521970"/>
+          </a:xfrm>
+          <a:prstGeom prst="rect">
+            <a:avLst/>
+          </a:prstGeom>
+          <a:noFill/>
+        </p:spPr>
+        <p:txBody>
+          <a:bodyPr wrap="square" rtlCol="0">
+            <a:spAutoFit/>
+          </a:bodyPr>
+          <a:p>
+            <a:pPr algn="ctr"/>
+            <a:r>
+              <a:rPr lang="pt-BR" altLang="en-US" sz="2800" b="1">
+                <a:solidFill>
+                  <a:schemeClr val="bg1"/>
+                </a:solidFill>
+                <a:latin typeface="Arial" panose="020B0604020202020204" pitchFamily="34" charset="0"/>
+                <a:cs typeface="Arial" panose="020B0604020202020204" pitchFamily="34" charset="0"/>
+              </a:rPr>
+              <a:t>C</a:t>
+            </a:r>
+            <a:endParaRPr lang="pt-BR" altLang="en-US" sz="2800" b="1">
+              <a:solidFill>
+                <a:schemeClr val="bg1"/>
+              </a:solidFill>
+              <a:latin typeface="Arial" panose="020B0604020202020204" pitchFamily="34" charset="0"/>
+              <a:cs typeface="Arial" panose="020B0604020202020204" pitchFamily="34" charset="0"/>
+            </a:endParaRPr>
+          </a:p>
+        </p:txBody>
+      </p:sp>
+      <p:sp>
+        <p:nvSpPr>
+          <p:cNvPr id="28" name="Caixa de Texto 27"/>
+          <p:cNvSpPr txBox="1"/>
+          <p:nvPr/>
+        </p:nvSpPr>
+        <p:spPr>
+          <a:xfrm>
+            <a:off x="5751830" y="5199380"/>
+            <a:ext cx="688340" cy="521970"/>
+          </a:xfrm>
+          <a:prstGeom prst="rect">
+            <a:avLst/>
+          </a:prstGeom>
+          <a:noFill/>
+        </p:spPr>
+        <p:txBody>
+          <a:bodyPr wrap="square" rtlCol="0">
+            <a:spAutoFit/>
+          </a:bodyPr>
+          <a:p>
+            <a:pPr algn="ctr"/>
+            <a:r>
+              <a:rPr lang="pt-BR" altLang="en-US" sz="2800" b="1">
+                <a:solidFill>
+                  <a:schemeClr val="bg1"/>
+                </a:solidFill>
+                <a:latin typeface="Arial" panose="020B0604020202020204" pitchFamily="34" charset="0"/>
+                <a:cs typeface="Arial" panose="020B0604020202020204" pitchFamily="34" charset="0"/>
+              </a:rPr>
+              <a:t>T</a:t>
+            </a:r>
+            <a:endParaRPr lang="pt-BR" altLang="en-US" sz="2800" b="1">
+              <a:solidFill>
+                <a:schemeClr val="bg1"/>
+              </a:solidFill>
+              <a:latin typeface="Arial" panose="020B0604020202020204" pitchFamily="34" charset="0"/>
+              <a:cs typeface="Arial" panose="020B0604020202020204" pitchFamily="34" charset="0"/>
+            </a:endParaRPr>
+          </a:p>
+        </p:txBody>
+      </p:sp>
+      <p:sp>
+        <p:nvSpPr>
+          <p:cNvPr id="7" name="Caixa de Texto 6"/>
+          <p:cNvSpPr txBox="1"/>
+          <p:nvPr/>
+        </p:nvSpPr>
+        <p:spPr>
+          <a:xfrm>
+            <a:off x="5760000" y="6192000"/>
+            <a:ext cx="688340" cy="521970"/>
+          </a:xfrm>
+          <a:prstGeom prst="rect">
+            <a:avLst/>
+          </a:prstGeom>
+          <a:noFill/>
+        </p:spPr>
+        <p:txBody>
+          <a:bodyPr wrap="square" rtlCol="0">
+            <a:spAutoFit/>
+          </a:bodyPr>
+          <a:p>
+            <a:pPr algn="ctr"/>
+            <a:r>
+              <a:rPr lang="pt-BR" altLang="en-US" sz="2800" b="1">
+                <a:solidFill>
+                  <a:schemeClr val="bg1"/>
+                </a:solidFill>
+                <a:latin typeface="Arial" panose="020B0604020202020204" pitchFamily="34" charset="0"/>
+                <a:cs typeface="Arial" panose="020B0604020202020204" pitchFamily="34" charset="0"/>
+              </a:rPr>
+              <a:t>S</a:t>
+            </a:r>
+            <a:endParaRPr lang="pt-BR" altLang="en-US" sz="2800" b="1">
+              <a:solidFill>
+                <a:schemeClr val="bg1"/>
+              </a:solidFill>
+              <a:latin typeface="Arial" panose="020B0604020202020204" pitchFamily="34" charset="0"/>
+              <a:cs typeface="Arial" panose="020B0604020202020204" pitchFamily="34" charset="0"/>
+            </a:endParaRPr>
+          </a:p>
+        </p:txBody>
+      </p:sp>
+      <p:sp>
+        <p:nvSpPr>
+          <p:cNvPr id="10" name="Caixa de Texto 9"/>
+          <p:cNvSpPr txBox="1"/>
+          <p:nvPr/>
+        </p:nvSpPr>
+        <p:spPr>
+          <a:xfrm>
+            <a:off x="5751745" y="225095"/>
+            <a:ext cx="688340" cy="521970"/>
+          </a:xfrm>
+          <a:prstGeom prst="rect">
+            <a:avLst/>
+          </a:prstGeom>
+          <a:noFill/>
+        </p:spPr>
+        <p:txBody>
+          <a:bodyPr wrap="square" rtlCol="0">
+            <a:spAutoFit/>
+          </a:bodyPr>
+          <a:p>
+            <a:pPr algn="ctr"/>
+            <a:r>
+              <a:rPr lang="pt-BR" altLang="en-US" sz="2800" b="1">
+                <a:solidFill>
+                  <a:schemeClr val="bg1"/>
+                </a:solidFill>
+                <a:latin typeface="Arial" panose="020B0604020202020204" pitchFamily="34" charset="0"/>
+                <a:cs typeface="Arial" panose="020B0604020202020204" pitchFamily="34" charset="0"/>
+              </a:rPr>
+              <a:t>S</a:t>
+            </a:r>
+            <a:endParaRPr lang="pt-BR" altLang="en-US" sz="2800" b="1">
+              <a:solidFill>
+                <a:schemeClr val="bg1"/>
+              </a:solidFill>
+              <a:latin typeface="Arial" panose="020B0604020202020204" pitchFamily="34" charset="0"/>
+              <a:cs typeface="Arial" panose="020B0604020202020204" pitchFamily="34" charset="0"/>
+            </a:endParaRPr>
+          </a:p>
+        </p:txBody>
+      </p:sp>
+      <p:pic>
+        <p:nvPicPr>
+          <p:cNvPr id="11" name="Espaço Reservado para Conteúdo 10"/>
+          <p:cNvPicPr>
+            <a:picLocks noChangeAspect="1"/>
+          </p:cNvPicPr>
+          <p:nvPr>
+            <p:ph sz="quarter" idx="13"/>
+          </p:nvPr>
+        </p:nvPicPr>
+        <p:blipFill>
+          <a:blip r:embed="rId4"/>
+          <a:stretch>
+            <a:fillRect/>
+          </a:stretch>
+        </p:blipFill>
+        <p:spPr>
+          <a:xfrm>
+            <a:off x="1911985" y="2268220"/>
+            <a:ext cx="758825" cy="758825"/>
+          </a:xfrm>
+          <a:prstGeom prst="rect">
+            <a:avLst/>
+          </a:prstGeom>
+          <a:effectLst>
+            <a:glow rad="50800">
+              <a:schemeClr val="bg1"/>
+            </a:glow>
+          </a:effectLst>
+        </p:spPr>
+      </p:pic>
+      <p:pic>
+        <p:nvPicPr>
+          <p:cNvPr id="12" name="Imagem 11"/>
+          <p:cNvPicPr>
+            <a:picLocks noChangeAspect="1"/>
+          </p:cNvPicPr>
+          <p:nvPr/>
+        </p:nvPicPr>
+        <p:blipFill>
+          <a:blip r:embed="rId5"/>
+          <a:stretch>
+            <a:fillRect/>
+          </a:stretch>
+        </p:blipFill>
+        <p:spPr>
+          <a:xfrm>
+            <a:off x="9554845" y="1058545"/>
+            <a:ext cx="840105" cy="840105"/>
+          </a:xfrm>
+          <a:prstGeom prst="rect">
+            <a:avLst/>
+          </a:prstGeom>
+          <a:effectLst>
+            <a:glow rad="50800">
+              <a:schemeClr val="bg1"/>
+            </a:glow>
+          </a:effectLst>
+        </p:spPr>
+      </p:pic>
+    </p:spTree>
+  </p:cSld>
+  <p:clrMapOvr>
+    <a:masterClrMapping/>
+  </p:clrMapOvr>
+  <p:timing>
+    <p:tnLst>
+      <p:par>
+        <p:cTn id="1" dur="indefinite" restart="never" nodeType="tmRoot"/>
+      </p:par>
+    </p:tnLst>
+  </p:timing>
+</p:sld>
+</file>
+
+<file path=ppt/slides/slide6.xml><?xml version="1.0" encoding="utf-8"?>
+<p:sld xmlns:a="http://schemas.openxmlformats.org/drawingml/2006/main" xmlns:r="http://schemas.openxmlformats.org/officeDocument/2006/relationships" xmlns:p="http://schemas.openxmlformats.org/presentationml/2006/main">
+  <p:cSld>
+    <p:spTree>
+      <p:nvGrpSpPr>
+        <p:cNvPr id="1" name=""/>
+        <p:cNvGrpSpPr/>
+        <p:nvPr/>
+      </p:nvGrpSpPr>
+      <p:grpSpPr/>
+      <p:sp>
+        <p:nvSpPr>
+          <p:cNvPr id="5" name="Retângulo 4"/>
+          <p:cNvSpPr/>
+          <p:nvPr/>
+        </p:nvSpPr>
+        <p:spPr>
+          <a:xfrm>
+            <a:off x="-38735" y="-27940"/>
+            <a:ext cx="12269470" cy="6885940"/>
+          </a:xfrm>
+          <a:prstGeom prst="rect">
+            <a:avLst/>
+          </a:prstGeom>
+          <a:gradFill>
+            <a:gsLst>
+              <a:gs pos="10000">
+                <a:schemeClr val="accent1">
+                  <a:lumMod val="75000"/>
+                </a:schemeClr>
+              </a:gs>
+              <a:gs pos="48000">
+                <a:schemeClr val="accent1">
+                  <a:lumMod val="50000"/>
+                </a:schemeClr>
+              </a:gs>
+              <a:gs pos="89000">
+                <a:srgbClr val="202020"/>
+              </a:gs>
+            </a:gsLst>
+            <a:lin ang="0" scaled="0"/>
+          </a:gradFill>
+          <a:ln>
+            <a:noFill/>
+          </a:ln>
+        </p:spPr>
+        <p:style>
+          <a:lnRef idx="2">
+            <a:schemeClr val="dk1">
+              <a:shade val="50000"/>
+            </a:schemeClr>
+          </a:lnRef>
+          <a:fillRef idx="1">
+            <a:schemeClr val="dk1"/>
+          </a:fillRef>
+          <a:effectRef idx="0">
+            <a:schemeClr val="dk1"/>
+          </a:effectRef>
+          <a:fontRef idx="minor">
+            <a:schemeClr val="lt1"/>
+          </a:fontRef>
+        </p:style>
+        <p:txBody>
+          <a:bodyPr rtlCol="0" anchor="ctr"/>
+          <a:p>
+            <a:pPr algn="ctr"/>
+            <a:endParaRPr lang="pt-BR" altLang="en-US"/>
+          </a:p>
+        </p:txBody>
+      </p:sp>
+      <p:pic>
+        <p:nvPicPr>
+          <p:cNvPr id="9" name="Imagem 8" descr="Logo PNG"/>
+          <p:cNvPicPr>
+            <a:picLocks noChangeAspect="1"/>
+          </p:cNvPicPr>
+          <p:nvPr/>
+        </p:nvPicPr>
+        <p:blipFill>
+          <a:blip r:embed="rId1"/>
+          <a:srcRect l="13484" t="37760" r="19158" b="36213"/>
+          <a:stretch>
+            <a:fillRect/>
+          </a:stretch>
+        </p:blipFill>
+        <p:spPr>
+          <a:xfrm>
+            <a:off x="139065" y="172720"/>
+            <a:ext cx="1954530" cy="426085"/>
+          </a:xfrm>
+          <a:prstGeom prst="rect">
+            <a:avLst/>
+          </a:prstGeom>
+        </p:spPr>
+      </p:pic>
+      <p:pic>
+        <p:nvPicPr>
+          <p:cNvPr id="13" name="Imagem 12" descr="Logo Unoesc Colorido 2"/>
+          <p:cNvPicPr>
+            <a:picLocks noChangeAspect="1"/>
+          </p:cNvPicPr>
+          <p:nvPr/>
+        </p:nvPicPr>
+        <p:blipFill>
+          <a:blip r:embed="rId2"/>
+          <a:stretch>
+            <a:fillRect/>
+          </a:stretch>
+        </p:blipFill>
+        <p:spPr>
+          <a:xfrm>
+            <a:off x="10748010" y="172720"/>
+            <a:ext cx="1273810" cy="426085"/>
+          </a:xfrm>
+          <a:prstGeom prst="rect">
+            <a:avLst/>
+          </a:prstGeom>
+        </p:spPr>
+      </p:pic>
+      <p:sp>
+        <p:nvSpPr>
+          <p:cNvPr id="6" name="Caixa de Texto 5"/>
+          <p:cNvSpPr txBox="1"/>
+          <p:nvPr/>
+        </p:nvSpPr>
+        <p:spPr>
+          <a:xfrm>
+            <a:off x="360045" y="3133725"/>
+            <a:ext cx="3867150" cy="922020"/>
+          </a:xfrm>
+          <a:prstGeom prst="rect">
+            <a:avLst/>
+          </a:prstGeom>
+          <a:noFill/>
+        </p:spPr>
+        <p:txBody>
+          <a:bodyPr wrap="square" rtlCol="0">
+            <a:spAutoFit/>
+          </a:bodyPr>
+          <a:p>
+            <a:pPr algn="ctr"/>
+            <a:r>
+              <a:rPr lang="pt-BR" altLang="en-US" b="1">
+                <a:solidFill>
+                  <a:schemeClr val="bg1"/>
+                </a:solidFill>
+                <a:latin typeface="Arial" panose="020B0604020202020204" pitchFamily="34" charset="0"/>
+                <a:cs typeface="Arial" panose="020B0604020202020204" pitchFamily="34" charset="0"/>
+              </a:rPr>
+              <a:t>Relação dos top 10 destinos com mais cargas transportadas em 2022.</a:t>
+            </a:r>
+            <a:endParaRPr lang="pt-BR" altLang="en-US" b="1">
+              <a:solidFill>
+                <a:schemeClr val="bg1"/>
+              </a:solidFill>
+              <a:latin typeface="Arial" panose="020B0604020202020204" pitchFamily="34" charset="0"/>
+              <a:cs typeface="Arial" panose="020B0604020202020204" pitchFamily="34" charset="0"/>
+            </a:endParaRPr>
+          </a:p>
+        </p:txBody>
+      </p:sp>
+      <p:sp>
+        <p:nvSpPr>
+          <p:cNvPr id="8" name="Caixa de Texto 7"/>
+          <p:cNvSpPr txBox="1"/>
+          <p:nvPr/>
+        </p:nvSpPr>
+        <p:spPr>
+          <a:xfrm>
+            <a:off x="7757795" y="1913890"/>
+            <a:ext cx="4434205" cy="4799965"/>
+          </a:xfrm>
+          <a:prstGeom prst="rect">
+            <a:avLst/>
+          </a:prstGeom>
+          <a:noFill/>
+        </p:spPr>
+        <p:txBody>
+          <a:bodyPr wrap="square" rtlCol="0">
+            <a:spAutoFit/>
+          </a:bodyPr>
+          <a:p>
+            <a:pPr algn="ctr"/>
+            <a:r>
+              <a:rPr lang="pt-BR" altLang="en-US" b="1">
+                <a:solidFill>
+                  <a:schemeClr val="bg1"/>
+                </a:solidFill>
+                <a:latin typeface="Arial" panose="020B0604020202020204" pitchFamily="34" charset="0"/>
+                <a:cs typeface="Arial" panose="020B0604020202020204" pitchFamily="34" charset="0"/>
+              </a:rPr>
+              <a:t>SELECT</a:t>
+            </a:r>
+            <a:r>
+              <a:rPr lang="pt-BR" altLang="en-US">
+                <a:solidFill>
+                  <a:schemeClr val="bg1"/>
+                </a:solidFill>
+                <a:latin typeface="Arial" panose="020B0604020202020204" pitchFamily="34" charset="0"/>
+                <a:cs typeface="Arial" panose="020B0604020202020204" pitchFamily="34" charset="0"/>
+              </a:rPr>
+              <a:t> count(c.id_carga) qtd_carga, destino.tx_nome estacao, destino.tx_cidade cidade</a:t>
+            </a:r>
+            <a:endParaRPr lang="pt-BR" altLang="en-US">
+              <a:solidFill>
+                <a:schemeClr val="bg1"/>
+              </a:solidFill>
+              <a:latin typeface="Arial" panose="020B0604020202020204" pitchFamily="34" charset="0"/>
+              <a:cs typeface="Arial" panose="020B0604020202020204" pitchFamily="34" charset="0"/>
+            </a:endParaRPr>
+          </a:p>
+          <a:p>
+            <a:pPr algn="ctr"/>
+            <a:r>
+              <a:rPr lang="pt-BR" altLang="en-US" b="1">
+                <a:solidFill>
+                  <a:schemeClr val="bg1"/>
+                </a:solidFill>
+                <a:latin typeface="Arial" panose="020B0604020202020204" pitchFamily="34" charset="0"/>
+                <a:cs typeface="Arial" panose="020B0604020202020204" pitchFamily="34" charset="0"/>
+              </a:rPr>
+              <a:t>FROM</a:t>
+            </a:r>
+            <a:r>
+              <a:rPr lang="pt-BR" altLang="en-US">
+                <a:solidFill>
+                  <a:schemeClr val="bg1"/>
+                </a:solidFill>
+                <a:latin typeface="Arial" panose="020B0604020202020204" pitchFamily="34" charset="0"/>
+                <a:cs typeface="Arial" panose="020B0604020202020204" pitchFamily="34" charset="0"/>
+              </a:rPr>
+              <a:t> carga c</a:t>
+            </a:r>
+            <a:endParaRPr lang="pt-BR" altLang="en-US">
+              <a:solidFill>
+                <a:schemeClr val="bg1"/>
+              </a:solidFill>
+              <a:latin typeface="Arial" panose="020B0604020202020204" pitchFamily="34" charset="0"/>
+              <a:cs typeface="Arial" panose="020B0604020202020204" pitchFamily="34" charset="0"/>
+            </a:endParaRPr>
+          </a:p>
+          <a:p>
+            <a:pPr algn="ctr"/>
+            <a:r>
+              <a:rPr lang="pt-BR" altLang="en-US" b="1">
+                <a:solidFill>
+                  <a:schemeClr val="bg1"/>
+                </a:solidFill>
+                <a:latin typeface="Arial" panose="020B0604020202020204" pitchFamily="34" charset="0"/>
+                <a:cs typeface="Arial" panose="020B0604020202020204" pitchFamily="34" charset="0"/>
+              </a:rPr>
+              <a:t>INNER JOIN</a:t>
+            </a:r>
+            <a:r>
+              <a:rPr lang="pt-BR" altLang="en-US">
+                <a:solidFill>
+                  <a:schemeClr val="bg1"/>
+                </a:solidFill>
+                <a:latin typeface="Arial" panose="020B0604020202020204" pitchFamily="34" charset="0"/>
+                <a:cs typeface="Arial" panose="020B0604020202020204" pitchFamily="34" charset="0"/>
+              </a:rPr>
+              <a:t> viagemvagao vv ON vv.cd_carga = c.id_carga </a:t>
+            </a:r>
+            <a:endParaRPr lang="pt-BR" altLang="en-US">
+              <a:solidFill>
+                <a:schemeClr val="bg1"/>
+              </a:solidFill>
+              <a:latin typeface="Arial" panose="020B0604020202020204" pitchFamily="34" charset="0"/>
+              <a:cs typeface="Arial" panose="020B0604020202020204" pitchFamily="34" charset="0"/>
+            </a:endParaRPr>
+          </a:p>
+          <a:p>
+            <a:pPr algn="ctr"/>
+            <a:r>
+              <a:rPr lang="pt-BR" altLang="en-US" b="1">
+                <a:solidFill>
+                  <a:schemeClr val="bg1"/>
+                </a:solidFill>
+                <a:latin typeface="Arial" panose="020B0604020202020204" pitchFamily="34" charset="0"/>
+                <a:cs typeface="Arial" panose="020B0604020202020204" pitchFamily="34" charset="0"/>
+              </a:rPr>
+              <a:t>INNER JOIN </a:t>
+            </a:r>
+            <a:r>
+              <a:rPr lang="pt-BR" altLang="en-US">
+                <a:solidFill>
+                  <a:schemeClr val="bg1"/>
+                </a:solidFill>
+                <a:latin typeface="Arial" panose="020B0604020202020204" pitchFamily="34" charset="0"/>
+                <a:cs typeface="Arial" panose="020B0604020202020204" pitchFamily="34" charset="0"/>
+              </a:rPr>
+              <a:t>viagem v ON v.id_viagem = vv.cd_viagem </a:t>
+            </a:r>
+            <a:endParaRPr lang="pt-BR" altLang="en-US">
+              <a:solidFill>
+                <a:schemeClr val="bg1"/>
+              </a:solidFill>
+              <a:latin typeface="Arial" panose="020B0604020202020204" pitchFamily="34" charset="0"/>
+              <a:cs typeface="Arial" panose="020B0604020202020204" pitchFamily="34" charset="0"/>
+            </a:endParaRPr>
+          </a:p>
+          <a:p>
+            <a:pPr algn="ctr"/>
+            <a:r>
+              <a:rPr lang="pt-BR" altLang="en-US" b="1">
+                <a:solidFill>
+                  <a:schemeClr val="bg1"/>
+                </a:solidFill>
+                <a:latin typeface="Arial" panose="020B0604020202020204" pitchFamily="34" charset="0"/>
+                <a:cs typeface="Arial" panose="020B0604020202020204" pitchFamily="34" charset="0"/>
+              </a:rPr>
+              <a:t>INNER JOIN</a:t>
+            </a:r>
+            <a:r>
+              <a:rPr lang="pt-BR" altLang="en-US">
+                <a:solidFill>
+                  <a:schemeClr val="bg1"/>
+                </a:solidFill>
+                <a:latin typeface="Arial" panose="020B0604020202020204" pitchFamily="34" charset="0"/>
+                <a:cs typeface="Arial" panose="020B0604020202020204" pitchFamily="34" charset="0"/>
+              </a:rPr>
+              <a:t> rota r ON r.id_rota = v.cd_rota </a:t>
+            </a:r>
+            <a:endParaRPr lang="pt-BR" altLang="en-US">
+              <a:solidFill>
+                <a:schemeClr val="bg1"/>
+              </a:solidFill>
+              <a:latin typeface="Arial" panose="020B0604020202020204" pitchFamily="34" charset="0"/>
+              <a:cs typeface="Arial" panose="020B0604020202020204" pitchFamily="34" charset="0"/>
+            </a:endParaRPr>
+          </a:p>
+          <a:p>
+            <a:pPr algn="ctr"/>
+            <a:r>
+              <a:rPr lang="pt-BR" altLang="en-US" b="1">
+                <a:solidFill>
+                  <a:schemeClr val="bg1"/>
+                </a:solidFill>
+                <a:latin typeface="Arial" panose="020B0604020202020204" pitchFamily="34" charset="0"/>
+                <a:cs typeface="Arial" panose="020B0604020202020204" pitchFamily="34" charset="0"/>
+              </a:rPr>
+              <a:t>INNER JOIN </a:t>
+            </a:r>
+            <a:r>
+              <a:rPr lang="pt-BR" altLang="en-US">
+                <a:solidFill>
+                  <a:schemeClr val="bg1"/>
+                </a:solidFill>
+                <a:latin typeface="Arial" panose="020B0604020202020204" pitchFamily="34" charset="0"/>
+                <a:cs typeface="Arial" panose="020B0604020202020204" pitchFamily="34" charset="0"/>
+              </a:rPr>
+              <a:t>estacao destino ON destino.id_estacao = r.cd_estacaodestino</a:t>
+            </a:r>
+            <a:endParaRPr lang="pt-BR" altLang="en-US">
+              <a:solidFill>
+                <a:schemeClr val="bg1"/>
+              </a:solidFill>
+              <a:latin typeface="Arial" panose="020B0604020202020204" pitchFamily="34" charset="0"/>
+              <a:cs typeface="Arial" panose="020B0604020202020204" pitchFamily="34" charset="0"/>
+            </a:endParaRPr>
+          </a:p>
+          <a:p>
+            <a:pPr algn="ctr"/>
+            <a:r>
+              <a:rPr lang="pt-BR" altLang="en-US" b="1">
+                <a:solidFill>
+                  <a:schemeClr val="bg1"/>
+                </a:solidFill>
+                <a:latin typeface="Arial" panose="020B0604020202020204" pitchFamily="34" charset="0"/>
+                <a:cs typeface="Arial" panose="020B0604020202020204" pitchFamily="34" charset="0"/>
+              </a:rPr>
+              <a:t>WHERE EXTRACT</a:t>
+            </a:r>
+            <a:r>
+              <a:rPr lang="pt-BR" altLang="en-US">
+                <a:solidFill>
+                  <a:schemeClr val="bg1"/>
+                </a:solidFill>
+                <a:latin typeface="Arial" panose="020B0604020202020204" pitchFamily="34" charset="0"/>
+                <a:cs typeface="Arial" panose="020B0604020202020204" pitchFamily="34" charset="0"/>
+              </a:rPr>
+              <a:t>('year' FROM v.dt_momentosaida) = 2022</a:t>
+            </a:r>
+            <a:endParaRPr lang="pt-BR" altLang="en-US">
+              <a:solidFill>
+                <a:schemeClr val="bg1"/>
+              </a:solidFill>
+              <a:latin typeface="Arial" panose="020B0604020202020204" pitchFamily="34" charset="0"/>
+              <a:cs typeface="Arial" panose="020B0604020202020204" pitchFamily="34" charset="0"/>
+            </a:endParaRPr>
+          </a:p>
+          <a:p>
+            <a:pPr algn="ctr"/>
+            <a:r>
+              <a:rPr lang="pt-BR" altLang="en-US" b="1">
+                <a:solidFill>
+                  <a:schemeClr val="bg1"/>
+                </a:solidFill>
+                <a:latin typeface="Arial" panose="020B0604020202020204" pitchFamily="34" charset="0"/>
+                <a:cs typeface="Arial" panose="020B0604020202020204" pitchFamily="34" charset="0"/>
+              </a:rPr>
+              <a:t>GROUP BY</a:t>
+            </a:r>
+            <a:r>
+              <a:rPr lang="pt-BR" altLang="en-US">
+                <a:solidFill>
+                  <a:schemeClr val="bg1"/>
+                </a:solidFill>
+                <a:latin typeface="Arial" panose="020B0604020202020204" pitchFamily="34" charset="0"/>
+                <a:cs typeface="Arial" panose="020B0604020202020204" pitchFamily="34" charset="0"/>
+              </a:rPr>
+              <a:t> destino.id_estacao</a:t>
+            </a:r>
+            <a:endParaRPr lang="pt-BR" altLang="en-US">
+              <a:solidFill>
+                <a:schemeClr val="bg1"/>
+              </a:solidFill>
+              <a:latin typeface="Arial" panose="020B0604020202020204" pitchFamily="34" charset="0"/>
+              <a:cs typeface="Arial" panose="020B0604020202020204" pitchFamily="34" charset="0"/>
+            </a:endParaRPr>
+          </a:p>
+          <a:p>
+            <a:pPr algn="ctr"/>
+            <a:r>
+              <a:rPr lang="pt-BR" altLang="en-US" b="1">
+                <a:solidFill>
+                  <a:schemeClr val="bg1"/>
+                </a:solidFill>
+                <a:latin typeface="Arial" panose="020B0604020202020204" pitchFamily="34" charset="0"/>
+                <a:cs typeface="Arial" panose="020B0604020202020204" pitchFamily="34" charset="0"/>
+              </a:rPr>
+              <a:t>ORDER BY</a:t>
+            </a:r>
+            <a:r>
+              <a:rPr lang="pt-BR" altLang="en-US">
+                <a:solidFill>
+                  <a:schemeClr val="bg1"/>
+                </a:solidFill>
+                <a:latin typeface="Arial" panose="020B0604020202020204" pitchFamily="34" charset="0"/>
+                <a:cs typeface="Arial" panose="020B0604020202020204" pitchFamily="34" charset="0"/>
+              </a:rPr>
+              <a:t> 1 DESC</a:t>
+            </a:r>
+            <a:endParaRPr lang="pt-BR" altLang="en-US">
+              <a:solidFill>
+                <a:schemeClr val="bg1"/>
+              </a:solidFill>
+              <a:latin typeface="Arial" panose="020B0604020202020204" pitchFamily="34" charset="0"/>
+              <a:cs typeface="Arial" panose="020B0604020202020204" pitchFamily="34" charset="0"/>
+            </a:endParaRPr>
+          </a:p>
+          <a:p>
+            <a:pPr algn="ctr"/>
+            <a:r>
+              <a:rPr lang="pt-BR" altLang="en-US" b="1">
+                <a:solidFill>
+                  <a:schemeClr val="bg1"/>
+                </a:solidFill>
+                <a:latin typeface="Arial" panose="020B0604020202020204" pitchFamily="34" charset="0"/>
+                <a:cs typeface="Arial" panose="020B0604020202020204" pitchFamily="34" charset="0"/>
+              </a:rPr>
+              <a:t>LIMIT</a:t>
+            </a:r>
+            <a:r>
+              <a:rPr lang="pt-BR" altLang="en-US">
+                <a:solidFill>
+                  <a:schemeClr val="bg1"/>
+                </a:solidFill>
+                <a:latin typeface="Arial" panose="020B0604020202020204" pitchFamily="34" charset="0"/>
+                <a:cs typeface="Arial" panose="020B0604020202020204" pitchFamily="34" charset="0"/>
+              </a:rPr>
+              <a:t> 10;</a:t>
+            </a:r>
+            <a:endParaRPr lang="pt-BR" altLang="en-US">
+              <a:solidFill>
+                <a:schemeClr val="bg1"/>
+              </a:solidFill>
+              <a:latin typeface="Arial" panose="020B0604020202020204" pitchFamily="34" charset="0"/>
+              <a:cs typeface="Arial" panose="020B0604020202020204" pitchFamily="34" charset="0"/>
+            </a:endParaRPr>
+          </a:p>
+        </p:txBody>
+      </p:sp>
+      <p:pic>
+        <p:nvPicPr>
+          <p:cNvPr id="2" name="Espaço Reservado para Conteúdo 6"/>
+          <p:cNvPicPr>
+            <a:picLocks noChangeAspect="1"/>
+          </p:cNvPicPr>
+          <p:nvPr/>
+        </p:nvPicPr>
+        <p:blipFill>
+          <a:blip r:embed="rId3">
+            <a:alphaModFix amt="47000"/>
+          </a:blip>
+          <a:srcRect l="10573" t="3619" r="11935"/>
+          <a:stretch>
+            <a:fillRect/>
+          </a:stretch>
+        </p:blipFill>
+        <p:spPr>
+          <a:xfrm>
+            <a:off x="4449445" y="-27940"/>
+            <a:ext cx="3253105" cy="4197985"/>
+          </a:xfrm>
+          <a:prstGeom prst="rect">
+            <a:avLst/>
+          </a:prstGeom>
+          <a:noFill/>
+          <a:effectLst>
+            <a:glow rad="38100">
+              <a:schemeClr val="bg1">
+                <a:alpha val="0"/>
+              </a:schemeClr>
+            </a:glow>
+          </a:effectLst>
+        </p:spPr>
+      </p:pic>
+      <p:pic>
+        <p:nvPicPr>
+          <p:cNvPr id="27" name="Espaço Reservado para Conteúdo 6"/>
+          <p:cNvPicPr>
+            <a:picLocks noChangeAspect="1"/>
+          </p:cNvPicPr>
+          <p:nvPr/>
+        </p:nvPicPr>
+        <p:blipFill>
+          <a:blip r:embed="rId3">
+            <a:alphaModFix amt="47000"/>
+          </a:blip>
+          <a:srcRect l="9292" t="3619" r="8255" b="27661"/>
+          <a:stretch>
+            <a:fillRect/>
+          </a:stretch>
+        </p:blipFill>
+        <p:spPr>
+          <a:xfrm>
+            <a:off x="4402455" y="4037330"/>
+            <a:ext cx="3431540" cy="2820670"/>
+          </a:xfrm>
+          <a:prstGeom prst="rect">
+            <a:avLst/>
+          </a:prstGeom>
+          <a:noFill/>
+          <a:effectLst>
+            <a:glow rad="127000">
+              <a:schemeClr val="accent1">
+                <a:alpha val="0"/>
+              </a:schemeClr>
+            </a:glow>
+          </a:effectLst>
+        </p:spPr>
+      </p:pic>
+      <p:sp>
+        <p:nvSpPr>
+          <p:cNvPr id="21" name="Caixa de Texto 20"/>
+          <p:cNvSpPr txBox="1"/>
+          <p:nvPr/>
+        </p:nvSpPr>
+        <p:spPr>
+          <a:xfrm>
+            <a:off x="5760635" y="1218235"/>
+            <a:ext cx="688340" cy="521970"/>
+          </a:xfrm>
+          <a:prstGeom prst="rect">
+            <a:avLst/>
+          </a:prstGeom>
+          <a:noFill/>
+        </p:spPr>
+        <p:txBody>
+          <a:bodyPr wrap="square" rtlCol="0">
+            <a:spAutoFit/>
+          </a:bodyPr>
+          <a:p>
+            <a:pPr algn="ctr"/>
+            <a:r>
+              <a:rPr lang="pt-BR" altLang="en-US" sz="2800" b="1">
+                <a:solidFill>
+                  <a:schemeClr val="bg1"/>
+                </a:solidFill>
+                <a:latin typeface="Arial" panose="020B0604020202020204" pitchFamily="34" charset="0"/>
+                <a:cs typeface="Arial" panose="020B0604020202020204" pitchFamily="34" charset="0"/>
+              </a:rPr>
+              <a:t>E</a:t>
+            </a:r>
+            <a:endParaRPr lang="pt-BR" altLang="en-US" sz="2800" b="1">
+              <a:solidFill>
+                <a:schemeClr val="bg1"/>
+              </a:solidFill>
+              <a:latin typeface="Arial" panose="020B0604020202020204" pitchFamily="34" charset="0"/>
+              <a:cs typeface="Arial" panose="020B0604020202020204" pitchFamily="34" charset="0"/>
+            </a:endParaRPr>
+          </a:p>
+        </p:txBody>
+      </p:sp>
+      <p:sp>
+        <p:nvSpPr>
+          <p:cNvPr id="22" name="Caixa de Texto 21"/>
+          <p:cNvSpPr txBox="1"/>
+          <p:nvPr/>
+        </p:nvSpPr>
+        <p:spPr>
+          <a:xfrm>
+            <a:off x="5752465" y="2268220"/>
+            <a:ext cx="688340" cy="521970"/>
+          </a:xfrm>
+          <a:prstGeom prst="rect">
+            <a:avLst/>
+          </a:prstGeom>
+          <a:noFill/>
+        </p:spPr>
+        <p:txBody>
+          <a:bodyPr wrap="square" rtlCol="0">
+            <a:spAutoFit/>
+          </a:bodyPr>
+          <a:p>
+            <a:pPr algn="ctr"/>
+            <a:r>
+              <a:rPr lang="pt-BR" altLang="en-US" sz="2800" b="1">
+                <a:solidFill>
+                  <a:schemeClr val="bg1"/>
+                </a:solidFill>
+                <a:latin typeface="Arial" panose="020B0604020202020204" pitchFamily="34" charset="0"/>
+                <a:cs typeface="Arial" panose="020B0604020202020204" pitchFamily="34" charset="0"/>
+              </a:rPr>
+              <a:t>L</a:t>
+            </a:r>
+            <a:endParaRPr lang="pt-BR" altLang="en-US" sz="2800" b="1">
+              <a:solidFill>
+                <a:schemeClr val="bg1"/>
+              </a:solidFill>
+              <a:latin typeface="Arial" panose="020B0604020202020204" pitchFamily="34" charset="0"/>
+              <a:cs typeface="Arial" panose="020B0604020202020204" pitchFamily="34" charset="0"/>
+            </a:endParaRPr>
+          </a:p>
+        </p:txBody>
+      </p:sp>
+      <p:sp>
+        <p:nvSpPr>
+          <p:cNvPr id="24" name="Caixa de Texto 23"/>
+          <p:cNvSpPr txBox="1"/>
+          <p:nvPr/>
+        </p:nvSpPr>
+        <p:spPr>
+          <a:xfrm>
+            <a:off x="5752465" y="3318510"/>
+            <a:ext cx="688340" cy="521970"/>
+          </a:xfrm>
+          <a:prstGeom prst="rect">
+            <a:avLst/>
+          </a:prstGeom>
+          <a:noFill/>
+        </p:spPr>
+        <p:txBody>
+          <a:bodyPr wrap="square" rtlCol="0">
+            <a:spAutoFit/>
+          </a:bodyPr>
+          <a:p>
+            <a:pPr algn="ctr"/>
+            <a:r>
+              <a:rPr lang="pt-BR" altLang="en-US" sz="2800" b="1">
+                <a:solidFill>
+                  <a:schemeClr val="bg1"/>
+                </a:solidFill>
+                <a:latin typeface="Arial" panose="020B0604020202020204" pitchFamily="34" charset="0"/>
+                <a:cs typeface="Arial" panose="020B0604020202020204" pitchFamily="34" charset="0"/>
+              </a:rPr>
+              <a:t>E</a:t>
+            </a:r>
+            <a:endParaRPr lang="pt-BR" altLang="en-US" sz="2800" b="1">
+              <a:solidFill>
+                <a:schemeClr val="bg1"/>
+              </a:solidFill>
+              <a:latin typeface="Arial" panose="020B0604020202020204" pitchFamily="34" charset="0"/>
+              <a:cs typeface="Arial" panose="020B0604020202020204" pitchFamily="34" charset="0"/>
+            </a:endParaRPr>
+          </a:p>
+        </p:txBody>
+      </p:sp>
+      <p:sp>
+        <p:nvSpPr>
+          <p:cNvPr id="25" name="Caixa de Texto 24"/>
+          <p:cNvSpPr txBox="1"/>
+          <p:nvPr/>
+        </p:nvSpPr>
+        <p:spPr>
+          <a:xfrm>
+            <a:off x="5760720" y="4258945"/>
+            <a:ext cx="688340" cy="521970"/>
+          </a:xfrm>
+          <a:prstGeom prst="rect">
+            <a:avLst/>
+          </a:prstGeom>
+          <a:noFill/>
+        </p:spPr>
+        <p:txBody>
+          <a:bodyPr wrap="square" rtlCol="0">
+            <a:spAutoFit/>
+          </a:bodyPr>
+          <a:p>
+            <a:pPr algn="ctr"/>
+            <a:r>
+              <a:rPr lang="pt-BR" altLang="en-US" sz="2800" b="1">
+                <a:solidFill>
+                  <a:schemeClr val="bg1"/>
+                </a:solidFill>
+                <a:latin typeface="Arial" panose="020B0604020202020204" pitchFamily="34" charset="0"/>
+                <a:cs typeface="Arial" panose="020B0604020202020204" pitchFamily="34" charset="0"/>
+              </a:rPr>
+              <a:t>C</a:t>
+            </a:r>
+            <a:endParaRPr lang="pt-BR" altLang="en-US" sz="2800" b="1">
+              <a:solidFill>
+                <a:schemeClr val="bg1"/>
+              </a:solidFill>
+              <a:latin typeface="Arial" panose="020B0604020202020204" pitchFamily="34" charset="0"/>
+              <a:cs typeface="Arial" panose="020B0604020202020204" pitchFamily="34" charset="0"/>
+            </a:endParaRPr>
+          </a:p>
+        </p:txBody>
+      </p:sp>
+      <p:sp>
+        <p:nvSpPr>
+          <p:cNvPr id="28" name="Caixa de Texto 27"/>
+          <p:cNvSpPr txBox="1"/>
+          <p:nvPr/>
+        </p:nvSpPr>
+        <p:spPr>
+          <a:xfrm>
+            <a:off x="5751830" y="5199380"/>
+            <a:ext cx="688340" cy="521970"/>
+          </a:xfrm>
+          <a:prstGeom prst="rect">
+            <a:avLst/>
+          </a:prstGeom>
+          <a:noFill/>
+        </p:spPr>
+        <p:txBody>
+          <a:bodyPr wrap="square" rtlCol="0">
+            <a:spAutoFit/>
+          </a:bodyPr>
+          <a:p>
+            <a:pPr algn="ctr"/>
+            <a:r>
+              <a:rPr lang="pt-BR" altLang="en-US" sz="2800" b="1">
+                <a:solidFill>
+                  <a:schemeClr val="bg1"/>
+                </a:solidFill>
+                <a:latin typeface="Arial" panose="020B0604020202020204" pitchFamily="34" charset="0"/>
+                <a:cs typeface="Arial" panose="020B0604020202020204" pitchFamily="34" charset="0"/>
+              </a:rPr>
+              <a:t>T</a:t>
+            </a:r>
+            <a:endParaRPr lang="pt-BR" altLang="en-US" sz="2800" b="1">
+              <a:solidFill>
+                <a:schemeClr val="bg1"/>
+              </a:solidFill>
+              <a:latin typeface="Arial" panose="020B0604020202020204" pitchFamily="34" charset="0"/>
+              <a:cs typeface="Arial" panose="020B0604020202020204" pitchFamily="34" charset="0"/>
+            </a:endParaRPr>
+          </a:p>
+        </p:txBody>
+      </p:sp>
+      <p:sp>
+        <p:nvSpPr>
+          <p:cNvPr id="7" name="Caixa de Texto 6"/>
+          <p:cNvSpPr txBox="1"/>
+          <p:nvPr/>
+        </p:nvSpPr>
+        <p:spPr>
+          <a:xfrm>
+            <a:off x="5760000" y="6192000"/>
+            <a:ext cx="688340" cy="521970"/>
+          </a:xfrm>
+          <a:prstGeom prst="rect">
+            <a:avLst/>
+          </a:prstGeom>
+          <a:noFill/>
+        </p:spPr>
+        <p:txBody>
+          <a:bodyPr wrap="square" rtlCol="0">
+            <a:spAutoFit/>
+          </a:bodyPr>
+          <a:p>
+            <a:pPr algn="ctr"/>
+            <a:r>
+              <a:rPr lang="pt-BR" altLang="en-US" sz="2800" b="1">
+                <a:solidFill>
+                  <a:schemeClr val="bg1"/>
+                </a:solidFill>
+                <a:latin typeface="Arial" panose="020B0604020202020204" pitchFamily="34" charset="0"/>
+                <a:cs typeface="Arial" panose="020B0604020202020204" pitchFamily="34" charset="0"/>
+              </a:rPr>
+              <a:t>S</a:t>
+            </a:r>
+            <a:endParaRPr lang="pt-BR" altLang="en-US" sz="2800" b="1">
+              <a:solidFill>
+                <a:schemeClr val="bg1"/>
+              </a:solidFill>
+              <a:latin typeface="Arial" panose="020B0604020202020204" pitchFamily="34" charset="0"/>
+              <a:cs typeface="Arial" panose="020B0604020202020204" pitchFamily="34" charset="0"/>
+            </a:endParaRPr>
+          </a:p>
+        </p:txBody>
+      </p:sp>
+      <p:sp>
+        <p:nvSpPr>
+          <p:cNvPr id="10" name="Caixa de Texto 9"/>
+          <p:cNvSpPr txBox="1"/>
+          <p:nvPr/>
+        </p:nvSpPr>
+        <p:spPr>
+          <a:xfrm>
+            <a:off x="5751745" y="225095"/>
+            <a:ext cx="688340" cy="521970"/>
+          </a:xfrm>
+          <a:prstGeom prst="rect">
+            <a:avLst/>
+          </a:prstGeom>
+          <a:noFill/>
+        </p:spPr>
+        <p:txBody>
+          <a:bodyPr wrap="square" rtlCol="0">
+            <a:spAutoFit/>
+          </a:bodyPr>
+          <a:p>
+            <a:pPr algn="ctr"/>
+            <a:r>
+              <a:rPr lang="pt-BR" altLang="en-US" sz="2800" b="1">
+                <a:solidFill>
+                  <a:schemeClr val="bg1"/>
+                </a:solidFill>
+                <a:latin typeface="Arial" panose="020B0604020202020204" pitchFamily="34" charset="0"/>
+                <a:cs typeface="Arial" panose="020B0604020202020204" pitchFamily="34" charset="0"/>
+              </a:rPr>
+              <a:t>S</a:t>
+            </a:r>
+            <a:endParaRPr lang="pt-BR" altLang="en-US" sz="2800" b="1">
+              <a:solidFill>
+                <a:schemeClr val="bg1"/>
+              </a:solidFill>
+              <a:latin typeface="Arial" panose="020B0604020202020204" pitchFamily="34" charset="0"/>
+              <a:cs typeface="Arial" panose="020B0604020202020204" pitchFamily="34" charset="0"/>
+            </a:endParaRPr>
+          </a:p>
+        </p:txBody>
+      </p:sp>
+      <p:pic>
+        <p:nvPicPr>
+          <p:cNvPr id="11" name="Espaço Reservado para Conteúdo 10"/>
+          <p:cNvPicPr>
+            <a:picLocks noChangeAspect="1"/>
+          </p:cNvPicPr>
+          <p:nvPr>
+            <p:ph sz="quarter" idx="13"/>
+          </p:nvPr>
+        </p:nvPicPr>
+        <p:blipFill>
+          <a:blip r:embed="rId4"/>
+          <a:stretch>
+            <a:fillRect/>
+          </a:stretch>
+        </p:blipFill>
+        <p:spPr>
+          <a:xfrm>
+            <a:off x="1911985" y="2268220"/>
+            <a:ext cx="758825" cy="758825"/>
+          </a:xfrm>
+          <a:prstGeom prst="rect">
+            <a:avLst/>
+          </a:prstGeom>
+          <a:effectLst>
+            <a:glow rad="50800">
+              <a:schemeClr val="bg1"/>
+            </a:glow>
+          </a:effectLst>
+        </p:spPr>
+      </p:pic>
+      <p:pic>
+        <p:nvPicPr>
+          <p:cNvPr id="12" name="Imagem 11"/>
+          <p:cNvPicPr>
+            <a:picLocks noChangeAspect="1"/>
+          </p:cNvPicPr>
+          <p:nvPr/>
+        </p:nvPicPr>
+        <p:blipFill>
+          <a:blip r:embed="rId5"/>
+          <a:stretch>
+            <a:fillRect/>
+          </a:stretch>
+        </p:blipFill>
+        <p:spPr>
+          <a:xfrm>
+            <a:off x="9554845" y="1058545"/>
+            <a:ext cx="840105" cy="840105"/>
+          </a:xfrm>
+          <a:prstGeom prst="rect">
+            <a:avLst/>
+          </a:prstGeom>
+          <a:effectLst>
+            <a:glow rad="50800">
+              <a:schemeClr val="bg1"/>
+            </a:glow>
+          </a:effectLst>
+        </p:spPr>
+      </p:pic>
+    </p:spTree>
+  </p:cSld>
+  <p:clrMapOvr>
+    <a:masterClrMapping/>
+  </p:clrMapOvr>
+  <p:timing>
+    <p:tnLst>
+      <p:par>
+        <p:cTn id="1" dur="indefinite" restart="never" nodeType="tmRoot"/>
+      </p:par>
+    </p:tnLst>
+  </p:timing>
+</p:sld>
+</file>
+
+<file path=ppt/slides/slide7.xml><?xml version="1.0" encoding="utf-8"?>
+<p:sld xmlns:a="http://schemas.openxmlformats.org/drawingml/2006/main" xmlns:r="http://schemas.openxmlformats.org/officeDocument/2006/relationships" xmlns:p="http://schemas.openxmlformats.org/presentationml/2006/main">
+  <p:cSld>
+    <p:spTree>
+      <p:nvGrpSpPr>
+        <p:cNvPr id="1" name=""/>
+        <p:cNvGrpSpPr/>
+        <p:nvPr/>
+      </p:nvGrpSpPr>
+      <p:grpSpPr/>
+      <p:sp>
+        <p:nvSpPr>
+          <p:cNvPr id="5" name="Retângulo 4"/>
+          <p:cNvSpPr/>
+          <p:nvPr/>
+        </p:nvSpPr>
+        <p:spPr>
+          <a:xfrm>
+            <a:off x="-38735" y="-27940"/>
+            <a:ext cx="12269470" cy="6885940"/>
+          </a:xfrm>
+          <a:prstGeom prst="rect">
+            <a:avLst/>
+          </a:prstGeom>
+          <a:gradFill>
+            <a:gsLst>
+              <a:gs pos="10000">
+                <a:schemeClr val="accent1">
+                  <a:lumMod val="75000"/>
+                </a:schemeClr>
+              </a:gs>
+              <a:gs pos="48000">
+                <a:schemeClr val="accent1">
+                  <a:lumMod val="50000"/>
+                </a:schemeClr>
+              </a:gs>
+              <a:gs pos="89000">
+                <a:srgbClr val="202020"/>
+              </a:gs>
+            </a:gsLst>
+            <a:lin ang="0" scaled="0"/>
+          </a:gradFill>
+          <a:ln>
+            <a:noFill/>
+          </a:ln>
+        </p:spPr>
+        <p:style>
+          <a:lnRef idx="2">
+            <a:schemeClr val="dk1">
+              <a:shade val="50000"/>
+            </a:schemeClr>
+          </a:lnRef>
+          <a:fillRef idx="1">
+            <a:schemeClr val="dk1"/>
+          </a:fillRef>
+          <a:effectRef idx="0">
+            <a:schemeClr val="dk1"/>
+          </a:effectRef>
+          <a:fontRef idx="minor">
+            <a:schemeClr val="lt1"/>
+          </a:fontRef>
+        </p:style>
+        <p:txBody>
+          <a:bodyPr rtlCol="0" anchor="ctr"/>
+          <a:p>
+            <a:pPr algn="ctr"/>
+            <a:endParaRPr lang="pt-BR" altLang="en-US"/>
+          </a:p>
+        </p:txBody>
+      </p:sp>
+      <p:pic>
+        <p:nvPicPr>
+          <p:cNvPr id="9" name="Imagem 8" descr="Logo PNG"/>
+          <p:cNvPicPr>
+            <a:picLocks noChangeAspect="1"/>
+          </p:cNvPicPr>
+          <p:nvPr/>
+        </p:nvPicPr>
+        <p:blipFill>
+          <a:blip r:embed="rId1"/>
+          <a:srcRect l="13484" t="37760" r="19158" b="36213"/>
+          <a:stretch>
+            <a:fillRect/>
+          </a:stretch>
+        </p:blipFill>
+        <p:spPr>
+          <a:xfrm>
+            <a:off x="139065" y="172720"/>
+            <a:ext cx="1954530" cy="426085"/>
+          </a:xfrm>
+          <a:prstGeom prst="rect">
+            <a:avLst/>
+          </a:prstGeom>
+        </p:spPr>
+      </p:pic>
+      <p:pic>
+        <p:nvPicPr>
+          <p:cNvPr id="13" name="Imagem 12" descr="Logo Unoesc Colorido 2"/>
+          <p:cNvPicPr>
+            <a:picLocks noChangeAspect="1"/>
+          </p:cNvPicPr>
+          <p:nvPr/>
+        </p:nvPicPr>
+        <p:blipFill>
+          <a:blip r:embed="rId2"/>
+          <a:stretch>
+            <a:fillRect/>
+          </a:stretch>
+        </p:blipFill>
+        <p:spPr>
+          <a:xfrm>
+            <a:off x="10748010" y="172720"/>
+            <a:ext cx="1273810" cy="426085"/>
+          </a:xfrm>
+          <a:prstGeom prst="rect">
+            <a:avLst/>
+          </a:prstGeom>
+        </p:spPr>
+      </p:pic>
+      <p:sp>
+        <p:nvSpPr>
+          <p:cNvPr id="6" name="Caixa de Texto 5"/>
+          <p:cNvSpPr txBox="1"/>
+          <p:nvPr/>
+        </p:nvSpPr>
+        <p:spPr>
+          <a:xfrm>
+            <a:off x="286385" y="2896870"/>
+            <a:ext cx="3867150" cy="2584450"/>
+          </a:xfrm>
+          <a:prstGeom prst="rect">
+            <a:avLst/>
+          </a:prstGeom>
+          <a:noFill/>
+        </p:spPr>
+        <p:txBody>
+          <a:bodyPr wrap="square" rtlCol="0">
+            <a:spAutoFit/>
+          </a:bodyPr>
+          <a:p>
+            <a:pPr algn="ctr"/>
+            <a:r>
+              <a:rPr lang="pt-BR" altLang="en-US" b="1">
+                <a:solidFill>
+                  <a:schemeClr val="bg1"/>
+                </a:solidFill>
+                <a:latin typeface="Arial" panose="020B0604020202020204" pitchFamily="34" charset="0"/>
+                <a:cs typeface="Arial" panose="020B0604020202020204" pitchFamily="34" charset="0"/>
+              </a:rPr>
+              <a:t>Relação das viagens, a quantidade de carga total e o valor total(R$). Relacionar somente viagens com valores totais superiores a R$ 4500, realizadas entre 2010 e 2021. Ordene o relatório da viagem com maior valor para a viagem com menor valor.</a:t>
+            </a:r>
+            <a:endParaRPr lang="pt-BR" altLang="en-US" b="1">
+              <a:solidFill>
+                <a:schemeClr val="bg1"/>
+              </a:solidFill>
+              <a:latin typeface="Arial" panose="020B0604020202020204" pitchFamily="34" charset="0"/>
+              <a:cs typeface="Arial" panose="020B0604020202020204" pitchFamily="34" charset="0"/>
+            </a:endParaRPr>
+          </a:p>
+        </p:txBody>
+      </p:sp>
+      <p:sp>
+        <p:nvSpPr>
+          <p:cNvPr id="8" name="Caixa de Texto 7"/>
+          <p:cNvSpPr txBox="1"/>
+          <p:nvPr/>
+        </p:nvSpPr>
+        <p:spPr>
+          <a:xfrm>
+            <a:off x="7702550" y="1511935"/>
+            <a:ext cx="4434205" cy="5354320"/>
+          </a:xfrm>
+          <a:prstGeom prst="rect">
+            <a:avLst/>
+          </a:prstGeom>
+          <a:noFill/>
+        </p:spPr>
+        <p:txBody>
+          <a:bodyPr wrap="square" rtlCol="0">
+            <a:spAutoFit/>
+          </a:bodyPr>
+          <a:p>
+            <a:pPr algn="ctr"/>
+            <a:r>
+              <a:rPr lang="pt-BR" altLang="en-US" b="1">
+                <a:solidFill>
+                  <a:schemeClr val="bg1"/>
+                </a:solidFill>
+                <a:latin typeface="Arial" panose="020B0604020202020204" pitchFamily="34" charset="0"/>
+                <a:cs typeface="Arial" panose="020B0604020202020204" pitchFamily="34" charset="0"/>
+              </a:rPr>
+              <a:t>SELECT</a:t>
+            </a:r>
+            <a:r>
+              <a:rPr lang="pt-BR" altLang="en-US">
+                <a:solidFill>
+                  <a:schemeClr val="bg1"/>
+                </a:solidFill>
+                <a:latin typeface="Arial" panose="020B0604020202020204" pitchFamily="34" charset="0"/>
+                <a:cs typeface="Arial" panose="020B0604020202020204" pitchFamily="34" charset="0"/>
+              </a:rPr>
+              <a:t> v.id_viagem, SUM(v3.vl_peso) qtd_carga, SUM(r.vl_distancia * v2.vl_custoporkm) valor_total, </a:t>
+            </a:r>
+            <a:r>
+              <a:rPr lang="pt-BR" altLang="en-US" b="1">
+                <a:solidFill>
+                  <a:schemeClr val="bg1"/>
+                </a:solidFill>
+                <a:latin typeface="Arial" panose="020B0604020202020204" pitchFamily="34" charset="0"/>
+                <a:cs typeface="Arial" panose="020B0604020202020204" pitchFamily="34" charset="0"/>
+              </a:rPr>
+              <a:t>TO_CHAR</a:t>
+            </a:r>
+            <a:r>
+              <a:rPr lang="pt-BR" altLang="en-US">
+                <a:solidFill>
+                  <a:schemeClr val="bg1"/>
+                </a:solidFill>
+                <a:latin typeface="Arial" panose="020B0604020202020204" pitchFamily="34" charset="0"/>
+                <a:cs typeface="Arial" panose="020B0604020202020204" pitchFamily="34" charset="0"/>
+              </a:rPr>
+              <a:t>(v.dt_momentosaida, 'DD-MM-YYYY') data_viagem</a:t>
+            </a:r>
+            <a:endParaRPr lang="pt-BR" altLang="en-US">
+              <a:solidFill>
+                <a:schemeClr val="bg1"/>
+              </a:solidFill>
+              <a:latin typeface="Arial" panose="020B0604020202020204" pitchFamily="34" charset="0"/>
+              <a:cs typeface="Arial" panose="020B0604020202020204" pitchFamily="34" charset="0"/>
+            </a:endParaRPr>
+          </a:p>
+          <a:p>
+            <a:pPr algn="ctr"/>
+            <a:r>
+              <a:rPr lang="pt-BR" altLang="en-US" b="1">
+                <a:solidFill>
+                  <a:schemeClr val="bg1"/>
+                </a:solidFill>
+                <a:latin typeface="Arial" panose="020B0604020202020204" pitchFamily="34" charset="0"/>
+                <a:cs typeface="Arial" panose="020B0604020202020204" pitchFamily="34" charset="0"/>
+              </a:rPr>
+              <a:t>FROM</a:t>
+            </a:r>
+            <a:r>
+              <a:rPr lang="pt-BR" altLang="en-US">
+                <a:solidFill>
+                  <a:schemeClr val="bg1"/>
+                </a:solidFill>
+                <a:latin typeface="Arial" panose="020B0604020202020204" pitchFamily="34" charset="0"/>
+                <a:cs typeface="Arial" panose="020B0604020202020204" pitchFamily="34" charset="0"/>
+              </a:rPr>
+              <a:t> viagem v</a:t>
+            </a:r>
+            <a:endParaRPr lang="pt-BR" altLang="en-US">
+              <a:solidFill>
+                <a:schemeClr val="bg1"/>
+              </a:solidFill>
+              <a:latin typeface="Arial" panose="020B0604020202020204" pitchFamily="34" charset="0"/>
+              <a:cs typeface="Arial" panose="020B0604020202020204" pitchFamily="34" charset="0"/>
+            </a:endParaRPr>
+          </a:p>
+          <a:p>
+            <a:pPr algn="ctr"/>
+            <a:r>
+              <a:rPr lang="pt-BR" altLang="en-US" b="1">
+                <a:solidFill>
+                  <a:schemeClr val="bg1"/>
+                </a:solidFill>
+                <a:latin typeface="Arial" panose="020B0604020202020204" pitchFamily="34" charset="0"/>
+                <a:cs typeface="Arial" panose="020B0604020202020204" pitchFamily="34" charset="0"/>
+              </a:rPr>
+              <a:t>INNER JOIN</a:t>
+            </a:r>
+            <a:r>
+              <a:rPr lang="pt-BR" altLang="en-US">
+                <a:solidFill>
+                  <a:schemeClr val="bg1"/>
+                </a:solidFill>
+                <a:latin typeface="Arial" panose="020B0604020202020204" pitchFamily="34" charset="0"/>
+                <a:cs typeface="Arial" panose="020B0604020202020204" pitchFamily="34" charset="0"/>
+              </a:rPr>
+              <a:t> rota r ON r.id_rota = v.cd_rota</a:t>
+            </a:r>
+            <a:endParaRPr lang="pt-BR" altLang="en-US">
+              <a:solidFill>
+                <a:schemeClr val="bg1"/>
+              </a:solidFill>
+              <a:latin typeface="Arial" panose="020B0604020202020204" pitchFamily="34" charset="0"/>
+              <a:cs typeface="Arial" panose="020B0604020202020204" pitchFamily="34" charset="0"/>
+            </a:endParaRPr>
+          </a:p>
+          <a:p>
+            <a:pPr algn="ctr"/>
+            <a:r>
+              <a:rPr lang="pt-BR" altLang="en-US" b="1">
+                <a:solidFill>
+                  <a:schemeClr val="bg1"/>
+                </a:solidFill>
+                <a:latin typeface="Arial" panose="020B0604020202020204" pitchFamily="34" charset="0"/>
+                <a:cs typeface="Arial" panose="020B0604020202020204" pitchFamily="34" charset="0"/>
+              </a:rPr>
+              <a:t>INNER JOIN</a:t>
+            </a:r>
+            <a:r>
+              <a:rPr lang="pt-BR" altLang="en-US">
+                <a:solidFill>
+                  <a:schemeClr val="bg1"/>
+                </a:solidFill>
+                <a:latin typeface="Arial" panose="020B0604020202020204" pitchFamily="34" charset="0"/>
+                <a:cs typeface="Arial" panose="020B0604020202020204" pitchFamily="34" charset="0"/>
+              </a:rPr>
+              <a:t> viagemvagao v2 ON v2.cd_viagem = v.id_viagem</a:t>
+            </a:r>
+            <a:endParaRPr lang="pt-BR" altLang="en-US">
+              <a:solidFill>
+                <a:schemeClr val="bg1"/>
+              </a:solidFill>
+              <a:latin typeface="Arial" panose="020B0604020202020204" pitchFamily="34" charset="0"/>
+              <a:cs typeface="Arial" panose="020B0604020202020204" pitchFamily="34" charset="0"/>
+            </a:endParaRPr>
+          </a:p>
+          <a:p>
+            <a:pPr algn="ctr"/>
+            <a:r>
+              <a:rPr lang="pt-BR" altLang="en-US" b="1">
+                <a:solidFill>
+                  <a:schemeClr val="bg1"/>
+                </a:solidFill>
+                <a:latin typeface="Arial" panose="020B0604020202020204" pitchFamily="34" charset="0"/>
+                <a:cs typeface="Arial" panose="020B0604020202020204" pitchFamily="34" charset="0"/>
+              </a:rPr>
+              <a:t>INNER JOIN</a:t>
+            </a:r>
+            <a:r>
+              <a:rPr lang="pt-BR" altLang="en-US">
+                <a:solidFill>
+                  <a:schemeClr val="bg1"/>
+                </a:solidFill>
+                <a:latin typeface="Arial" panose="020B0604020202020204" pitchFamily="34" charset="0"/>
+                <a:cs typeface="Arial" panose="020B0604020202020204" pitchFamily="34" charset="0"/>
+              </a:rPr>
+              <a:t> vagao v3 ON v3.id_vagao = v2.cd_vagao</a:t>
+            </a:r>
+            <a:endParaRPr lang="pt-BR" altLang="en-US">
+              <a:solidFill>
+                <a:schemeClr val="bg1"/>
+              </a:solidFill>
+              <a:latin typeface="Arial" panose="020B0604020202020204" pitchFamily="34" charset="0"/>
+              <a:cs typeface="Arial" panose="020B0604020202020204" pitchFamily="34" charset="0"/>
+            </a:endParaRPr>
+          </a:p>
+          <a:p>
+            <a:pPr algn="ctr"/>
+            <a:r>
+              <a:rPr lang="pt-BR" altLang="en-US" b="1">
+                <a:solidFill>
+                  <a:schemeClr val="bg1"/>
+                </a:solidFill>
+                <a:latin typeface="Arial" panose="020B0604020202020204" pitchFamily="34" charset="0"/>
+                <a:cs typeface="Arial" panose="020B0604020202020204" pitchFamily="34" charset="0"/>
+              </a:rPr>
+              <a:t>WHERE EXTRACT</a:t>
+            </a:r>
+            <a:r>
+              <a:rPr lang="pt-BR" altLang="en-US">
+                <a:solidFill>
+                  <a:schemeClr val="bg1"/>
+                </a:solidFill>
+                <a:latin typeface="Arial" panose="020B0604020202020204" pitchFamily="34" charset="0"/>
+                <a:cs typeface="Arial" panose="020B0604020202020204" pitchFamily="34" charset="0"/>
+              </a:rPr>
+              <a:t>('Year' FROM v.dt_momentosaida) BETWEEN 2010 AND 2021</a:t>
+            </a:r>
+            <a:endParaRPr lang="pt-BR" altLang="en-US">
+              <a:solidFill>
+                <a:schemeClr val="bg1"/>
+              </a:solidFill>
+              <a:latin typeface="Arial" panose="020B0604020202020204" pitchFamily="34" charset="0"/>
+              <a:cs typeface="Arial" panose="020B0604020202020204" pitchFamily="34" charset="0"/>
+            </a:endParaRPr>
+          </a:p>
+          <a:p>
+            <a:pPr algn="ctr"/>
+            <a:r>
+              <a:rPr lang="pt-BR" altLang="en-US" b="1">
+                <a:solidFill>
+                  <a:schemeClr val="bg1"/>
+                </a:solidFill>
+                <a:latin typeface="Arial" panose="020B0604020202020204" pitchFamily="34" charset="0"/>
+                <a:cs typeface="Arial" panose="020B0604020202020204" pitchFamily="34" charset="0"/>
+              </a:rPr>
+              <a:t>GROUP BY</a:t>
+            </a:r>
+            <a:r>
+              <a:rPr lang="pt-BR" altLang="en-US">
+                <a:solidFill>
+                  <a:schemeClr val="bg1"/>
+                </a:solidFill>
+                <a:latin typeface="Arial" panose="020B0604020202020204" pitchFamily="34" charset="0"/>
+                <a:cs typeface="Arial" panose="020B0604020202020204" pitchFamily="34" charset="0"/>
+              </a:rPr>
+              <a:t> v.id_viagem</a:t>
+            </a:r>
+            <a:endParaRPr lang="pt-BR" altLang="en-US">
+              <a:solidFill>
+                <a:schemeClr val="bg1"/>
+              </a:solidFill>
+              <a:latin typeface="Arial" panose="020B0604020202020204" pitchFamily="34" charset="0"/>
+              <a:cs typeface="Arial" panose="020B0604020202020204" pitchFamily="34" charset="0"/>
+            </a:endParaRPr>
+          </a:p>
+          <a:p>
+            <a:pPr algn="ctr"/>
+            <a:r>
+              <a:rPr lang="pt-BR" altLang="en-US" b="1">
+                <a:solidFill>
+                  <a:schemeClr val="bg1"/>
+                </a:solidFill>
+                <a:latin typeface="Arial" panose="020B0604020202020204" pitchFamily="34" charset="0"/>
+                <a:cs typeface="Arial" panose="020B0604020202020204" pitchFamily="34" charset="0"/>
+              </a:rPr>
+              <a:t>HAVING SUM</a:t>
+            </a:r>
+            <a:r>
+              <a:rPr lang="pt-BR" altLang="en-US">
+                <a:solidFill>
+                  <a:schemeClr val="bg1"/>
+                </a:solidFill>
+                <a:latin typeface="Arial" panose="020B0604020202020204" pitchFamily="34" charset="0"/>
+                <a:cs typeface="Arial" panose="020B0604020202020204" pitchFamily="34" charset="0"/>
+              </a:rPr>
+              <a:t>(r.vl_distancia * v2.vl_custoporkm) &gt; 4500</a:t>
+            </a:r>
+            <a:endParaRPr lang="pt-BR" altLang="en-US">
+              <a:solidFill>
+                <a:schemeClr val="bg1"/>
+              </a:solidFill>
+              <a:latin typeface="Arial" panose="020B0604020202020204" pitchFamily="34" charset="0"/>
+              <a:cs typeface="Arial" panose="020B0604020202020204" pitchFamily="34" charset="0"/>
+            </a:endParaRPr>
+          </a:p>
+          <a:p>
+            <a:pPr algn="ctr"/>
+            <a:r>
+              <a:rPr lang="pt-BR" altLang="en-US" b="1">
+                <a:solidFill>
+                  <a:schemeClr val="bg1"/>
+                </a:solidFill>
+                <a:latin typeface="Arial" panose="020B0604020202020204" pitchFamily="34" charset="0"/>
+                <a:cs typeface="Arial" panose="020B0604020202020204" pitchFamily="34" charset="0"/>
+              </a:rPr>
+              <a:t>ORDER BY</a:t>
+            </a:r>
+            <a:r>
+              <a:rPr lang="pt-BR" altLang="en-US">
+                <a:solidFill>
+                  <a:schemeClr val="bg1"/>
+                </a:solidFill>
+                <a:latin typeface="Arial" panose="020B0604020202020204" pitchFamily="34" charset="0"/>
+                <a:cs typeface="Arial" panose="020B0604020202020204" pitchFamily="34" charset="0"/>
+              </a:rPr>
+              <a:t> valor_total DESC; </a:t>
+            </a:r>
+            <a:endParaRPr lang="pt-BR" altLang="en-US">
+              <a:solidFill>
+                <a:schemeClr val="bg1"/>
+              </a:solidFill>
+              <a:latin typeface="Arial" panose="020B0604020202020204" pitchFamily="34" charset="0"/>
+              <a:cs typeface="Arial" panose="020B0604020202020204" pitchFamily="34" charset="0"/>
+            </a:endParaRPr>
+          </a:p>
+        </p:txBody>
+      </p:sp>
+      <p:pic>
+        <p:nvPicPr>
+          <p:cNvPr id="2" name="Espaço Reservado para Conteúdo 6"/>
+          <p:cNvPicPr>
+            <a:picLocks noChangeAspect="1"/>
+          </p:cNvPicPr>
+          <p:nvPr/>
+        </p:nvPicPr>
+        <p:blipFill>
+          <a:blip r:embed="rId3">
+            <a:alphaModFix amt="47000"/>
+          </a:blip>
+          <a:srcRect l="10573" t="3619" r="11935"/>
+          <a:stretch>
+            <a:fillRect/>
+          </a:stretch>
+        </p:blipFill>
+        <p:spPr>
+          <a:xfrm>
+            <a:off x="4449445" y="-27940"/>
+            <a:ext cx="3253105" cy="4197985"/>
+          </a:xfrm>
+          <a:prstGeom prst="rect">
+            <a:avLst/>
+          </a:prstGeom>
+          <a:noFill/>
+          <a:effectLst>
+            <a:glow rad="38100">
+              <a:schemeClr val="bg1">
+                <a:alpha val="0"/>
+              </a:schemeClr>
+            </a:glow>
+          </a:effectLst>
+        </p:spPr>
+      </p:pic>
+      <p:pic>
+        <p:nvPicPr>
+          <p:cNvPr id="27" name="Espaço Reservado para Conteúdo 6"/>
+          <p:cNvPicPr>
+            <a:picLocks noChangeAspect="1"/>
+          </p:cNvPicPr>
+          <p:nvPr/>
+        </p:nvPicPr>
+        <p:blipFill>
+          <a:blip r:embed="rId3">
+            <a:alphaModFix amt="47000"/>
+          </a:blip>
+          <a:srcRect l="9292" t="3619" r="8255" b="27661"/>
+          <a:stretch>
+            <a:fillRect/>
+          </a:stretch>
+        </p:blipFill>
+        <p:spPr>
+          <a:xfrm>
+            <a:off x="4402455" y="4037330"/>
+            <a:ext cx="3431540" cy="2820670"/>
+          </a:xfrm>
+          <a:prstGeom prst="rect">
+            <a:avLst/>
+          </a:prstGeom>
+          <a:noFill/>
+          <a:effectLst>
+            <a:glow rad="127000">
+              <a:schemeClr val="accent1">
+                <a:alpha val="0"/>
+              </a:schemeClr>
+            </a:glow>
+          </a:effectLst>
+        </p:spPr>
+      </p:pic>
+      <p:sp>
+        <p:nvSpPr>
+          <p:cNvPr id="21" name="Caixa de Texto 20"/>
+          <p:cNvSpPr txBox="1"/>
+          <p:nvPr/>
+        </p:nvSpPr>
+        <p:spPr>
+          <a:xfrm>
+            <a:off x="5760635" y="1218235"/>
+            <a:ext cx="688340" cy="521970"/>
+          </a:xfrm>
+          <a:prstGeom prst="rect">
+            <a:avLst/>
+          </a:prstGeom>
+          <a:noFill/>
+        </p:spPr>
+        <p:txBody>
+          <a:bodyPr wrap="square" rtlCol="0">
+            <a:spAutoFit/>
+          </a:bodyPr>
+          <a:p>
+            <a:pPr algn="ctr"/>
+            <a:r>
+              <a:rPr lang="pt-BR" altLang="en-US" sz="2800" b="1">
+                <a:solidFill>
+                  <a:schemeClr val="bg1"/>
+                </a:solidFill>
+                <a:latin typeface="Arial" panose="020B0604020202020204" pitchFamily="34" charset="0"/>
+                <a:cs typeface="Arial" panose="020B0604020202020204" pitchFamily="34" charset="0"/>
+              </a:rPr>
+              <a:t>E</a:t>
+            </a:r>
+            <a:endParaRPr lang="pt-BR" altLang="en-US" sz="2800" b="1">
+              <a:solidFill>
+                <a:schemeClr val="bg1"/>
+              </a:solidFill>
+              <a:latin typeface="Arial" panose="020B0604020202020204" pitchFamily="34" charset="0"/>
+              <a:cs typeface="Arial" panose="020B0604020202020204" pitchFamily="34" charset="0"/>
+            </a:endParaRPr>
+          </a:p>
+        </p:txBody>
+      </p:sp>
+      <p:sp>
+        <p:nvSpPr>
+          <p:cNvPr id="22" name="Caixa de Texto 21"/>
+          <p:cNvSpPr txBox="1"/>
+          <p:nvPr/>
+        </p:nvSpPr>
+        <p:spPr>
+          <a:xfrm>
+            <a:off x="5752465" y="2268220"/>
+            <a:ext cx="688340" cy="521970"/>
+          </a:xfrm>
+          <a:prstGeom prst="rect">
+            <a:avLst/>
+          </a:prstGeom>
+          <a:noFill/>
+        </p:spPr>
+        <p:txBody>
+          <a:bodyPr wrap="square" rtlCol="0">
+            <a:spAutoFit/>
+          </a:bodyPr>
+          <a:p>
+            <a:pPr algn="ctr"/>
+            <a:r>
+              <a:rPr lang="pt-BR" altLang="en-US" sz="2800" b="1">
+                <a:solidFill>
+                  <a:schemeClr val="bg1"/>
+                </a:solidFill>
+                <a:latin typeface="Arial" panose="020B0604020202020204" pitchFamily="34" charset="0"/>
+                <a:cs typeface="Arial" panose="020B0604020202020204" pitchFamily="34" charset="0"/>
+              </a:rPr>
+              <a:t>L</a:t>
+            </a:r>
+            <a:endParaRPr lang="pt-BR" altLang="en-US" sz="2800" b="1">
+              <a:solidFill>
+                <a:schemeClr val="bg1"/>
+              </a:solidFill>
+              <a:latin typeface="Arial" panose="020B0604020202020204" pitchFamily="34" charset="0"/>
+              <a:cs typeface="Arial" panose="020B0604020202020204" pitchFamily="34" charset="0"/>
+            </a:endParaRPr>
+          </a:p>
+        </p:txBody>
+      </p:sp>
+      <p:sp>
+        <p:nvSpPr>
+          <p:cNvPr id="24" name="Caixa de Texto 23"/>
+          <p:cNvSpPr txBox="1"/>
+          <p:nvPr/>
+        </p:nvSpPr>
+        <p:spPr>
+          <a:xfrm>
+            <a:off x="5752465" y="3318510"/>
+            <a:ext cx="688340" cy="521970"/>
+          </a:xfrm>
+          <a:prstGeom prst="rect">
+            <a:avLst/>
+          </a:prstGeom>
+          <a:noFill/>
+        </p:spPr>
+        <p:txBody>
+          <a:bodyPr wrap="square" rtlCol="0">
+            <a:spAutoFit/>
+          </a:bodyPr>
+          <a:p>
+            <a:pPr algn="ctr"/>
+            <a:r>
+              <a:rPr lang="pt-BR" altLang="en-US" sz="2800" b="1">
+                <a:solidFill>
+                  <a:schemeClr val="bg1"/>
+                </a:solidFill>
+                <a:latin typeface="Arial" panose="020B0604020202020204" pitchFamily="34" charset="0"/>
+                <a:cs typeface="Arial" panose="020B0604020202020204" pitchFamily="34" charset="0"/>
+              </a:rPr>
+              <a:t>E</a:t>
+            </a:r>
+            <a:endParaRPr lang="pt-BR" altLang="en-US" sz="2800" b="1">
+              <a:solidFill>
+                <a:schemeClr val="bg1"/>
+              </a:solidFill>
+              <a:latin typeface="Arial" panose="020B0604020202020204" pitchFamily="34" charset="0"/>
+              <a:cs typeface="Arial" panose="020B0604020202020204" pitchFamily="34" charset="0"/>
+            </a:endParaRPr>
+          </a:p>
+        </p:txBody>
+      </p:sp>
+      <p:sp>
+        <p:nvSpPr>
+          <p:cNvPr id="25" name="Caixa de Texto 24"/>
+          <p:cNvSpPr txBox="1"/>
+          <p:nvPr/>
+        </p:nvSpPr>
+        <p:spPr>
+          <a:xfrm>
+            <a:off x="5760720" y="4258945"/>
+            <a:ext cx="688340" cy="521970"/>
+          </a:xfrm>
+          <a:prstGeom prst="rect">
+            <a:avLst/>
+          </a:prstGeom>
+          <a:noFill/>
+        </p:spPr>
+        <p:txBody>
+          <a:bodyPr wrap="square" rtlCol="0">
+            <a:spAutoFit/>
+          </a:bodyPr>
+          <a:p>
+            <a:pPr algn="ctr"/>
+            <a:r>
+              <a:rPr lang="pt-BR" altLang="en-US" sz="2800" b="1">
+                <a:solidFill>
+                  <a:schemeClr val="bg1"/>
+                </a:solidFill>
+                <a:latin typeface="Arial" panose="020B0604020202020204" pitchFamily="34" charset="0"/>
+                <a:cs typeface="Arial" panose="020B0604020202020204" pitchFamily="34" charset="0"/>
+              </a:rPr>
+              <a:t>C</a:t>
+            </a:r>
+            <a:endParaRPr lang="pt-BR" altLang="en-US" sz="2800" b="1">
+              <a:solidFill>
+                <a:schemeClr val="bg1"/>
+              </a:solidFill>
+              <a:latin typeface="Arial" panose="020B0604020202020204" pitchFamily="34" charset="0"/>
+              <a:cs typeface="Arial" panose="020B0604020202020204" pitchFamily="34" charset="0"/>
+            </a:endParaRPr>
+          </a:p>
+        </p:txBody>
+      </p:sp>
+      <p:sp>
+        <p:nvSpPr>
+          <p:cNvPr id="28" name="Caixa de Texto 27"/>
+          <p:cNvSpPr txBox="1"/>
+          <p:nvPr/>
+        </p:nvSpPr>
+        <p:spPr>
+          <a:xfrm>
+            <a:off x="5751830" y="5199380"/>
+            <a:ext cx="688340" cy="521970"/>
+          </a:xfrm>
+          <a:prstGeom prst="rect">
+            <a:avLst/>
+          </a:prstGeom>
+          <a:noFill/>
+        </p:spPr>
+        <p:txBody>
+          <a:bodyPr wrap="square" rtlCol="0">
+            <a:spAutoFit/>
+          </a:bodyPr>
+          <a:p>
+            <a:pPr algn="ctr"/>
+            <a:r>
+              <a:rPr lang="pt-BR" altLang="en-US" sz="2800" b="1">
+                <a:solidFill>
+                  <a:schemeClr val="bg1"/>
+                </a:solidFill>
+                <a:latin typeface="Arial" panose="020B0604020202020204" pitchFamily="34" charset="0"/>
+                <a:cs typeface="Arial" panose="020B0604020202020204" pitchFamily="34" charset="0"/>
+              </a:rPr>
+              <a:t>T</a:t>
+            </a:r>
+            <a:endParaRPr lang="pt-BR" altLang="en-US" sz="2800" b="1">
+              <a:solidFill>
+                <a:schemeClr val="bg1"/>
+              </a:solidFill>
+              <a:latin typeface="Arial" panose="020B0604020202020204" pitchFamily="34" charset="0"/>
+              <a:cs typeface="Arial" panose="020B0604020202020204" pitchFamily="34" charset="0"/>
+            </a:endParaRPr>
+          </a:p>
+        </p:txBody>
+      </p:sp>
+      <p:sp>
+        <p:nvSpPr>
+          <p:cNvPr id="7" name="Caixa de Texto 6"/>
+          <p:cNvSpPr txBox="1"/>
+          <p:nvPr/>
+        </p:nvSpPr>
+        <p:spPr>
+          <a:xfrm>
+            <a:off x="5760000" y="6192000"/>
+            <a:ext cx="688340" cy="521970"/>
+          </a:xfrm>
+          <a:prstGeom prst="rect">
+            <a:avLst/>
+          </a:prstGeom>
+          <a:noFill/>
+        </p:spPr>
+        <p:txBody>
+          <a:bodyPr wrap="square" rtlCol="0">
+            <a:spAutoFit/>
+          </a:bodyPr>
+          <a:p>
+            <a:pPr algn="ctr"/>
+            <a:r>
+              <a:rPr lang="pt-BR" altLang="en-US" sz="2800" b="1">
+                <a:solidFill>
+                  <a:schemeClr val="bg1"/>
+                </a:solidFill>
+                <a:latin typeface="Arial" panose="020B0604020202020204" pitchFamily="34" charset="0"/>
+                <a:cs typeface="Arial" panose="020B0604020202020204" pitchFamily="34" charset="0"/>
+              </a:rPr>
+              <a:t>S</a:t>
+            </a:r>
+            <a:endParaRPr lang="pt-BR" altLang="en-US" sz="2800" b="1">
+              <a:solidFill>
+                <a:schemeClr val="bg1"/>
+              </a:solidFill>
+              <a:latin typeface="Arial" panose="020B0604020202020204" pitchFamily="34" charset="0"/>
+              <a:cs typeface="Arial" panose="020B0604020202020204" pitchFamily="34" charset="0"/>
+            </a:endParaRPr>
+          </a:p>
+        </p:txBody>
+      </p:sp>
+      <p:sp>
+        <p:nvSpPr>
+          <p:cNvPr id="10" name="Caixa de Texto 9"/>
+          <p:cNvSpPr txBox="1"/>
+          <p:nvPr/>
+        </p:nvSpPr>
+        <p:spPr>
+          <a:xfrm>
+            <a:off x="5751745" y="225095"/>
+            <a:ext cx="688340" cy="521970"/>
+          </a:xfrm>
+          <a:prstGeom prst="rect">
+            <a:avLst/>
+          </a:prstGeom>
+          <a:noFill/>
+        </p:spPr>
+        <p:txBody>
+          <a:bodyPr wrap="square" rtlCol="0">
+            <a:spAutoFit/>
+          </a:bodyPr>
+          <a:p>
+            <a:pPr algn="ctr"/>
+            <a:r>
+              <a:rPr lang="pt-BR" altLang="en-US" sz="2800" b="1">
+                <a:solidFill>
+                  <a:schemeClr val="bg1"/>
+                </a:solidFill>
+                <a:latin typeface="Arial" panose="020B0604020202020204" pitchFamily="34" charset="0"/>
+                <a:cs typeface="Arial" panose="020B0604020202020204" pitchFamily="34" charset="0"/>
+              </a:rPr>
+              <a:t>S</a:t>
+            </a:r>
+            <a:endParaRPr lang="pt-BR" altLang="en-US" sz="2800" b="1">
+              <a:solidFill>
+                <a:schemeClr val="bg1"/>
+              </a:solidFill>
+              <a:latin typeface="Arial" panose="020B0604020202020204" pitchFamily="34" charset="0"/>
+              <a:cs typeface="Arial" panose="020B0604020202020204" pitchFamily="34" charset="0"/>
+            </a:endParaRPr>
+          </a:p>
+        </p:txBody>
+      </p:sp>
+      <p:pic>
+        <p:nvPicPr>
+          <p:cNvPr id="11" name="Espaço Reservado para Conteúdo 10"/>
+          <p:cNvPicPr>
+            <a:picLocks noChangeAspect="1"/>
+          </p:cNvPicPr>
+          <p:nvPr>
+            <p:ph sz="quarter" idx="13"/>
+          </p:nvPr>
+        </p:nvPicPr>
+        <p:blipFill>
+          <a:blip r:embed="rId4"/>
+          <a:stretch>
+            <a:fillRect/>
+          </a:stretch>
+        </p:blipFill>
+        <p:spPr>
+          <a:xfrm>
+            <a:off x="1838325" y="2031365"/>
+            <a:ext cx="758825" cy="758825"/>
+          </a:xfrm>
+          <a:prstGeom prst="rect">
+            <a:avLst/>
+          </a:prstGeom>
+          <a:effectLst>
+            <a:glow rad="50800">
+              <a:schemeClr val="bg1"/>
+            </a:glow>
+          </a:effectLst>
+        </p:spPr>
+      </p:pic>
+      <p:pic>
+        <p:nvPicPr>
+          <p:cNvPr id="12" name="Imagem 11"/>
+          <p:cNvPicPr>
+            <a:picLocks noChangeAspect="1"/>
+          </p:cNvPicPr>
+          <p:nvPr/>
+        </p:nvPicPr>
+        <p:blipFill>
+          <a:blip r:embed="rId5"/>
+          <a:stretch>
+            <a:fillRect/>
+          </a:stretch>
+        </p:blipFill>
+        <p:spPr>
+          <a:xfrm>
+            <a:off x="9554845" y="598805"/>
+            <a:ext cx="840105" cy="840105"/>
+          </a:xfrm>
+          <a:prstGeom prst="rect">
+            <a:avLst/>
+          </a:prstGeom>
+          <a:effectLst>
+            <a:glow rad="50800">
+              <a:schemeClr val="bg1"/>
+            </a:glow>
+          </a:effectLst>
+        </p:spPr>
+      </p:pic>
+    </p:spTree>
+  </p:cSld>
+  <p:clrMapOvr>
+    <a:masterClrMapping/>
+  </p:clrMapOvr>
+  <p:timing>
+    <p:tnLst>
+      <p:par>
+        <p:cTn id="1" dur="indefinite" restart="never" nodeType="tmRoot"/>
+      </p:par>
+    </p:tnLst>
+  </p:timing>
+</p:sld>
+</file>
+
+<file path=ppt/slides/slide8.xml><?xml version="1.0" encoding="utf-8"?>
+<p:sld xmlns:a="http://schemas.openxmlformats.org/drawingml/2006/main" xmlns:r="http://schemas.openxmlformats.org/officeDocument/2006/relationships" xmlns:p="http://schemas.openxmlformats.org/presentationml/2006/main">
+  <p:cSld>
+    <p:spTree>
+      <p:nvGrpSpPr>
+        <p:cNvPr id="1" name=""/>
+        <p:cNvGrpSpPr/>
+        <p:nvPr/>
+      </p:nvGrpSpPr>
+      <p:grpSpPr/>
+      <p:sp>
+        <p:nvSpPr>
+          <p:cNvPr id="23" name="Título 22"/>
+          <p:cNvSpPr>
+            <a:spLocks noGrp="1"/>
+          </p:cNvSpPr>
+          <p:nvPr>
+            <p:ph type="title"/>
+          </p:nvPr>
+        </p:nvSpPr>
+        <p:spPr/>
+        <p:txBody>
+          <a:bodyPr/>
+          <a:p>
+            <a:endParaRPr lang="pt-BR" altLang="en-US"/>
+          </a:p>
+        </p:txBody>
+      </p:sp>
+      <p:sp>
+        <p:nvSpPr>
+          <p:cNvPr id="5" name="Retângulo 4"/>
+          <p:cNvSpPr/>
+          <p:nvPr/>
+        </p:nvSpPr>
+        <p:spPr>
+          <a:xfrm>
+            <a:off x="-38735" y="-27940"/>
+            <a:ext cx="12269470" cy="6885940"/>
+          </a:xfrm>
+          <a:prstGeom prst="rect">
+            <a:avLst/>
+          </a:prstGeom>
+          <a:gradFill>
+            <a:gsLst>
+              <a:gs pos="10000">
+                <a:schemeClr val="accent1">
+                  <a:lumMod val="75000"/>
+                </a:schemeClr>
+              </a:gs>
+              <a:gs pos="48000">
+                <a:schemeClr val="accent1">
+                  <a:lumMod val="50000"/>
+                </a:schemeClr>
+              </a:gs>
+              <a:gs pos="89000">
+                <a:srgbClr val="202020"/>
+              </a:gs>
+            </a:gsLst>
+            <a:lin ang="0" scaled="0"/>
+          </a:gradFill>
+          <a:ln>
+            <a:noFill/>
+          </a:ln>
+        </p:spPr>
+        <p:style>
+          <a:lnRef idx="2">
+            <a:schemeClr val="dk1">
+              <a:shade val="50000"/>
+            </a:schemeClr>
+          </a:lnRef>
+          <a:fillRef idx="1">
+            <a:schemeClr val="dk1"/>
+          </a:fillRef>
+          <a:effectRef idx="0">
+            <a:schemeClr val="dk1"/>
+          </a:effectRef>
+          <a:fontRef idx="minor">
+            <a:schemeClr val="lt1"/>
+          </a:fontRef>
+        </p:style>
+        <p:txBody>
+          <a:bodyPr rtlCol="0" anchor="ctr"/>
+          <a:p>
+            <a:pPr algn="ctr"/>
+            <a:endParaRPr lang="pt-BR" altLang="en-US"/>
+          </a:p>
+        </p:txBody>
+      </p:sp>
+      <p:pic>
+        <p:nvPicPr>
+          <p:cNvPr id="9" name="Imagem 8" descr="Logo PNG"/>
+          <p:cNvPicPr>
+            <a:picLocks noChangeAspect="1"/>
+          </p:cNvPicPr>
+          <p:nvPr/>
+        </p:nvPicPr>
+        <p:blipFill>
+          <a:blip r:embed="rId1"/>
+          <a:srcRect l="13484" t="37760" r="19158" b="36213"/>
+          <a:stretch>
+            <a:fillRect/>
+          </a:stretch>
+        </p:blipFill>
+        <p:spPr>
+          <a:xfrm>
+            <a:off x="139065" y="172720"/>
+            <a:ext cx="1954530" cy="426085"/>
+          </a:xfrm>
+          <a:prstGeom prst="rect">
+            <a:avLst/>
+          </a:prstGeom>
+        </p:spPr>
+      </p:pic>
+      <p:pic>
+        <p:nvPicPr>
+          <p:cNvPr id="13" name="Imagem 12" descr="Logo Unoesc Colorido 2"/>
+          <p:cNvPicPr>
+            <a:picLocks noChangeAspect="1"/>
+          </p:cNvPicPr>
+          <p:nvPr/>
+        </p:nvPicPr>
+        <p:blipFill>
+          <a:blip r:embed="rId2"/>
+          <a:stretch>
+            <a:fillRect/>
+          </a:stretch>
+        </p:blipFill>
+        <p:spPr>
+          <a:xfrm>
+            <a:off x="10748010" y="172720"/>
+            <a:ext cx="1273810" cy="426085"/>
+          </a:xfrm>
+          <a:prstGeom prst="rect">
+            <a:avLst/>
+          </a:prstGeom>
+        </p:spPr>
+      </p:pic>
+      <p:sp>
+        <p:nvSpPr>
+          <p:cNvPr id="3" name="Caixa de Texto 2"/>
+          <p:cNvSpPr txBox="1"/>
+          <p:nvPr/>
+        </p:nvSpPr>
+        <p:spPr>
+          <a:xfrm>
+            <a:off x="1574800" y="3020695"/>
+            <a:ext cx="1645920" cy="368300"/>
+          </a:xfrm>
+          <a:prstGeom prst="rect">
+            <a:avLst/>
+          </a:prstGeom>
+          <a:noFill/>
+        </p:spPr>
+        <p:txBody>
+          <a:bodyPr wrap="square" rtlCol="0">
+            <a:spAutoFit/>
+          </a:bodyPr>
+          <a:p>
+            <a:pPr algn="ctr"/>
+            <a:r>
+              <a:rPr lang="pt-BR" altLang="en-US" b="1">
+                <a:solidFill>
+                  <a:schemeClr val="bg1"/>
+                </a:solidFill>
+                <a:highlight>
+                  <a:srgbClr val="000000"/>
+                </a:highlight>
+                <a:latin typeface="Arial" panose="020B0604020202020204" pitchFamily="34" charset="0"/>
+                <a:cs typeface="Arial" panose="020B0604020202020204" pitchFamily="34" charset="0"/>
+                <a:hlinkClick r:id="rId3" action="ppaction://hlinkfile"/>
+              </a:rPr>
+              <a:t>REQUISITOS</a:t>
+            </a:r>
+            <a:endParaRPr lang="pt-BR" altLang="en-US" b="1">
+              <a:solidFill>
+                <a:schemeClr val="bg1"/>
+              </a:solidFill>
+              <a:highlight>
+                <a:srgbClr val="000000"/>
+              </a:highlight>
+              <a:latin typeface="Arial" panose="020B0604020202020204" pitchFamily="34" charset="0"/>
+              <a:cs typeface="Arial" panose="020B0604020202020204" pitchFamily="34" charset="0"/>
+              <a:hlinkClick r:id="rId3" action="ppaction://hlinkfile"/>
+            </a:endParaRPr>
+          </a:p>
+        </p:txBody>
+      </p:sp>
+      <p:sp>
+        <p:nvSpPr>
+          <p:cNvPr id="4" name="Caixa de Texto 3"/>
+          <p:cNvSpPr txBox="1"/>
+          <p:nvPr/>
+        </p:nvSpPr>
+        <p:spPr>
+          <a:xfrm>
+            <a:off x="1574800" y="3782695"/>
+            <a:ext cx="1645920" cy="583565"/>
+          </a:xfrm>
+          <a:prstGeom prst="rect">
+            <a:avLst/>
+          </a:prstGeom>
+          <a:noFill/>
+        </p:spPr>
+        <p:txBody>
+          <a:bodyPr wrap="square" rtlCol="0">
+            <a:spAutoFit/>
+          </a:bodyPr>
+          <a:p>
+            <a:pPr algn="ctr"/>
+            <a:r>
+              <a:rPr lang="pt-BR" altLang="en-US" sz="1600" b="1">
+                <a:solidFill>
+                  <a:schemeClr val="bg1"/>
+                </a:solidFill>
+                <a:highlight>
+                  <a:srgbClr val="000000"/>
+                </a:highlight>
+                <a:latin typeface="Arial" panose="020B0604020202020204" pitchFamily="34" charset="0"/>
+                <a:cs typeface="Arial" panose="020B0604020202020204" pitchFamily="34" charset="0"/>
+                <a:hlinkClick r:id="rId4" action="ppaction://hlinkfile"/>
+              </a:rPr>
+              <a:t>DICIONÁRIO DE DADOS</a:t>
+            </a:r>
+            <a:endParaRPr lang="pt-BR" altLang="en-US" sz="1600" b="1">
+              <a:solidFill>
+                <a:schemeClr val="bg1"/>
+              </a:solidFill>
+              <a:highlight>
+                <a:srgbClr val="000000"/>
+              </a:highlight>
+              <a:latin typeface="Arial" panose="020B0604020202020204" pitchFamily="34" charset="0"/>
+              <a:cs typeface="Arial" panose="020B0604020202020204" pitchFamily="34" charset="0"/>
+              <a:hlinkClick r:id="rId4" action="ppaction://hlinkfile"/>
+            </a:endParaRPr>
+          </a:p>
+        </p:txBody>
+      </p:sp>
+      <p:sp>
+        <p:nvSpPr>
+          <p:cNvPr id="6" name="Caixa de Texto 5"/>
+          <p:cNvSpPr txBox="1"/>
+          <p:nvPr/>
+        </p:nvSpPr>
+        <p:spPr>
+          <a:xfrm>
+            <a:off x="9746615" y="3020695"/>
+            <a:ext cx="1645920" cy="368300"/>
+          </a:xfrm>
+          <a:prstGeom prst="rect">
+            <a:avLst/>
+          </a:prstGeom>
+          <a:noFill/>
+        </p:spPr>
+        <p:txBody>
+          <a:bodyPr wrap="square" rtlCol="0">
+            <a:spAutoFit/>
+          </a:bodyPr>
+          <a:p>
+            <a:pPr algn="ctr"/>
+            <a:r>
+              <a:rPr lang="pt-BR" altLang="en-US" b="1">
+                <a:solidFill>
+                  <a:schemeClr val="bg1"/>
+                </a:solidFill>
+                <a:highlight>
+                  <a:srgbClr val="000000"/>
+                </a:highlight>
+                <a:latin typeface="Arial" panose="020B0604020202020204" pitchFamily="34" charset="0"/>
+                <a:cs typeface="Arial" panose="020B0604020202020204" pitchFamily="34" charset="0"/>
+                <a:hlinkClick r:id="rId5" action="ppaction://hlinkfile"/>
+              </a:rPr>
+              <a:t>MODELO ER</a:t>
+            </a:r>
+            <a:endParaRPr lang="pt-BR" altLang="en-US" b="1">
+              <a:solidFill>
+                <a:schemeClr val="bg1"/>
+              </a:solidFill>
+              <a:highlight>
+                <a:srgbClr val="000000"/>
+              </a:highlight>
+              <a:latin typeface="Arial" panose="020B0604020202020204" pitchFamily="34" charset="0"/>
+              <a:cs typeface="Arial" panose="020B0604020202020204" pitchFamily="34" charset="0"/>
+              <a:hlinkClick r:id="rId5" action="ppaction://hlinkfile"/>
+            </a:endParaRPr>
+          </a:p>
+        </p:txBody>
+      </p:sp>
+      <p:sp>
+        <p:nvSpPr>
+          <p:cNvPr id="8" name="Caixa de Texto 7"/>
+          <p:cNvSpPr txBox="1"/>
+          <p:nvPr/>
+        </p:nvSpPr>
+        <p:spPr>
+          <a:xfrm>
+            <a:off x="9746615" y="3890645"/>
+            <a:ext cx="1316355" cy="368300"/>
+          </a:xfrm>
+          <a:prstGeom prst="rect">
+            <a:avLst/>
+          </a:prstGeom>
+          <a:noFill/>
+        </p:spPr>
+        <p:txBody>
+          <a:bodyPr wrap="square" rtlCol="0">
+            <a:spAutoFit/>
+          </a:bodyPr>
+          <a:p>
+            <a:pPr algn="ctr"/>
+            <a:r>
+              <a:rPr lang="pt-BR" altLang="en-US" b="1">
+                <a:solidFill>
+                  <a:schemeClr val="bg1"/>
+                </a:solidFill>
+                <a:highlight>
+                  <a:srgbClr val="000000"/>
+                </a:highlight>
+                <a:latin typeface="Arial" panose="020B0604020202020204" pitchFamily="34" charset="0"/>
+                <a:cs typeface="Arial" panose="020B0604020202020204" pitchFamily="34" charset="0"/>
+                <a:hlinkClick r:id="rId6" action="ppaction://hlinkfile"/>
+              </a:rPr>
+              <a:t>SCRIPTS</a:t>
+            </a:r>
+            <a:endParaRPr lang="pt-BR" altLang="en-US" b="1">
+              <a:solidFill>
+                <a:schemeClr val="bg1"/>
+              </a:solidFill>
+              <a:highlight>
+                <a:srgbClr val="000000"/>
+              </a:highlight>
+              <a:latin typeface="Arial" panose="020B0604020202020204" pitchFamily="34" charset="0"/>
+              <a:cs typeface="Arial" panose="020B0604020202020204" pitchFamily="34" charset="0"/>
+              <a:hlinkClick r:id="rId6" action="ppaction://hlinkfile"/>
+            </a:endParaRPr>
+          </a:p>
+        </p:txBody>
+      </p:sp>
+      <p:pic>
+        <p:nvPicPr>
+          <p:cNvPr id="30" name="Imagem 29"/>
+          <p:cNvPicPr>
+            <a:picLocks noChangeAspect="1"/>
+          </p:cNvPicPr>
+          <p:nvPr/>
+        </p:nvPicPr>
+        <p:blipFill>
+          <a:blip r:embed="rId7"/>
+          <a:stretch>
+            <a:fillRect/>
+          </a:stretch>
+        </p:blipFill>
+        <p:spPr>
+          <a:xfrm>
+            <a:off x="662305" y="2712085"/>
+            <a:ext cx="770890" cy="770890"/>
+          </a:xfrm>
+          <a:prstGeom prst="rect">
+            <a:avLst/>
+          </a:prstGeom>
+          <a:effectLst>
+            <a:glow rad="50800">
+              <a:schemeClr val="bg1"/>
+            </a:glow>
+          </a:effectLst>
+        </p:spPr>
+      </p:pic>
+      <p:pic>
+        <p:nvPicPr>
+          <p:cNvPr id="41" name="Imagem 40"/>
+          <p:cNvPicPr>
+            <a:picLocks noChangeAspect="1"/>
+          </p:cNvPicPr>
+          <p:nvPr/>
+        </p:nvPicPr>
+        <p:blipFill>
+          <a:blip r:embed="rId7"/>
+          <a:stretch>
+            <a:fillRect/>
+          </a:stretch>
+        </p:blipFill>
+        <p:spPr>
+          <a:xfrm>
+            <a:off x="662305" y="3595370"/>
+            <a:ext cx="770890" cy="770890"/>
+          </a:xfrm>
+          <a:prstGeom prst="rect">
+            <a:avLst/>
+          </a:prstGeom>
+          <a:effectLst>
+            <a:glow rad="50800">
+              <a:schemeClr val="bg1"/>
+            </a:glow>
+          </a:effectLst>
+        </p:spPr>
+      </p:pic>
+      <p:pic>
+        <p:nvPicPr>
+          <p:cNvPr id="43" name="Imagem 42"/>
+          <p:cNvPicPr>
+            <a:picLocks noChangeAspect="1"/>
+          </p:cNvPicPr>
+          <p:nvPr/>
+        </p:nvPicPr>
+        <p:blipFill>
+          <a:blip r:embed="rId7"/>
+          <a:stretch>
+            <a:fillRect/>
+          </a:stretch>
+        </p:blipFill>
+        <p:spPr>
+          <a:xfrm>
+            <a:off x="8827135" y="2712085"/>
+            <a:ext cx="770890" cy="770890"/>
+          </a:xfrm>
+          <a:prstGeom prst="rect">
+            <a:avLst/>
+          </a:prstGeom>
+          <a:effectLst>
+            <a:glow rad="50800">
+              <a:schemeClr val="bg1"/>
+            </a:glow>
+          </a:effectLst>
+        </p:spPr>
+      </p:pic>
+      <p:pic>
+        <p:nvPicPr>
+          <p:cNvPr id="44" name="Imagem 43"/>
+          <p:cNvPicPr>
+            <a:picLocks noChangeAspect="1"/>
+          </p:cNvPicPr>
+          <p:nvPr/>
+        </p:nvPicPr>
+        <p:blipFill>
+          <a:blip r:embed="rId7"/>
+          <a:stretch>
+            <a:fillRect/>
+          </a:stretch>
+        </p:blipFill>
+        <p:spPr>
+          <a:xfrm>
+            <a:off x="8827135" y="3595370"/>
+            <a:ext cx="770890" cy="770890"/>
+          </a:xfrm>
+          <a:prstGeom prst="rect">
+            <a:avLst/>
+          </a:prstGeom>
+          <a:effectLst>
+            <a:glow rad="50800">
+              <a:schemeClr val="bg1"/>
+            </a:glow>
+          </a:effectLst>
+        </p:spPr>
+      </p:pic>
+      <p:pic>
+        <p:nvPicPr>
+          <p:cNvPr id="2" name="Espaço Reservado para Conteúdo 6"/>
+          <p:cNvPicPr>
+            <a:picLocks noChangeAspect="1"/>
+          </p:cNvPicPr>
+          <p:nvPr/>
+        </p:nvPicPr>
+        <p:blipFill>
+          <a:blip r:embed="rId8">
+            <a:alphaModFix amt="47000"/>
+          </a:blip>
+          <a:srcRect t="3619"/>
+          <a:stretch>
+            <a:fillRect/>
+          </a:stretch>
+        </p:blipFill>
+        <p:spPr>
+          <a:xfrm>
+            <a:off x="4005580" y="-27940"/>
+            <a:ext cx="4197985" cy="4197985"/>
+          </a:xfrm>
+          <a:prstGeom prst="rect">
+            <a:avLst/>
+          </a:prstGeom>
+          <a:noFill/>
+          <a:effectLst>
+            <a:glow rad="38100">
+              <a:schemeClr val="bg1">
+                <a:alpha val="0"/>
+              </a:schemeClr>
+            </a:glow>
+          </a:effectLst>
+        </p:spPr>
+      </p:pic>
+      <p:pic>
+        <p:nvPicPr>
+          <p:cNvPr id="27" name="Espaço Reservado para Conteúdo 6"/>
+          <p:cNvPicPr>
+            <a:picLocks noChangeAspect="1"/>
+          </p:cNvPicPr>
+          <p:nvPr/>
+        </p:nvPicPr>
+        <p:blipFill>
+          <a:blip r:embed="rId8">
+            <a:alphaModFix amt="47000"/>
+          </a:blip>
+          <a:srcRect t="3619" b="27661"/>
+          <a:stretch>
+            <a:fillRect/>
+          </a:stretch>
+        </p:blipFill>
+        <p:spPr>
+          <a:xfrm>
+            <a:off x="4015740" y="4037330"/>
+            <a:ext cx="4161790" cy="2820670"/>
+          </a:xfrm>
+          <a:prstGeom prst="rect">
+            <a:avLst/>
+          </a:prstGeom>
+          <a:noFill/>
+          <a:effectLst>
+            <a:glow rad="127000">
+              <a:schemeClr val="accent1">
+                <a:alpha val="0"/>
+              </a:schemeClr>
+            </a:glow>
+          </a:effectLst>
+        </p:spPr>
+      </p:pic>
+      <p:sp>
+        <p:nvSpPr>
+          <p:cNvPr id="21" name="Caixa de Texto 20"/>
+          <p:cNvSpPr txBox="1"/>
+          <p:nvPr/>
+        </p:nvSpPr>
+        <p:spPr>
+          <a:xfrm>
+            <a:off x="5760635" y="1218235"/>
+            <a:ext cx="688340" cy="521970"/>
+          </a:xfrm>
+          <a:prstGeom prst="rect">
+            <a:avLst/>
+          </a:prstGeom>
+          <a:noFill/>
+        </p:spPr>
+        <p:txBody>
+          <a:bodyPr wrap="square" rtlCol="0">
+            <a:spAutoFit/>
+          </a:bodyPr>
+          <a:p>
+            <a:pPr algn="ctr"/>
+            <a:r>
+              <a:rPr lang="pt-BR" altLang="en-US" sz="2800" b="1">
+                <a:solidFill>
+                  <a:schemeClr val="bg1"/>
+                </a:solidFill>
+                <a:latin typeface="Arial" panose="020B0604020202020204" pitchFamily="34" charset="0"/>
+                <a:cs typeface="Arial" panose="020B0604020202020204" pitchFamily="34" charset="0"/>
+              </a:rPr>
+              <a:t>L</a:t>
+            </a:r>
+            <a:endParaRPr lang="pt-BR" altLang="en-US" sz="2800" b="1">
+              <a:solidFill>
+                <a:schemeClr val="bg1"/>
+              </a:solidFill>
+              <a:latin typeface="Arial" panose="020B0604020202020204" pitchFamily="34" charset="0"/>
+              <a:cs typeface="Arial" panose="020B0604020202020204" pitchFamily="34" charset="0"/>
+            </a:endParaRPr>
+          </a:p>
+        </p:txBody>
+      </p:sp>
+      <p:sp>
+        <p:nvSpPr>
+          <p:cNvPr id="22" name="Caixa de Texto 21"/>
+          <p:cNvSpPr txBox="1"/>
+          <p:nvPr/>
+        </p:nvSpPr>
+        <p:spPr>
+          <a:xfrm>
+            <a:off x="5752465" y="2268220"/>
+            <a:ext cx="688340" cy="521970"/>
+          </a:xfrm>
+          <a:prstGeom prst="rect">
+            <a:avLst/>
+          </a:prstGeom>
+          <a:noFill/>
+        </p:spPr>
+        <p:txBody>
+          <a:bodyPr wrap="square" rtlCol="0">
+            <a:spAutoFit/>
+          </a:bodyPr>
+          <a:p>
+            <a:pPr algn="ctr"/>
+            <a:r>
+              <a:rPr lang="pt-BR" altLang="en-US" sz="2800" b="1">
+                <a:solidFill>
+                  <a:schemeClr val="bg1"/>
+                </a:solidFill>
+                <a:latin typeface="Arial" panose="020B0604020202020204" pitchFamily="34" charset="0"/>
+                <a:cs typeface="Arial" panose="020B0604020202020204" pitchFamily="34" charset="0"/>
+              </a:rPr>
+              <a:t>I</a:t>
+            </a:r>
+            <a:endParaRPr lang="pt-BR" altLang="en-US" sz="2800" b="1">
+              <a:solidFill>
+                <a:schemeClr val="bg1"/>
+              </a:solidFill>
+              <a:latin typeface="Arial" panose="020B0604020202020204" pitchFamily="34" charset="0"/>
+              <a:cs typeface="Arial" panose="020B0604020202020204" pitchFamily="34" charset="0"/>
+            </a:endParaRPr>
+          </a:p>
+        </p:txBody>
+      </p:sp>
+      <p:sp>
+        <p:nvSpPr>
+          <p:cNvPr id="24" name="Caixa de Texto 23"/>
+          <p:cNvSpPr txBox="1"/>
+          <p:nvPr/>
+        </p:nvSpPr>
+        <p:spPr>
+          <a:xfrm>
+            <a:off x="5752465" y="3318510"/>
+            <a:ext cx="688340" cy="521970"/>
+          </a:xfrm>
+          <a:prstGeom prst="rect">
+            <a:avLst/>
+          </a:prstGeom>
+          <a:noFill/>
+        </p:spPr>
+        <p:txBody>
+          <a:bodyPr wrap="square" rtlCol="0">
+            <a:spAutoFit/>
+          </a:bodyPr>
+          <a:p>
+            <a:pPr algn="ctr"/>
+            <a:r>
+              <a:rPr lang="pt-BR" altLang="en-US" sz="2800" b="1">
+                <a:solidFill>
+                  <a:schemeClr val="bg1"/>
+                </a:solidFill>
+                <a:latin typeface="Arial" panose="020B0604020202020204" pitchFamily="34" charset="0"/>
+                <a:cs typeface="Arial" panose="020B0604020202020204" pitchFamily="34" charset="0"/>
+              </a:rPr>
+              <a:t>N</a:t>
+            </a:r>
+            <a:endParaRPr lang="pt-BR" altLang="en-US" sz="2800" b="1">
+              <a:solidFill>
+                <a:schemeClr val="bg1"/>
+              </a:solidFill>
+              <a:latin typeface="Arial" panose="020B0604020202020204" pitchFamily="34" charset="0"/>
+              <a:cs typeface="Arial" panose="020B0604020202020204" pitchFamily="34" charset="0"/>
+            </a:endParaRPr>
+          </a:p>
+        </p:txBody>
+      </p:sp>
+      <p:sp>
+        <p:nvSpPr>
+          <p:cNvPr id="25" name="Caixa de Texto 24"/>
+          <p:cNvSpPr txBox="1"/>
+          <p:nvPr/>
+        </p:nvSpPr>
+        <p:spPr>
+          <a:xfrm>
+            <a:off x="5760720" y="4258945"/>
+            <a:ext cx="688340" cy="521970"/>
+          </a:xfrm>
+          <a:prstGeom prst="rect">
+            <a:avLst/>
+          </a:prstGeom>
+          <a:noFill/>
+        </p:spPr>
+        <p:txBody>
+          <a:bodyPr wrap="square" rtlCol="0">
+            <a:spAutoFit/>
+          </a:bodyPr>
+          <a:p>
+            <a:pPr algn="ctr"/>
+            <a:r>
+              <a:rPr lang="pt-BR" altLang="en-US" sz="2800" b="1">
+                <a:solidFill>
+                  <a:schemeClr val="bg1"/>
+                </a:solidFill>
+                <a:latin typeface="Arial" panose="020B0604020202020204" pitchFamily="34" charset="0"/>
+                <a:cs typeface="Arial" panose="020B0604020202020204" pitchFamily="34" charset="0"/>
+              </a:rPr>
+              <a:t>K</a:t>
+            </a:r>
+            <a:endParaRPr lang="pt-BR" altLang="en-US" sz="2800" b="1">
+              <a:solidFill>
+                <a:schemeClr val="bg1"/>
+              </a:solidFill>
+              <a:latin typeface="Arial" panose="020B0604020202020204" pitchFamily="34" charset="0"/>
+              <a:cs typeface="Arial" panose="020B0604020202020204" pitchFamily="34" charset="0"/>
+            </a:endParaRPr>
+          </a:p>
+        </p:txBody>
+      </p:sp>
+      <p:sp>
+        <p:nvSpPr>
+          <p:cNvPr id="28" name="Caixa de Texto 27"/>
+          <p:cNvSpPr txBox="1"/>
+          <p:nvPr/>
+        </p:nvSpPr>
+        <p:spPr>
+          <a:xfrm>
+            <a:off x="5751830" y="5199380"/>
+            <a:ext cx="688340" cy="521970"/>
+          </a:xfrm>
+          <a:prstGeom prst="rect">
+            <a:avLst/>
+          </a:prstGeom>
+          <a:noFill/>
+        </p:spPr>
+        <p:txBody>
+          <a:bodyPr wrap="square" rtlCol="0">
+            <a:spAutoFit/>
+          </a:bodyPr>
+          <a:p>
+            <a:pPr algn="ctr"/>
+            <a:r>
+              <a:rPr lang="pt-BR" altLang="en-US" sz="2800" b="1">
+                <a:solidFill>
+                  <a:schemeClr val="bg1"/>
+                </a:solidFill>
+                <a:latin typeface="Arial" panose="020B0604020202020204" pitchFamily="34" charset="0"/>
+                <a:cs typeface="Arial" panose="020B0604020202020204" pitchFamily="34" charset="0"/>
+              </a:rPr>
+              <a:t>S</a:t>
+            </a:r>
+            <a:endParaRPr lang="pt-BR" altLang="en-US" sz="2800" b="1">
+              <a:solidFill>
+                <a:schemeClr val="bg1"/>
+              </a:solidFill>
+              <a:latin typeface="Arial" panose="020B0604020202020204" pitchFamily="34" charset="0"/>
+              <a:cs typeface="Arial" panose="020B0604020202020204" pitchFamily="34" charset="0"/>
+            </a:endParaRPr>
+          </a:p>
+        </p:txBody>
+      </p:sp>
+    </p:spTree>
+  </p:cSld>
+  <p:clrMapOvr>
+    <a:masterClrMapping/>
+  </p:clrMapOvr>
+  <p:timing>
+    <p:tnLst>
+      <p:par>
+        <p:cTn id="1" dur="indefinite" restart="never" nodeType="tmRoot"/>
+      </p:par>
+    </p:tnLst>
+  </p:timing>
+</p:sld>
+</file>
+
+<file path=ppt/slides/slide9.xml><?xml version="1.0" encoding="utf-8"?>
 <p:sld xmlns:a="http://schemas.openxmlformats.org/drawingml/2006/main" xmlns:r="http://schemas.openxmlformats.org/officeDocument/2006/relationships" xmlns:p="http://schemas.openxmlformats.org/presentationml/2006/main">
   <p:cSld>
     <p:spTree>

</xml_diff>